<commit_message>
add full use cases
</commit_message>
<xml_diff>
--- a/PracticeTasks/Final_Task/K8C_FinalTask1_(Task8).pptx
+++ b/PracticeTasks/Final_Task/K8C_FinalTask1_(Task8).pptx
@@ -11147,7 +11147,7 @@
             <a:r>
               <a:rPr lang="en-GB" b="1" dirty="0">
                 <a:solidFill>
-                  <a:srgbClr val="FF0000"/>
+                  <a:schemeClr val="tx1"/>
                 </a:solidFill>
                 <a:effectLst>
                   <a:outerShdw blurRad="38100" dist="38100" dir="2700000" algn="tl">
@@ -11161,7 +11161,7 @@
             </a:r>
             <a:endParaRPr b="1" dirty="0">
               <a:solidFill>
-                <a:srgbClr val="FF0000"/>
+                <a:schemeClr val="tx1"/>
               </a:solidFill>
               <a:effectLst>
                 <a:outerShdw blurRad="38100" dist="38100" dir="2700000" algn="tl">
@@ -11171,52 +11171,6 @@
                 </a:outerShdw>
               </a:effectLst>
             </a:endParaRPr>
-          </a:p>
-        </p:txBody>
-      </p:sp>
-      <p:sp>
-        <p:nvSpPr>
-          <p:cNvPr id="84" name="Google Shape;84;p17"/>
-          <p:cNvSpPr txBox="1">
-            <a:spLocks noGrp="1"/>
-          </p:cNvSpPr>
-          <p:nvPr>
-            <p:ph type="body" idx="1"/>
-          </p:nvPr>
-        </p:nvSpPr>
-        <p:spPr>
-          <a:xfrm>
-            <a:off x="311700" y="1152475"/>
-            <a:ext cx="8520600" cy="1099907"/>
-          </a:xfrm>
-          <a:prstGeom prst="rect">
-            <a:avLst/>
-          </a:prstGeom>
-        </p:spPr>
-        <p:txBody>
-          <a:bodyPr spcFirstLastPara="1" wrap="square" lIns="91425" tIns="91425" rIns="91425" bIns="91425" anchor="t" anchorCtr="0">
-            <a:noAutofit/>
-          </a:bodyPr>
-          <a:lstStyle/>
-          <a:p>
-            <a:pPr marL="0" lvl="0" indent="0" algn="l" rtl="0">
-              <a:spcBef>
-                <a:spcPts val="1200"/>
-              </a:spcBef>
-              <a:spcAft>
-                <a:spcPts val="0"/>
-              </a:spcAft>
-              <a:buNone/>
-            </a:pPr>
-            <a:r>
-              <a:rPr lang="en-US" dirty="0"/>
-              <a:t>S</a:t>
-            </a:r>
-            <a:r>
-              <a:rPr lang="en-GB" dirty="0"/>
-              <a:t>how main and alternative scenarios on a diagram</a:t>
-            </a:r>
-            <a:endParaRPr dirty="0"/>
           </a:p>
         </p:txBody>
       </p:sp>
@@ -11294,6 +11248,53 @@
           </a:p>
         </p:txBody>
       </p:sp>
+      <p:pic>
+        <p:nvPicPr>
+          <p:cNvPr id="1026" name="Picture 2">
+            <a:extLst>
+              <a:ext uri="{FF2B5EF4-FFF2-40B4-BE49-F238E27FC236}">
+                <a16:creationId xmlns:a16="http://schemas.microsoft.com/office/drawing/2014/main" id="{49B1DF65-D9DE-4FED-AE2E-154AB420980E}"/>
+              </a:ext>
+            </a:extLst>
+          </p:cNvPr>
+          <p:cNvPicPr>
+            <a:picLocks noChangeAspect="1" noChangeArrowheads="1"/>
+          </p:cNvPicPr>
+          <p:nvPr/>
+        </p:nvPicPr>
+        <p:blipFill>
+          <a:blip r:embed="rId3">
+            <a:extLst>
+              <a:ext uri="{28A0092B-C50C-407E-A947-70E740481C1C}">
+                <a14:useLocalDpi xmlns:a14="http://schemas.microsoft.com/office/drawing/2010/main" val="0"/>
+              </a:ext>
+            </a:extLst>
+          </a:blip>
+          <a:srcRect/>
+          <a:stretch>
+            <a:fillRect/>
+          </a:stretch>
+        </p:blipFill>
+        <p:spPr bwMode="auto">
+          <a:xfrm>
+            <a:off x="311700" y="1147730"/>
+            <a:ext cx="8290112" cy="2963428"/>
+          </a:xfrm>
+          <a:prstGeom prst="rect">
+            <a:avLst/>
+          </a:prstGeom>
+          <a:noFill/>
+          <a:extLst>
+            <a:ext uri="{909E8E84-426E-40DD-AFC4-6F175D3DCCD1}">
+              <a14:hiddenFill xmlns:a14="http://schemas.microsoft.com/office/drawing/2010/main">
+                <a:solidFill>
+                  <a:srgbClr val="FFFFFF"/>
+                </a:solidFill>
+              </a14:hiddenFill>
+            </a:ext>
+          </a:extLst>
+        </p:spPr>
+      </p:pic>
     </p:spTree>
   </p:cSld>
   <p:clrMapOvr>

</xml_diff>

<commit_message>
fin of the fin of the fin
</commit_message>
<xml_diff>
--- a/PracticeTasks/Final_Task/K8C_FinalTask1_(Task8).pptx
+++ b/PracticeTasks/Final_Task/K8C_FinalTask1_(Task8).pptx
@@ -5,35 +5,34 @@
     <p:sldMasterId id="2147483659" r:id="rId1"/>
   </p:sldMasterIdLst>
   <p:notesMasterIdLst>
-    <p:notesMasterId r:id="rId28"/>
+    <p:notesMasterId r:id="rId27"/>
   </p:notesMasterIdLst>
   <p:sldIdLst>
     <p:sldId id="256" r:id="rId2"/>
     <p:sldId id="267" r:id="rId3"/>
-    <p:sldId id="269" r:id="rId4"/>
-    <p:sldId id="270" r:id="rId5"/>
-    <p:sldId id="268" r:id="rId6"/>
-    <p:sldId id="272" r:id="rId7"/>
-    <p:sldId id="260" r:id="rId8"/>
-    <p:sldId id="261" r:id="rId9"/>
-    <p:sldId id="262" r:id="rId10"/>
-    <p:sldId id="263" r:id="rId11"/>
-    <p:sldId id="284" r:id="rId12"/>
-    <p:sldId id="264" r:id="rId13"/>
-    <p:sldId id="265" r:id="rId14"/>
-    <p:sldId id="273" r:id="rId15"/>
-    <p:sldId id="285" r:id="rId16"/>
-    <p:sldId id="271" r:id="rId17"/>
-    <p:sldId id="274" r:id="rId18"/>
-    <p:sldId id="275" r:id="rId19"/>
-    <p:sldId id="276" r:id="rId20"/>
-    <p:sldId id="277" r:id="rId21"/>
-    <p:sldId id="278" r:id="rId22"/>
-    <p:sldId id="279" r:id="rId23"/>
-    <p:sldId id="280" r:id="rId24"/>
-    <p:sldId id="281" r:id="rId25"/>
-    <p:sldId id="282" r:id="rId26"/>
-    <p:sldId id="283" r:id="rId27"/>
+    <p:sldId id="268" r:id="rId4"/>
+    <p:sldId id="269" r:id="rId5"/>
+    <p:sldId id="272" r:id="rId6"/>
+    <p:sldId id="260" r:id="rId7"/>
+    <p:sldId id="261" r:id="rId8"/>
+    <p:sldId id="262" r:id="rId9"/>
+    <p:sldId id="263" r:id="rId10"/>
+    <p:sldId id="284" r:id="rId11"/>
+    <p:sldId id="264" r:id="rId12"/>
+    <p:sldId id="265" r:id="rId13"/>
+    <p:sldId id="273" r:id="rId14"/>
+    <p:sldId id="285" r:id="rId15"/>
+    <p:sldId id="271" r:id="rId16"/>
+    <p:sldId id="274" r:id="rId17"/>
+    <p:sldId id="275" r:id="rId18"/>
+    <p:sldId id="276" r:id="rId19"/>
+    <p:sldId id="277" r:id="rId20"/>
+    <p:sldId id="278" r:id="rId21"/>
+    <p:sldId id="279" r:id="rId22"/>
+    <p:sldId id="280" r:id="rId23"/>
+    <p:sldId id="281" r:id="rId24"/>
+    <p:sldId id="282" r:id="rId25"/>
+    <p:sldId id="283" r:id="rId26"/>
   </p:sldIdLst>
   <p:sldSz cx="9144000" cy="5143500" type="screen16x9"/>
   <p:notesSz cx="6858000" cy="9144000"/>
@@ -273,9 +272,8 @@
           <p14:sldIdLst>
             <p14:sldId id="256"/>
             <p14:sldId id="267"/>
+            <p14:sldId id="268"/>
             <p14:sldId id="269"/>
-            <p14:sldId id="270"/>
-            <p14:sldId id="268"/>
             <p14:sldId id="272"/>
             <p14:sldId id="260"/>
             <p14:sldId id="261"/>
@@ -6776,315 +6774,6 @@
       </p:sp>
       <p:pic>
         <p:nvPicPr>
-          <p:cNvPr id="3074" name="Picture 2" descr="UC Request Routing">
-            <a:extLst>
-              <a:ext uri="{FF2B5EF4-FFF2-40B4-BE49-F238E27FC236}">
-                <a16:creationId xmlns:a16="http://schemas.microsoft.com/office/drawing/2014/main" id="{37B485D5-D86F-4696-BEBC-3226D81EFDF7}"/>
-              </a:ext>
-            </a:extLst>
-          </p:cNvPr>
-          <p:cNvPicPr>
-            <a:picLocks noChangeAspect="1" noChangeArrowheads="1"/>
-          </p:cNvPicPr>
-          <p:nvPr/>
-        </p:nvPicPr>
-        <p:blipFill>
-          <a:blip r:embed="rId3">
-            <a:extLst>
-              <a:ext uri="{28A0092B-C50C-407E-A947-70E740481C1C}">
-                <a14:useLocalDpi xmlns:a14="http://schemas.microsoft.com/office/drawing/2010/main" val="0"/>
-              </a:ext>
-            </a:extLst>
-          </a:blip>
-          <a:srcRect/>
-          <a:stretch>
-            <a:fillRect/>
-          </a:stretch>
-        </p:blipFill>
-        <p:spPr bwMode="auto">
-          <a:xfrm>
-            <a:off x="611842" y="1238099"/>
-            <a:ext cx="3556746" cy="3517662"/>
-          </a:xfrm>
-          <a:prstGeom prst="rect">
-            <a:avLst/>
-          </a:prstGeom>
-          <a:noFill/>
-          <a:ln w="19050">
-            <a:solidFill>
-              <a:schemeClr val="tx1"/>
-            </a:solidFill>
-          </a:ln>
-          <a:extLst>
-            <a:ext uri="{909E8E84-426E-40DD-AFC4-6F175D3DCCD1}">
-              <a14:hiddenFill xmlns:a14="http://schemas.microsoft.com/office/drawing/2010/main">
-                <a:solidFill>
-                  <a:srgbClr val="FFFFFF"/>
-                </a:solidFill>
-              </a14:hiddenFill>
-            </a:ext>
-          </a:extLst>
-        </p:spPr>
-      </p:pic>
-      <p:sp>
-        <p:nvSpPr>
-          <p:cNvPr id="5" name="TextBox 4">
-            <a:extLst>
-              <a:ext uri="{FF2B5EF4-FFF2-40B4-BE49-F238E27FC236}">
-                <a16:creationId xmlns:a16="http://schemas.microsoft.com/office/drawing/2014/main" id="{40FBE421-E6EC-4AE8-B9CD-ADEA23C49AAD}"/>
-              </a:ext>
-            </a:extLst>
-          </p:cNvPr>
-          <p:cNvSpPr txBox="1"/>
-          <p:nvPr/>
-        </p:nvSpPr>
-        <p:spPr>
-          <a:xfrm>
-            <a:off x="611842" y="844382"/>
-            <a:ext cx="3556746" cy="307777"/>
-          </a:xfrm>
-          <a:prstGeom prst="rect">
-            <a:avLst/>
-          </a:prstGeom>
-          <a:noFill/>
-        </p:spPr>
-        <p:txBody>
-          <a:bodyPr wrap="square" rtlCol="0">
-            <a:spAutoFit/>
-          </a:bodyPr>
-          <a:lstStyle/>
-          <a:p>
-            <a:pPr algn="ctr"/>
-            <a:r>
-              <a:rPr lang="en-US" b="1" dirty="0"/>
-              <a:t>Request Validator</a:t>
-            </a:r>
-            <a:endParaRPr lang="ru-RU" b="1" dirty="0"/>
-          </a:p>
-        </p:txBody>
-      </p:sp>
-      <p:pic>
-        <p:nvPicPr>
-          <p:cNvPr id="3076" name="Picture 4" descr="UC Request Routing">
-            <a:extLst>
-              <a:ext uri="{FF2B5EF4-FFF2-40B4-BE49-F238E27FC236}">
-                <a16:creationId xmlns:a16="http://schemas.microsoft.com/office/drawing/2014/main" id="{39D3E833-044C-4439-9822-90E0A5F85F5D}"/>
-              </a:ext>
-            </a:extLst>
-          </p:cNvPr>
-          <p:cNvPicPr>
-            <a:picLocks noChangeAspect="1" noChangeArrowheads="1"/>
-          </p:cNvPicPr>
-          <p:nvPr/>
-        </p:nvPicPr>
-        <p:blipFill>
-          <a:blip r:embed="rId4">
-            <a:extLst>
-              <a:ext uri="{28A0092B-C50C-407E-A947-70E740481C1C}">
-                <a14:useLocalDpi xmlns:a14="http://schemas.microsoft.com/office/drawing/2010/main" val="0"/>
-              </a:ext>
-            </a:extLst>
-          </a:blip>
-          <a:srcRect/>
-          <a:stretch>
-            <a:fillRect/>
-          </a:stretch>
-        </p:blipFill>
-        <p:spPr bwMode="auto">
-          <a:xfrm>
-            <a:off x="5232495" y="1238099"/>
-            <a:ext cx="3029098" cy="3517662"/>
-          </a:xfrm>
-          <a:prstGeom prst="rect">
-            <a:avLst/>
-          </a:prstGeom>
-          <a:noFill/>
-          <a:ln w="19050">
-            <a:solidFill>
-              <a:schemeClr val="tx1"/>
-            </a:solidFill>
-          </a:ln>
-          <a:extLst>
-            <a:ext uri="{909E8E84-426E-40DD-AFC4-6F175D3DCCD1}">
-              <a14:hiddenFill xmlns:a14="http://schemas.microsoft.com/office/drawing/2010/main">
-                <a:solidFill>
-                  <a:srgbClr val="FFFFFF"/>
-                </a:solidFill>
-              </a14:hiddenFill>
-            </a:ext>
-          </a:extLst>
-        </p:spPr>
-      </p:pic>
-      <p:sp>
-        <p:nvSpPr>
-          <p:cNvPr id="10" name="TextBox 9">
-            <a:extLst>
-              <a:ext uri="{FF2B5EF4-FFF2-40B4-BE49-F238E27FC236}">
-                <a16:creationId xmlns:a16="http://schemas.microsoft.com/office/drawing/2014/main" id="{5FEE58F1-6A47-41C8-A39B-651FD571848E}"/>
-              </a:ext>
-            </a:extLst>
-          </p:cNvPr>
-          <p:cNvSpPr txBox="1"/>
-          <p:nvPr/>
-        </p:nvSpPr>
-        <p:spPr>
-          <a:xfrm>
-            <a:off x="5232495" y="844381"/>
-            <a:ext cx="3029098" cy="307777"/>
-          </a:xfrm>
-          <a:prstGeom prst="rect">
-            <a:avLst/>
-          </a:prstGeom>
-          <a:noFill/>
-        </p:spPr>
-        <p:txBody>
-          <a:bodyPr wrap="square" rtlCol="0">
-            <a:spAutoFit/>
-          </a:bodyPr>
-          <a:lstStyle/>
-          <a:p>
-            <a:pPr algn="ctr"/>
-            <a:r>
-              <a:rPr lang="en-US" b="1" dirty="0" err="1"/>
-              <a:t>OpenAPI</a:t>
-            </a:r>
-            <a:r>
-              <a:rPr lang="en-US" b="1" dirty="0"/>
-              <a:t> Schema Generator</a:t>
-            </a:r>
-            <a:endParaRPr lang="ru-RU" b="1" dirty="0"/>
-          </a:p>
-        </p:txBody>
-      </p:sp>
-    </p:spTree>
-  </p:cSld>
-  <p:clrMapOvr>
-    <a:masterClrMapping/>
-  </p:clrMapOvr>
-</p:sld>
-</file>
-
-<file path=ppt/slides/slide11.xml><?xml version="1.0" encoding="utf-8"?>
-<p:sld xmlns:a="http://schemas.openxmlformats.org/drawingml/2006/main" xmlns:r="http://schemas.openxmlformats.org/officeDocument/2006/relationships" xmlns:p="http://schemas.openxmlformats.org/presentationml/2006/main">
-  <p:cSld>
-    <p:spTree>
-      <p:nvGrpSpPr>
-        <p:cNvPr id="1" name="Shape 101"/>
-        <p:cNvGrpSpPr/>
-        <p:nvPr/>
-      </p:nvGrpSpPr>
-      <p:grpSpPr>
-        <a:xfrm>
-          <a:off x="0" y="0"/>
-          <a:ext cx="0" cy="0"/>
-          <a:chOff x="0" y="0"/>
-          <a:chExt cx="0" cy="0"/>
-        </a:xfrm>
-      </p:grpSpPr>
-      <p:sp>
-        <p:nvSpPr>
-          <p:cNvPr id="102" name="Google Shape;102;p20"/>
-          <p:cNvSpPr txBox="1">
-            <a:spLocks noGrp="1"/>
-          </p:cNvSpPr>
-          <p:nvPr>
-            <p:ph type="title"/>
-          </p:nvPr>
-        </p:nvSpPr>
-        <p:spPr>
-          <a:xfrm>
-            <a:off x="226208" y="185742"/>
-            <a:ext cx="8520600" cy="572700"/>
-          </a:xfrm>
-          <a:prstGeom prst="rect">
-            <a:avLst/>
-          </a:prstGeom>
-        </p:spPr>
-        <p:txBody>
-          <a:bodyPr spcFirstLastPara="1" wrap="square" lIns="91425" tIns="91425" rIns="91425" bIns="91425" anchor="t" anchorCtr="0">
-            <a:noAutofit/>
-          </a:bodyPr>
-          <a:lstStyle/>
-          <a:p>
-            <a:pPr marL="0" lvl="0" indent="0" algn="l" rtl="0">
-              <a:spcBef>
-                <a:spcPts val="0"/>
-              </a:spcBef>
-              <a:spcAft>
-                <a:spcPts val="0"/>
-              </a:spcAft>
-              <a:buNone/>
-            </a:pPr>
-            <a:r>
-              <a:rPr lang="en-GB" b="1" dirty="0">
-                <a:solidFill>
-                  <a:schemeClr val="tx1"/>
-                </a:solidFill>
-                <a:effectLst>
-                  <a:outerShdw blurRad="38100" dist="38100" dir="2700000" algn="tl">
-                    <a:srgbClr val="000000">
-                      <a:alpha val="43137"/>
-                    </a:srgbClr>
-                  </a:outerShdw>
-                </a:effectLst>
-              </a:rPr>
-              <a:t>Detailed behaviour</a:t>
-            </a:r>
-            <a:endParaRPr b="1" dirty="0">
-              <a:solidFill>
-                <a:schemeClr val="tx1"/>
-              </a:solidFill>
-              <a:effectLst>
-                <a:outerShdw blurRad="38100" dist="38100" dir="2700000" algn="tl">
-                  <a:srgbClr val="000000">
-                    <a:alpha val="43137"/>
-                  </a:srgbClr>
-                </a:outerShdw>
-              </a:effectLst>
-            </a:endParaRPr>
-          </a:p>
-        </p:txBody>
-      </p:sp>
-      <p:sp>
-        <p:nvSpPr>
-          <p:cNvPr id="2" name="Slide Number Placeholder 1">
-            <a:extLst>
-              <a:ext uri="{FF2B5EF4-FFF2-40B4-BE49-F238E27FC236}">
-                <a16:creationId xmlns:a16="http://schemas.microsoft.com/office/drawing/2014/main" id="{1993C304-8938-41C3-9583-2C7227088CD4}"/>
-              </a:ext>
-            </a:extLst>
-          </p:cNvPr>
-          <p:cNvSpPr>
-            <a:spLocks noGrp="1"/>
-          </p:cNvSpPr>
-          <p:nvPr>
-            <p:ph type="sldNum" idx="12"/>
-          </p:nvPr>
-        </p:nvSpPr>
-        <p:spPr/>
-        <p:txBody>
-          <a:bodyPr/>
-          <a:lstStyle/>
-          <a:p>
-            <a:pPr marL="0" lvl="0" indent="0" algn="r" rtl="0">
-              <a:spcBef>
-                <a:spcPts val="0"/>
-              </a:spcBef>
-              <a:spcAft>
-                <a:spcPts val="0"/>
-              </a:spcAft>
-              <a:buNone/>
-            </a:pPr>
-            <a:fld id="{00000000-1234-1234-1234-123412341234}" type="slidenum">
-              <a:rPr lang="en-GB" smtClean="0"/>
-              <a:t>11</a:t>
-            </a:fld>
-            <a:endParaRPr lang="en-GB"/>
-          </a:p>
-        </p:txBody>
-      </p:sp>
-      <p:pic>
-        <p:nvPicPr>
           <p:cNvPr id="3074" name="Picture 2">
             <a:extLst>
               <a:ext uri="{FF2B5EF4-FFF2-40B4-BE49-F238E27FC236}">
@@ -7262,7 +6951,7 @@
 </p:sld>
 </file>
 
-<file path=ppt/slides/slide12.xml><?xml version="1.0" encoding="utf-8"?>
+<file path=ppt/slides/slide11.xml><?xml version="1.0" encoding="utf-8"?>
 <p:sld xmlns:a="http://schemas.openxmlformats.org/drawingml/2006/main" xmlns:r="http://schemas.openxmlformats.org/officeDocument/2006/relationships" xmlns:p="http://schemas.openxmlformats.org/presentationml/2006/main">
   <p:cSld>
     <p:spTree>
@@ -7355,7 +7044,7 @@
         </p:nvSpPr>
         <p:spPr>
           <a:xfrm>
-            <a:off x="311700" y="1152475"/>
+            <a:off x="304977" y="964831"/>
             <a:ext cx="2924368" cy="3698386"/>
           </a:xfrm>
           <a:prstGeom prst="rect">
@@ -7694,7 +7383,7 @@
         </p:nvSpPr>
         <p:spPr>
           <a:xfrm>
-            <a:off x="5265905" y="1152475"/>
+            <a:off x="5306246" y="964831"/>
             <a:ext cx="2386519" cy="1154162"/>
           </a:xfrm>
           <a:prstGeom prst="rect">
@@ -7785,7 +7474,7 @@
             </a:pPr>
             <a:fld id="{00000000-1234-1234-1234-123412341234}" type="slidenum">
               <a:rPr lang="en-GB" smtClean="0"/>
-              <a:t>12</a:t>
+              <a:t>11</a:t>
             </a:fld>
             <a:endParaRPr lang="en-GB"/>
           </a:p>
@@ -7799,7 +7488,7 @@
 </p:sld>
 </file>
 
-<file path=ppt/slides/slide13.xml><?xml version="1.0" encoding="utf-8"?>
+<file path=ppt/slides/slide12.xml><?xml version="1.0" encoding="utf-8"?>
 <p:sld xmlns:a="http://schemas.openxmlformats.org/drawingml/2006/main" xmlns:r="http://schemas.openxmlformats.org/officeDocument/2006/relationships" xmlns:p="http://schemas.openxmlformats.org/presentationml/2006/main">
   <p:cSld>
     <p:spTree>
@@ -7895,7 +7584,7 @@
           <p:nvPr>
             <p:extLst>
               <p:ext uri="{D42A27DB-BD31-4B8C-83A1-F6EECF244321}">
-                <p14:modId xmlns:p14="http://schemas.microsoft.com/office/powerpoint/2010/main" val="1093907184"/>
+                <p14:modId xmlns:p14="http://schemas.microsoft.com/office/powerpoint/2010/main" val="3813174674"/>
               </p:ext>
             </p:extLst>
           </p:nvPr>
@@ -7962,7 +7651,7 @@
                             <a:schemeClr val="tx1"/>
                           </a:solidFill>
                         </a:rPr>
-                        <a:t>Story Map, CRC</a:t>
+                        <a:t>Story Map, CRC Cards</a:t>
                       </a:r>
                       <a:endParaRPr lang="ru-RU" dirty="0">
                         <a:solidFill>
@@ -8027,7 +7716,7 @@
                             <a:schemeClr val="tx1"/>
                           </a:solidFill>
                         </a:rPr>
-                        <a:t>Use cases, Interactions Diagram</a:t>
+                        <a:t>Use cases, Interactions Analysis</a:t>
                       </a:r>
                       <a:endParaRPr lang="ru-RU" dirty="0">
                         <a:solidFill>
@@ -8171,7 +7860,17 @@
                             <a:schemeClr val="tx1"/>
                           </a:solidFill>
                         </a:rPr>
-                        <a:t>CRC Cards, Behavior model</a:t>
+                        <a:t>Story Map,</a:t>
+                      </a:r>
+                    </a:p>
+                    <a:p>
+                      <a:r>
+                        <a:rPr lang="en-US" dirty="0">
+                          <a:solidFill>
+                            <a:schemeClr val="tx1"/>
+                          </a:solidFill>
+                        </a:rPr>
+                        <a:t>Behavior model</a:t>
                       </a:r>
                       <a:endParaRPr lang="ru-RU" dirty="0">
                         <a:solidFill>
@@ -9079,7 +8778,7 @@
             </a:pPr>
             <a:fld id="{00000000-1234-1234-1234-123412341234}" type="slidenum">
               <a:rPr lang="en-GB" smtClean="0"/>
-              <a:t>13</a:t>
+              <a:t>12</a:t>
             </a:fld>
             <a:endParaRPr lang="en-GB"/>
           </a:p>
@@ -9093,7 +8792,7 @@
 </p:sld>
 </file>
 
-<file path=ppt/slides/slide14.xml><?xml version="1.0" encoding="utf-8"?>
+<file path=ppt/slides/slide13.xml><?xml version="1.0" encoding="utf-8"?>
 <p:sld xmlns:a="http://schemas.openxmlformats.org/drawingml/2006/main" xmlns:r="http://schemas.openxmlformats.org/officeDocument/2006/relationships" xmlns:p="http://schemas.openxmlformats.org/presentationml/2006/main">
   <p:cSld>
     <p:spTree>
@@ -9192,7 +8891,7 @@
             </a:pPr>
             <a:fld id="{00000000-1234-1234-1234-123412341234}" type="slidenum">
               <a:rPr lang="en-GB" smtClean="0"/>
-              <a:t>14</a:t>
+              <a:t>13</a:t>
             </a:fld>
             <a:endParaRPr lang="en-GB"/>
           </a:p>
@@ -9211,7 +8910,7 @@
 </p:sld>
 </file>
 
-<file path=ppt/slides/slide15.xml><?xml version="1.0" encoding="utf-8"?>
+<file path=ppt/slides/slide14.xml><?xml version="1.0" encoding="utf-8"?>
 <p:sld xmlns:a="http://schemas.openxmlformats.org/drawingml/2006/main" xmlns:r="http://schemas.openxmlformats.org/officeDocument/2006/relationships" xmlns:p="http://schemas.openxmlformats.org/presentationml/2006/main">
   <p:cSld>
     <p:spTree>
@@ -9311,7 +9010,7 @@
             </a:pPr>
             <a:fld id="{00000000-1234-1234-1234-123412341234}" type="slidenum">
               <a:rPr lang="en-GB" smtClean="0"/>
-              <a:t>15</a:t>
+              <a:t>14</a:t>
             </a:fld>
             <a:endParaRPr lang="en-GB"/>
           </a:p>
@@ -9330,7 +9029,7 @@
 </p:sld>
 </file>
 
-<file path=ppt/slides/slide16.xml><?xml version="1.0" encoding="utf-8"?>
+<file path=ppt/slides/slide15.xml><?xml version="1.0" encoding="utf-8"?>
 <p:sld xmlns:a="http://schemas.openxmlformats.org/drawingml/2006/main" xmlns:r="http://schemas.openxmlformats.org/officeDocument/2006/relationships" xmlns:p="http://schemas.openxmlformats.org/presentationml/2006/main">
   <p:cSld>
     <p:spTree>
@@ -9478,7 +9177,7 @@
             </a:pPr>
             <a:fld id="{00000000-1234-1234-1234-123412341234}" type="slidenum">
               <a:rPr lang="en-GB" smtClean="0"/>
-              <a:t>16</a:t>
+              <a:t>15</a:t>
             </a:fld>
             <a:endParaRPr lang="en-GB"/>
           </a:p>
@@ -9492,7 +9191,7 @@
 </p:sld>
 </file>
 
-<file path=ppt/slides/slide17.xml><?xml version="1.0" encoding="utf-8"?>
+<file path=ppt/slides/slide16.xml><?xml version="1.0" encoding="utf-8"?>
 <p:sld xmlns:a="http://schemas.openxmlformats.org/drawingml/2006/main" xmlns:r="http://schemas.openxmlformats.org/officeDocument/2006/relationships" xmlns:p="http://schemas.openxmlformats.org/presentationml/2006/main">
   <p:cSld>
     <p:spTree>
@@ -9591,7 +9290,7 @@
             </a:pPr>
             <a:fld id="{00000000-1234-1234-1234-123412341234}" type="slidenum">
               <a:rPr lang="en-GB" smtClean="0"/>
-              <a:t>17</a:t>
+              <a:t>16</a:t>
             </a:fld>
             <a:endParaRPr lang="en-GB"/>
           </a:p>
@@ -9657,7 +9356,7 @@
 </p:sld>
 </file>
 
-<file path=ppt/slides/slide18.xml><?xml version="1.0" encoding="utf-8"?>
+<file path=ppt/slides/slide17.xml><?xml version="1.0" encoding="utf-8"?>
 <p:sld xmlns:a="http://schemas.openxmlformats.org/drawingml/2006/main" xmlns:r="http://schemas.openxmlformats.org/officeDocument/2006/relationships" xmlns:p="http://schemas.openxmlformats.org/presentationml/2006/main">
   <p:cSld>
     <p:spTree>
@@ -9756,7 +9455,7 @@
             </a:pPr>
             <a:fld id="{00000000-1234-1234-1234-123412341234}" type="slidenum">
               <a:rPr lang="en-GB" smtClean="0"/>
-              <a:t>18</a:t>
+              <a:t>17</a:t>
             </a:fld>
             <a:endParaRPr lang="en-GB"/>
           </a:p>
@@ -9822,7 +9521,7 @@
 </p:sld>
 </file>
 
-<file path=ppt/slides/slide19.xml><?xml version="1.0" encoding="utf-8"?>
+<file path=ppt/slides/slide18.xml><?xml version="1.0" encoding="utf-8"?>
 <p:sld xmlns:a="http://schemas.openxmlformats.org/drawingml/2006/main" xmlns:r="http://schemas.openxmlformats.org/officeDocument/2006/relationships" xmlns:p="http://schemas.openxmlformats.org/presentationml/2006/main">
   <p:cSld>
     <p:spTree>
@@ -9921,7 +9620,7 @@
             </a:pPr>
             <a:fld id="{00000000-1234-1234-1234-123412341234}" type="slidenum">
               <a:rPr lang="en-GB" smtClean="0"/>
-              <a:t>19</a:t>
+              <a:t>18</a:t>
             </a:fld>
             <a:endParaRPr lang="en-GB"/>
           </a:p>
@@ -9987,6 +9686,171 @@
 </p:sld>
 </file>
 
+<file path=ppt/slides/slide19.xml><?xml version="1.0" encoding="utf-8"?>
+<p:sld xmlns:a="http://schemas.openxmlformats.org/drawingml/2006/main" xmlns:r="http://schemas.openxmlformats.org/officeDocument/2006/relationships" xmlns:p="http://schemas.openxmlformats.org/presentationml/2006/main">
+  <p:cSld>
+    <p:spTree>
+      <p:nvGrpSpPr>
+        <p:cNvPr id="1" name=""/>
+        <p:cNvGrpSpPr/>
+        <p:nvPr/>
+      </p:nvGrpSpPr>
+      <p:grpSpPr>
+        <a:xfrm>
+          <a:off x="0" y="0"/>
+          <a:ext cx="0" cy="0"/>
+          <a:chOff x="0" y="0"/>
+          <a:chExt cx="0" cy="0"/>
+        </a:xfrm>
+      </p:grpSpPr>
+      <p:sp>
+        <p:nvSpPr>
+          <p:cNvPr id="2" name="Заголовок 1">
+            <a:extLst>
+              <a:ext uri="{FF2B5EF4-FFF2-40B4-BE49-F238E27FC236}">
+                <a16:creationId xmlns:a16="http://schemas.microsoft.com/office/drawing/2014/main" id="{BF8EE9D0-0305-4DAD-A8A5-E3E71B917267}"/>
+              </a:ext>
+            </a:extLst>
+          </p:cNvPr>
+          <p:cNvSpPr>
+            <a:spLocks noGrp="1"/>
+          </p:cNvSpPr>
+          <p:nvPr>
+            <p:ph type="title"/>
+          </p:nvPr>
+        </p:nvSpPr>
+        <p:spPr>
+          <a:xfrm>
+            <a:off x="311700" y="243319"/>
+            <a:ext cx="8520600" cy="572700"/>
+          </a:xfrm>
+        </p:spPr>
+        <p:txBody>
+          <a:bodyPr/>
+          <a:lstStyle/>
+          <a:p>
+            <a:r>
+              <a:rPr lang="en-US" b="1" dirty="0">
+                <a:effectLst>
+                  <a:outerShdw blurRad="38100" dist="38100" dir="2700000" algn="tl">
+                    <a:srgbClr val="000000">
+                      <a:alpha val="43137"/>
+                    </a:srgbClr>
+                  </a:outerShdw>
+                </a:effectLst>
+              </a:rPr>
+              <a:t>Use Cases: Authorization (SSO)</a:t>
+            </a:r>
+            <a:endParaRPr lang="ru-RU" b="1" dirty="0">
+              <a:effectLst>
+                <a:outerShdw blurRad="38100" dist="38100" dir="2700000" algn="tl">
+                  <a:srgbClr val="000000">
+                    <a:alpha val="43137"/>
+                  </a:srgbClr>
+                </a:outerShdw>
+              </a:effectLst>
+            </a:endParaRPr>
+          </a:p>
+        </p:txBody>
+      </p:sp>
+      <p:sp>
+        <p:nvSpPr>
+          <p:cNvPr id="3" name="Номер слайда 2">
+            <a:extLst>
+              <a:ext uri="{FF2B5EF4-FFF2-40B4-BE49-F238E27FC236}">
+                <a16:creationId xmlns:a16="http://schemas.microsoft.com/office/drawing/2014/main" id="{09FB8480-1FB4-49A4-B531-A9B589ECD31D}"/>
+              </a:ext>
+            </a:extLst>
+          </p:cNvPr>
+          <p:cNvSpPr>
+            <a:spLocks noGrp="1"/>
+          </p:cNvSpPr>
+          <p:nvPr>
+            <p:ph type="sldNum" idx="12"/>
+          </p:nvPr>
+        </p:nvSpPr>
+        <p:spPr/>
+        <p:txBody>
+          <a:bodyPr/>
+          <a:lstStyle/>
+          <a:p>
+            <a:pPr marL="0" lvl="0" indent="0" algn="r" rtl="0">
+              <a:spcBef>
+                <a:spcPts val="0"/>
+              </a:spcBef>
+              <a:spcAft>
+                <a:spcPts val="0"/>
+              </a:spcAft>
+              <a:buNone/>
+            </a:pPr>
+            <a:fld id="{00000000-1234-1234-1234-123412341234}" type="slidenum">
+              <a:rPr lang="en-GB" smtClean="0"/>
+              <a:t>19</a:t>
+            </a:fld>
+            <a:endParaRPr lang="en-GB"/>
+          </a:p>
+        </p:txBody>
+      </p:sp>
+      <p:pic>
+        <p:nvPicPr>
+          <p:cNvPr id="8194" name="Picture 2" descr="UC Authorization">
+            <a:extLst>
+              <a:ext uri="{FF2B5EF4-FFF2-40B4-BE49-F238E27FC236}">
+                <a16:creationId xmlns:a16="http://schemas.microsoft.com/office/drawing/2014/main" id="{7D28B00A-004C-4E41-880C-3BCEA35E704D}"/>
+              </a:ext>
+            </a:extLst>
+          </p:cNvPr>
+          <p:cNvPicPr>
+            <a:picLocks noChangeAspect="1" noChangeArrowheads="1"/>
+          </p:cNvPicPr>
+          <p:nvPr/>
+        </p:nvPicPr>
+        <p:blipFill>
+          <a:blip r:embed="rId2">
+            <a:extLst>
+              <a:ext uri="{28A0092B-C50C-407E-A947-70E740481C1C}">
+                <a14:useLocalDpi xmlns:a14="http://schemas.microsoft.com/office/drawing/2010/main" val="0"/>
+              </a:ext>
+            </a:extLst>
+          </a:blip>
+          <a:srcRect/>
+          <a:stretch>
+            <a:fillRect/>
+          </a:stretch>
+        </p:blipFill>
+        <p:spPr bwMode="auto">
+          <a:xfrm>
+            <a:off x="1600199" y="1238229"/>
+            <a:ext cx="5515535" cy="3187815"/>
+          </a:xfrm>
+          <a:prstGeom prst="rect">
+            <a:avLst/>
+          </a:prstGeom>
+          <a:noFill/>
+          <a:extLst>
+            <a:ext uri="{909E8E84-426E-40DD-AFC4-6F175D3DCCD1}">
+              <a14:hiddenFill xmlns:a14="http://schemas.microsoft.com/office/drawing/2010/main">
+                <a:solidFill>
+                  <a:srgbClr val="FFFFFF"/>
+                </a:solidFill>
+              </a14:hiddenFill>
+            </a:ext>
+          </a:extLst>
+        </p:spPr>
+      </p:pic>
+    </p:spTree>
+    <p:extLst>
+      <p:ext uri="{BB962C8B-B14F-4D97-AF65-F5344CB8AC3E}">
+        <p14:creationId xmlns:p14="http://schemas.microsoft.com/office/powerpoint/2010/main" val="853089160"/>
+      </p:ext>
+    </p:extLst>
+  </p:cSld>
+  <p:clrMapOvr>
+    <a:masterClrMapping/>
+  </p:clrMapOvr>
+</p:sld>
+</file>
+
 <file path=ppt/slides/slide2.xml><?xml version="1.0" encoding="utf-8"?>
 <p:sld xmlns:a="http://schemas.openxmlformats.org/drawingml/2006/main" xmlns:r="http://schemas.openxmlformats.org/officeDocument/2006/relationships" xmlns:p="http://schemas.openxmlformats.org/presentationml/2006/main">
   <p:cSld>
@@ -10096,7 +9960,7 @@
                   <a:schemeClr val="dk1"/>
                 </a:solidFill>
               </a:rPr>
-              <a:t>The product is a platform for deploying, managing, and scaling machine learning models in production. It offers a secure, flexible environment for automating ML tasks like model versioning, routing, and monitoring. With Kubernetes integration and containerization support, it's designed for developers, ML engineers, and enterprises needing scalable, resilient ML infrastructure.</a:t>
+              <a:t>The product is a platform for deploying, managing, and scaling machine learning models in production. It offers a secure, flexible environment for automating ML tasks like model versioning, routing, and monitoring. With Kubernetes integration and containerization support, it's designed for developers, ML engineers, and enterprises needing scalable, reliable ML infrastructure.</a:t>
             </a:r>
           </a:p>
           <a:p>
@@ -10241,14 +10105,21 @@
             <a:r>
               <a:rPr lang="en-GB" sz="1400" u="sng" dirty="0">
                 <a:solidFill>
-                  <a:schemeClr val="dk1"/>
+                  <a:schemeClr val="tx1"/>
                 </a:solidFill>
+                <a:hlinkClick r:id="rId3">
+                  <a:extLst>
+                    <a:ext uri="{A12FA001-AC4F-418D-AE19-62706E023703}">
+                      <ahyp:hlinkClr xmlns:ahyp="http://schemas.microsoft.com/office/drawing/2018/hyperlinkcolor" val="tx"/>
+                    </a:ext>
+                  </a:extLst>
+                </a:hlinkClick>
               </a:rPr>
               <a:t>https://github.com/fanglores/Advanced-Software-Design</a:t>
             </a:r>
             <a:endParaRPr sz="1400" dirty="0">
               <a:solidFill>
-                <a:schemeClr val="dk1"/>
+                <a:schemeClr val="tx1"/>
               </a:solidFill>
             </a:endParaRPr>
           </a:p>
@@ -10283,6 +10154,13 @@
                 <a:solidFill>
                   <a:schemeClr val="dk1"/>
                 </a:solidFill>
+                <a:hlinkClick r:id="rId4">
+                  <a:extLst>
+                    <a:ext uri="{A12FA001-AC4F-418D-AE19-62706E023703}">
+                      <ahyp:hlinkClr xmlns:ahyp="http://schemas.microsoft.com/office/drawing/2018/hyperlinkcolor" val="tx"/>
+                    </a:ext>
+                  </a:extLst>
+                </a:hlinkClick>
               </a:rPr>
               <a:t>https://github.com/fanglores/Advanced-Software-Design</a:t>
             </a:r>
@@ -10291,6 +10169,13 @@
                 <a:solidFill>
                   <a:schemeClr val="dk1"/>
                 </a:solidFill>
+                <a:hlinkClick r:id="rId4">
+                  <a:extLst>
+                    <a:ext uri="{A12FA001-AC4F-418D-AE19-62706E023703}">
+                      <ahyp:hlinkClr xmlns:ahyp="http://schemas.microsoft.com/office/drawing/2018/hyperlinkcolor" val="tx"/>
+                    </a:ext>
+                  </a:extLst>
+                </a:hlinkClick>
               </a:rPr>
             </a:br>
             <a:r>
@@ -10298,6 +10183,13 @@
                 <a:solidFill>
                   <a:schemeClr val="dk1"/>
                 </a:solidFill>
+                <a:hlinkClick r:id="rId4">
+                  <a:extLst>
+                    <a:ext uri="{A12FA001-AC4F-418D-AE19-62706E023703}">
+                      <ahyp:hlinkClr xmlns:ahyp="http://schemas.microsoft.com/office/drawing/2018/hyperlinkcolor" val="tx"/>
+                    </a:ext>
+                  </a:extLst>
+                </a:hlinkClick>
               </a:rPr>
               <a:t>		</a:t>
             </a:r>
@@ -10306,6 +10198,13 @@
                 <a:solidFill>
                   <a:schemeClr val="dk1"/>
                 </a:solidFill>
+                <a:hlinkClick r:id="rId4">
+                  <a:extLst>
+                    <a:ext uri="{A12FA001-AC4F-418D-AE19-62706E023703}">
+                      <ahyp:hlinkClr xmlns:ahyp="http://schemas.microsoft.com/office/drawing/2018/hyperlinkcolor" val="tx"/>
+                    </a:ext>
+                  </a:extLst>
+                </a:hlinkClick>
               </a:rPr>
               <a:t>/blob/master/Practice%20Tasks/</a:t>
             </a:r>
@@ -10314,6 +10213,13 @@
                 <a:solidFill>
                   <a:schemeClr val="dk1"/>
                 </a:solidFill>
+                <a:hlinkClick r:id="rId4">
+                  <a:extLst>
+                    <a:ext uri="{A12FA001-AC4F-418D-AE19-62706E023703}">
+                      <ahyp:hlinkClr xmlns:ahyp="http://schemas.microsoft.com/office/drawing/2018/hyperlinkcolor" val="tx"/>
+                    </a:ext>
+                  </a:extLst>
+                </a:hlinkClick>
               </a:rPr>
               <a:t>Final_Task</a:t>
             </a:r>
@@ -10322,10 +10228,17 @@
                 <a:solidFill>
                   <a:schemeClr val="dk1"/>
                 </a:solidFill>
+                <a:hlinkClick r:id="rId4">
+                  <a:extLst>
+                    <a:ext uri="{A12FA001-AC4F-418D-AE19-62706E023703}">
+                      <ahyp:hlinkClr xmlns:ahyp="http://schemas.microsoft.com/office/drawing/2018/hyperlinkcolor" val="tx"/>
+                    </a:ext>
+                  </a:extLst>
+                </a:hlinkClick>
               </a:rPr>
-              <a:t>/K8C_FinalTask1_(Task7).pdf</a:t>
+              <a:t>/K8C_FinalTask1_(Task8).pdf</a:t>
             </a:r>
-            <a:endParaRPr sz="1400" dirty="0">
+            <a:endParaRPr sz="1400" u="sng" dirty="0">
               <a:solidFill>
                 <a:schemeClr val="dk1"/>
               </a:solidFill>
@@ -10385,171 +10298,6 @@
 </file>
 
 <file path=ppt/slides/slide20.xml><?xml version="1.0" encoding="utf-8"?>
-<p:sld xmlns:a="http://schemas.openxmlformats.org/drawingml/2006/main" xmlns:r="http://schemas.openxmlformats.org/officeDocument/2006/relationships" xmlns:p="http://schemas.openxmlformats.org/presentationml/2006/main">
-  <p:cSld>
-    <p:spTree>
-      <p:nvGrpSpPr>
-        <p:cNvPr id="1" name=""/>
-        <p:cNvGrpSpPr/>
-        <p:nvPr/>
-      </p:nvGrpSpPr>
-      <p:grpSpPr>
-        <a:xfrm>
-          <a:off x="0" y="0"/>
-          <a:ext cx="0" cy="0"/>
-          <a:chOff x="0" y="0"/>
-          <a:chExt cx="0" cy="0"/>
-        </a:xfrm>
-      </p:grpSpPr>
-      <p:sp>
-        <p:nvSpPr>
-          <p:cNvPr id="2" name="Заголовок 1">
-            <a:extLst>
-              <a:ext uri="{FF2B5EF4-FFF2-40B4-BE49-F238E27FC236}">
-                <a16:creationId xmlns:a16="http://schemas.microsoft.com/office/drawing/2014/main" id="{BF8EE9D0-0305-4DAD-A8A5-E3E71B917267}"/>
-              </a:ext>
-            </a:extLst>
-          </p:cNvPr>
-          <p:cNvSpPr>
-            <a:spLocks noGrp="1"/>
-          </p:cNvSpPr>
-          <p:nvPr>
-            <p:ph type="title"/>
-          </p:nvPr>
-        </p:nvSpPr>
-        <p:spPr>
-          <a:xfrm>
-            <a:off x="311700" y="243319"/>
-            <a:ext cx="8520600" cy="572700"/>
-          </a:xfrm>
-        </p:spPr>
-        <p:txBody>
-          <a:bodyPr/>
-          <a:lstStyle/>
-          <a:p>
-            <a:r>
-              <a:rPr lang="en-US" b="1" dirty="0">
-                <a:effectLst>
-                  <a:outerShdw blurRad="38100" dist="38100" dir="2700000" algn="tl">
-                    <a:srgbClr val="000000">
-                      <a:alpha val="43137"/>
-                    </a:srgbClr>
-                  </a:outerShdw>
-                </a:effectLst>
-              </a:rPr>
-              <a:t>Use Cases: Authorization (SSO)</a:t>
-            </a:r>
-            <a:endParaRPr lang="ru-RU" b="1" dirty="0">
-              <a:effectLst>
-                <a:outerShdw blurRad="38100" dist="38100" dir="2700000" algn="tl">
-                  <a:srgbClr val="000000">
-                    <a:alpha val="43137"/>
-                  </a:srgbClr>
-                </a:outerShdw>
-              </a:effectLst>
-            </a:endParaRPr>
-          </a:p>
-        </p:txBody>
-      </p:sp>
-      <p:sp>
-        <p:nvSpPr>
-          <p:cNvPr id="3" name="Номер слайда 2">
-            <a:extLst>
-              <a:ext uri="{FF2B5EF4-FFF2-40B4-BE49-F238E27FC236}">
-                <a16:creationId xmlns:a16="http://schemas.microsoft.com/office/drawing/2014/main" id="{09FB8480-1FB4-49A4-B531-A9B589ECD31D}"/>
-              </a:ext>
-            </a:extLst>
-          </p:cNvPr>
-          <p:cNvSpPr>
-            <a:spLocks noGrp="1"/>
-          </p:cNvSpPr>
-          <p:nvPr>
-            <p:ph type="sldNum" idx="12"/>
-          </p:nvPr>
-        </p:nvSpPr>
-        <p:spPr/>
-        <p:txBody>
-          <a:bodyPr/>
-          <a:lstStyle/>
-          <a:p>
-            <a:pPr marL="0" lvl="0" indent="0" algn="r" rtl="0">
-              <a:spcBef>
-                <a:spcPts val="0"/>
-              </a:spcBef>
-              <a:spcAft>
-                <a:spcPts val="0"/>
-              </a:spcAft>
-              <a:buNone/>
-            </a:pPr>
-            <a:fld id="{00000000-1234-1234-1234-123412341234}" type="slidenum">
-              <a:rPr lang="en-GB" smtClean="0"/>
-              <a:t>20</a:t>
-            </a:fld>
-            <a:endParaRPr lang="en-GB"/>
-          </a:p>
-        </p:txBody>
-      </p:sp>
-      <p:pic>
-        <p:nvPicPr>
-          <p:cNvPr id="8194" name="Picture 2" descr="UC Authorization">
-            <a:extLst>
-              <a:ext uri="{FF2B5EF4-FFF2-40B4-BE49-F238E27FC236}">
-                <a16:creationId xmlns:a16="http://schemas.microsoft.com/office/drawing/2014/main" id="{7D28B00A-004C-4E41-880C-3BCEA35E704D}"/>
-              </a:ext>
-            </a:extLst>
-          </p:cNvPr>
-          <p:cNvPicPr>
-            <a:picLocks noChangeAspect="1" noChangeArrowheads="1"/>
-          </p:cNvPicPr>
-          <p:nvPr/>
-        </p:nvPicPr>
-        <p:blipFill>
-          <a:blip r:embed="rId2">
-            <a:extLst>
-              <a:ext uri="{28A0092B-C50C-407E-A947-70E740481C1C}">
-                <a14:useLocalDpi xmlns:a14="http://schemas.microsoft.com/office/drawing/2010/main" val="0"/>
-              </a:ext>
-            </a:extLst>
-          </a:blip>
-          <a:srcRect/>
-          <a:stretch>
-            <a:fillRect/>
-          </a:stretch>
-        </p:blipFill>
-        <p:spPr bwMode="auto">
-          <a:xfrm>
-            <a:off x="1600199" y="1238229"/>
-            <a:ext cx="5515535" cy="3187815"/>
-          </a:xfrm>
-          <a:prstGeom prst="rect">
-            <a:avLst/>
-          </a:prstGeom>
-          <a:noFill/>
-          <a:extLst>
-            <a:ext uri="{909E8E84-426E-40DD-AFC4-6F175D3DCCD1}">
-              <a14:hiddenFill xmlns:a14="http://schemas.microsoft.com/office/drawing/2010/main">
-                <a:solidFill>
-                  <a:srgbClr val="FFFFFF"/>
-                </a:solidFill>
-              </a14:hiddenFill>
-            </a:ext>
-          </a:extLst>
-        </p:spPr>
-      </p:pic>
-    </p:spTree>
-    <p:extLst>
-      <p:ext uri="{BB962C8B-B14F-4D97-AF65-F5344CB8AC3E}">
-        <p14:creationId xmlns:p14="http://schemas.microsoft.com/office/powerpoint/2010/main" val="853089160"/>
-      </p:ext>
-    </p:extLst>
-  </p:cSld>
-  <p:clrMapOvr>
-    <a:masterClrMapping/>
-  </p:clrMapOvr>
-</p:sld>
-</file>
-
-<file path=ppt/slides/slide21.xml><?xml version="1.0" encoding="utf-8"?>
 <p:sld xmlns:a="http://schemas.openxmlformats.org/drawingml/2006/main" xmlns:r="http://schemas.openxmlformats.org/officeDocument/2006/relationships" xmlns:p="http://schemas.openxmlformats.org/presentationml/2006/main">
   <p:cSld>
     <p:spTree>
@@ -10657,7 +10405,7 @@
             </a:pPr>
             <a:fld id="{00000000-1234-1234-1234-123412341234}" type="slidenum">
               <a:rPr lang="en-GB" smtClean="0"/>
-              <a:t>21</a:t>
+              <a:t>20</a:t>
             </a:fld>
             <a:endParaRPr lang="en-GB"/>
           </a:p>
@@ -10723,7 +10471,7 @@
 </p:sld>
 </file>
 
-<file path=ppt/slides/slide22.xml><?xml version="1.0" encoding="utf-8"?>
+<file path=ppt/slides/slide21.xml><?xml version="1.0" encoding="utf-8"?>
 <p:sld xmlns:a="http://schemas.openxmlformats.org/drawingml/2006/main" xmlns:r="http://schemas.openxmlformats.org/officeDocument/2006/relationships" xmlns:p="http://schemas.openxmlformats.org/presentationml/2006/main">
   <p:cSld>
     <p:spTree>
@@ -10822,7 +10570,7 @@
             </a:pPr>
             <a:fld id="{00000000-1234-1234-1234-123412341234}" type="slidenum">
               <a:rPr lang="en-GB" smtClean="0"/>
-              <a:t>22</a:t>
+              <a:t>21</a:t>
             </a:fld>
             <a:endParaRPr lang="en-GB"/>
           </a:p>
@@ -10888,7 +10636,7 @@
 </p:sld>
 </file>
 
-<file path=ppt/slides/slide23.xml><?xml version="1.0" encoding="utf-8"?>
+<file path=ppt/slides/slide22.xml><?xml version="1.0" encoding="utf-8"?>
 <p:sld xmlns:a="http://schemas.openxmlformats.org/drawingml/2006/main" xmlns:r="http://schemas.openxmlformats.org/officeDocument/2006/relationships" xmlns:p="http://schemas.openxmlformats.org/presentationml/2006/main">
   <p:cSld>
     <p:spTree>
@@ -10987,7 +10735,7 @@
             </a:pPr>
             <a:fld id="{00000000-1234-1234-1234-123412341234}" type="slidenum">
               <a:rPr lang="en-GB" smtClean="0"/>
-              <a:t>23</a:t>
+              <a:t>22</a:t>
             </a:fld>
             <a:endParaRPr lang="en-GB"/>
           </a:p>
@@ -11053,7 +10801,7 @@
 </p:sld>
 </file>
 
-<file path=ppt/slides/slide24.xml><?xml version="1.0" encoding="utf-8"?>
+<file path=ppt/slides/slide23.xml><?xml version="1.0" encoding="utf-8"?>
 <p:sld xmlns:a="http://schemas.openxmlformats.org/drawingml/2006/main" xmlns:r="http://schemas.openxmlformats.org/officeDocument/2006/relationships" xmlns:p="http://schemas.openxmlformats.org/presentationml/2006/main">
   <p:cSld>
     <p:spTree>
@@ -11152,7 +10900,7 @@
             </a:pPr>
             <a:fld id="{00000000-1234-1234-1234-123412341234}" type="slidenum">
               <a:rPr lang="en-GB" smtClean="0"/>
-              <a:t>24</a:t>
+              <a:t>23</a:t>
             </a:fld>
             <a:endParaRPr lang="en-GB"/>
           </a:p>
@@ -11218,7 +10966,7 @@
 </p:sld>
 </file>
 
-<file path=ppt/slides/slide25.xml><?xml version="1.0" encoding="utf-8"?>
+<file path=ppt/slides/slide24.xml><?xml version="1.0" encoding="utf-8"?>
 <p:sld xmlns:a="http://schemas.openxmlformats.org/drawingml/2006/main" xmlns:r="http://schemas.openxmlformats.org/officeDocument/2006/relationships" xmlns:p="http://schemas.openxmlformats.org/presentationml/2006/main">
   <p:cSld>
     <p:spTree>
@@ -11317,7 +11065,7 @@
             </a:pPr>
             <a:fld id="{00000000-1234-1234-1234-123412341234}" type="slidenum">
               <a:rPr lang="en-GB" smtClean="0"/>
-              <a:t>25</a:t>
+              <a:t>24</a:t>
             </a:fld>
             <a:endParaRPr lang="en-GB"/>
           </a:p>
@@ -11383,7 +11131,7 @@
 </p:sld>
 </file>
 
-<file path=ppt/slides/slide26.xml><?xml version="1.0" encoding="utf-8"?>
+<file path=ppt/slides/slide25.xml><?xml version="1.0" encoding="utf-8"?>
 <p:sld xmlns:a="http://schemas.openxmlformats.org/drawingml/2006/main" xmlns:r="http://schemas.openxmlformats.org/officeDocument/2006/relationships" xmlns:p="http://schemas.openxmlformats.org/presentationml/2006/main">
   <p:cSld>
     <p:spTree>
@@ -11482,7 +11230,7 @@
             </a:pPr>
             <a:fld id="{00000000-1234-1234-1234-123412341234}" type="slidenum">
               <a:rPr lang="en-GB" smtClean="0"/>
-              <a:t>26</a:t>
+              <a:t>25</a:t>
             </a:fld>
             <a:endParaRPr lang="en-GB"/>
           </a:p>
@@ -11553,1344 +11301,6 @@
   <p:cSld>
     <p:spTree>
       <p:nvGrpSpPr>
-        <p:cNvPr id="1" name=""/>
-        <p:cNvGrpSpPr/>
-        <p:nvPr/>
-      </p:nvGrpSpPr>
-      <p:grpSpPr>
-        <a:xfrm>
-          <a:off x="0" y="0"/>
-          <a:ext cx="0" cy="0"/>
-          <a:chOff x="0" y="0"/>
-          <a:chExt cx="0" cy="0"/>
-        </a:xfrm>
-      </p:grpSpPr>
-      <p:sp>
-        <p:nvSpPr>
-          <p:cNvPr id="3" name="Текст 2">
-            <a:extLst>
-              <a:ext uri="{FF2B5EF4-FFF2-40B4-BE49-F238E27FC236}">
-                <a16:creationId xmlns:a16="http://schemas.microsoft.com/office/drawing/2014/main" id="{73D9E495-74CF-49FC-8FE9-9E20997A0616}"/>
-              </a:ext>
-            </a:extLst>
-          </p:cNvPr>
-          <p:cNvSpPr>
-            <a:spLocks noGrp="1"/>
-          </p:cNvSpPr>
-          <p:nvPr>
-            <p:ph type="body" idx="1"/>
-          </p:nvPr>
-        </p:nvSpPr>
-        <p:spPr>
-          <a:xfrm>
-            <a:off x="311701" y="863550"/>
-            <a:ext cx="4051870" cy="2249444"/>
-          </a:xfrm>
-        </p:spPr>
-        <p:txBody>
-          <a:bodyPr/>
-          <a:lstStyle/>
-          <a:p>
-            <a:pPr marL="139700" indent="0">
-              <a:buNone/>
-            </a:pPr>
-            <a:r>
-              <a:rPr lang="en-US" b="1" dirty="0">
-                <a:solidFill>
-                  <a:schemeClr val="tx1"/>
-                </a:solidFill>
-              </a:rPr>
-              <a:t>ML Engineer (Maria, 32 years old)</a:t>
-            </a:r>
-          </a:p>
-          <a:p>
-            <a:pPr marL="139700" indent="0">
-              <a:buNone/>
-            </a:pPr>
-            <a:br>
-              <a:rPr lang="en-US" dirty="0">
-                <a:solidFill>
-                  <a:schemeClr val="tx1"/>
-                </a:solidFill>
-              </a:rPr>
-            </a:br>
-            <a:r>
-              <a:rPr lang="en-US" b="1" dirty="0">
-                <a:solidFill>
-                  <a:schemeClr val="tx1"/>
-                </a:solidFill>
-              </a:rPr>
-              <a:t>Goals:</a:t>
-            </a:r>
-            <a:endParaRPr lang="en-US" dirty="0">
-              <a:solidFill>
-                <a:schemeClr val="tx1"/>
-              </a:solidFill>
-            </a:endParaRPr>
-          </a:p>
-          <a:p>
-            <a:pPr>
-              <a:buFont typeface="Arial" panose="020B0604020202020204" pitchFamily="34" charset="0"/>
-              <a:buChar char="•"/>
-            </a:pPr>
-            <a:r>
-              <a:rPr lang="en-US" dirty="0">
-                <a:solidFill>
-                  <a:schemeClr val="tx1"/>
-                </a:solidFill>
-              </a:rPr>
-              <a:t>Deploy and version ML models in Kubernetes.</a:t>
-            </a:r>
-          </a:p>
-          <a:p>
-            <a:pPr>
-              <a:buFont typeface="Arial" panose="020B0604020202020204" pitchFamily="34" charset="0"/>
-              <a:buChar char="•"/>
-            </a:pPr>
-            <a:r>
-              <a:rPr lang="en-US" dirty="0">
-                <a:solidFill>
-                  <a:schemeClr val="tx1"/>
-                </a:solidFill>
-              </a:rPr>
-              <a:t>Automatic API documentation and request validation.</a:t>
-            </a:r>
-          </a:p>
-          <a:p>
-            <a:pPr>
-              <a:buFont typeface="Arial" panose="020B0604020202020204" pitchFamily="34" charset="0"/>
-              <a:buChar char="•"/>
-            </a:pPr>
-            <a:r>
-              <a:rPr lang="en-US" dirty="0">
-                <a:solidFill>
-                  <a:schemeClr val="tx1"/>
-                </a:solidFill>
-              </a:rPr>
-              <a:t>Flexibility for different ML frameworks.</a:t>
-            </a:r>
-          </a:p>
-        </p:txBody>
-      </p:sp>
-      <p:sp>
-        <p:nvSpPr>
-          <p:cNvPr id="7" name="Google Shape;66;p15">
-            <a:extLst>
-              <a:ext uri="{FF2B5EF4-FFF2-40B4-BE49-F238E27FC236}">
-                <a16:creationId xmlns:a16="http://schemas.microsoft.com/office/drawing/2014/main" id="{A2B7074F-A1D8-444B-9DA8-BFF70B4A2A8A}"/>
-              </a:ext>
-            </a:extLst>
-          </p:cNvPr>
-          <p:cNvSpPr txBox="1">
-            <a:spLocks/>
-          </p:cNvSpPr>
-          <p:nvPr/>
-        </p:nvSpPr>
-        <p:spPr>
-          <a:xfrm>
-            <a:off x="252575" y="140425"/>
-            <a:ext cx="8520600" cy="572700"/>
-          </a:xfrm>
-          <a:prstGeom prst="rect">
-            <a:avLst/>
-          </a:prstGeom>
-          <a:noFill/>
-          <a:ln>
-            <a:noFill/>
-          </a:ln>
-        </p:spPr>
-        <p:txBody>
-          <a:bodyPr spcFirstLastPara="1" wrap="square" lIns="91425" tIns="91425" rIns="91425" bIns="91425" anchor="t" anchorCtr="0">
-            <a:noAutofit/>
-          </a:bodyPr>
-          <a:lstStyle>
-            <a:defPPr marR="0" lvl="0" algn="l" rtl="0">
-              <a:lnSpc>
-                <a:spcPct val="100000"/>
-              </a:lnSpc>
-              <a:spcBef>
-                <a:spcPts val="0"/>
-              </a:spcBef>
-              <a:spcAft>
-                <a:spcPts val="0"/>
-              </a:spcAft>
-            </a:defPPr>
-            <a:lvl1pPr marR="0" lvl="0" algn="l" rtl="0">
-              <a:lnSpc>
-                <a:spcPct val="100000"/>
-              </a:lnSpc>
-              <a:spcBef>
-                <a:spcPts val="0"/>
-              </a:spcBef>
-              <a:spcAft>
-                <a:spcPts val="0"/>
-              </a:spcAft>
-              <a:buClr>
-                <a:schemeClr val="dk1"/>
-              </a:buClr>
-              <a:buSzPts val="2800"/>
-              <a:buFont typeface="Arial"/>
-              <a:buNone/>
-              <a:defRPr sz="2800" b="0" i="0" u="none" strike="noStrike" cap="none">
-                <a:solidFill>
-                  <a:schemeClr val="dk1"/>
-                </a:solidFill>
-                <a:latin typeface="Arial"/>
-                <a:ea typeface="Arial"/>
-                <a:cs typeface="Arial"/>
-                <a:sym typeface="Arial"/>
-              </a:defRPr>
-            </a:lvl1pPr>
-            <a:lvl2pPr marR="0" lvl="1" algn="l" rtl="0">
-              <a:lnSpc>
-                <a:spcPct val="100000"/>
-              </a:lnSpc>
-              <a:spcBef>
-                <a:spcPts val="0"/>
-              </a:spcBef>
-              <a:spcAft>
-                <a:spcPts val="0"/>
-              </a:spcAft>
-              <a:buClr>
-                <a:schemeClr val="dk1"/>
-              </a:buClr>
-              <a:buSzPts val="2800"/>
-              <a:buFont typeface="Arial"/>
-              <a:buNone/>
-              <a:defRPr sz="2800" b="0" i="0" u="none" strike="noStrike" cap="none">
-                <a:solidFill>
-                  <a:schemeClr val="dk1"/>
-                </a:solidFill>
-                <a:latin typeface="Arial"/>
-                <a:ea typeface="Arial"/>
-                <a:cs typeface="Arial"/>
-                <a:sym typeface="Arial"/>
-              </a:defRPr>
-            </a:lvl2pPr>
-            <a:lvl3pPr marR="0" lvl="2" algn="l" rtl="0">
-              <a:lnSpc>
-                <a:spcPct val="100000"/>
-              </a:lnSpc>
-              <a:spcBef>
-                <a:spcPts val="0"/>
-              </a:spcBef>
-              <a:spcAft>
-                <a:spcPts val="0"/>
-              </a:spcAft>
-              <a:buClr>
-                <a:schemeClr val="dk1"/>
-              </a:buClr>
-              <a:buSzPts val="2800"/>
-              <a:buFont typeface="Arial"/>
-              <a:buNone/>
-              <a:defRPr sz="2800" b="0" i="0" u="none" strike="noStrike" cap="none">
-                <a:solidFill>
-                  <a:schemeClr val="dk1"/>
-                </a:solidFill>
-                <a:latin typeface="Arial"/>
-                <a:ea typeface="Arial"/>
-                <a:cs typeface="Arial"/>
-                <a:sym typeface="Arial"/>
-              </a:defRPr>
-            </a:lvl3pPr>
-            <a:lvl4pPr marR="0" lvl="3" algn="l" rtl="0">
-              <a:lnSpc>
-                <a:spcPct val="100000"/>
-              </a:lnSpc>
-              <a:spcBef>
-                <a:spcPts val="0"/>
-              </a:spcBef>
-              <a:spcAft>
-                <a:spcPts val="0"/>
-              </a:spcAft>
-              <a:buClr>
-                <a:schemeClr val="dk1"/>
-              </a:buClr>
-              <a:buSzPts val="2800"/>
-              <a:buFont typeface="Arial"/>
-              <a:buNone/>
-              <a:defRPr sz="2800" b="0" i="0" u="none" strike="noStrike" cap="none">
-                <a:solidFill>
-                  <a:schemeClr val="dk1"/>
-                </a:solidFill>
-                <a:latin typeface="Arial"/>
-                <a:ea typeface="Arial"/>
-                <a:cs typeface="Arial"/>
-                <a:sym typeface="Arial"/>
-              </a:defRPr>
-            </a:lvl4pPr>
-            <a:lvl5pPr marR="0" lvl="4" algn="l" rtl="0">
-              <a:lnSpc>
-                <a:spcPct val="100000"/>
-              </a:lnSpc>
-              <a:spcBef>
-                <a:spcPts val="0"/>
-              </a:spcBef>
-              <a:spcAft>
-                <a:spcPts val="0"/>
-              </a:spcAft>
-              <a:buClr>
-                <a:schemeClr val="dk1"/>
-              </a:buClr>
-              <a:buSzPts val="2800"/>
-              <a:buFont typeface="Arial"/>
-              <a:buNone/>
-              <a:defRPr sz="2800" b="0" i="0" u="none" strike="noStrike" cap="none">
-                <a:solidFill>
-                  <a:schemeClr val="dk1"/>
-                </a:solidFill>
-                <a:latin typeface="Arial"/>
-                <a:ea typeface="Arial"/>
-                <a:cs typeface="Arial"/>
-                <a:sym typeface="Arial"/>
-              </a:defRPr>
-            </a:lvl5pPr>
-            <a:lvl6pPr marR="0" lvl="5" algn="l" rtl="0">
-              <a:lnSpc>
-                <a:spcPct val="100000"/>
-              </a:lnSpc>
-              <a:spcBef>
-                <a:spcPts val="0"/>
-              </a:spcBef>
-              <a:spcAft>
-                <a:spcPts val="0"/>
-              </a:spcAft>
-              <a:buClr>
-                <a:schemeClr val="dk1"/>
-              </a:buClr>
-              <a:buSzPts val="2800"/>
-              <a:buFont typeface="Arial"/>
-              <a:buNone/>
-              <a:defRPr sz="2800" b="0" i="0" u="none" strike="noStrike" cap="none">
-                <a:solidFill>
-                  <a:schemeClr val="dk1"/>
-                </a:solidFill>
-                <a:latin typeface="Arial"/>
-                <a:ea typeface="Arial"/>
-                <a:cs typeface="Arial"/>
-                <a:sym typeface="Arial"/>
-              </a:defRPr>
-            </a:lvl6pPr>
-            <a:lvl7pPr marR="0" lvl="6" algn="l" rtl="0">
-              <a:lnSpc>
-                <a:spcPct val="100000"/>
-              </a:lnSpc>
-              <a:spcBef>
-                <a:spcPts val="0"/>
-              </a:spcBef>
-              <a:spcAft>
-                <a:spcPts val="0"/>
-              </a:spcAft>
-              <a:buClr>
-                <a:schemeClr val="dk1"/>
-              </a:buClr>
-              <a:buSzPts val="2800"/>
-              <a:buFont typeface="Arial"/>
-              <a:buNone/>
-              <a:defRPr sz="2800" b="0" i="0" u="none" strike="noStrike" cap="none">
-                <a:solidFill>
-                  <a:schemeClr val="dk1"/>
-                </a:solidFill>
-                <a:latin typeface="Arial"/>
-                <a:ea typeface="Arial"/>
-                <a:cs typeface="Arial"/>
-                <a:sym typeface="Arial"/>
-              </a:defRPr>
-            </a:lvl7pPr>
-            <a:lvl8pPr marR="0" lvl="7" algn="l" rtl="0">
-              <a:lnSpc>
-                <a:spcPct val="100000"/>
-              </a:lnSpc>
-              <a:spcBef>
-                <a:spcPts val="0"/>
-              </a:spcBef>
-              <a:spcAft>
-                <a:spcPts val="0"/>
-              </a:spcAft>
-              <a:buClr>
-                <a:schemeClr val="dk1"/>
-              </a:buClr>
-              <a:buSzPts val="2800"/>
-              <a:buFont typeface="Arial"/>
-              <a:buNone/>
-              <a:defRPr sz="2800" b="0" i="0" u="none" strike="noStrike" cap="none">
-                <a:solidFill>
-                  <a:schemeClr val="dk1"/>
-                </a:solidFill>
-                <a:latin typeface="Arial"/>
-                <a:ea typeface="Arial"/>
-                <a:cs typeface="Arial"/>
-                <a:sym typeface="Arial"/>
-              </a:defRPr>
-            </a:lvl8pPr>
-            <a:lvl9pPr marR="0" lvl="8" algn="l" rtl="0">
-              <a:lnSpc>
-                <a:spcPct val="100000"/>
-              </a:lnSpc>
-              <a:spcBef>
-                <a:spcPts val="0"/>
-              </a:spcBef>
-              <a:spcAft>
-                <a:spcPts val="0"/>
-              </a:spcAft>
-              <a:buClr>
-                <a:schemeClr val="dk1"/>
-              </a:buClr>
-              <a:buSzPts val="2800"/>
-              <a:buFont typeface="Arial"/>
-              <a:buNone/>
-              <a:defRPr sz="2800" b="0" i="0" u="none" strike="noStrike" cap="none">
-                <a:solidFill>
-                  <a:schemeClr val="dk1"/>
-                </a:solidFill>
-                <a:latin typeface="Arial"/>
-                <a:ea typeface="Arial"/>
-                <a:cs typeface="Arial"/>
-                <a:sym typeface="Arial"/>
-              </a:defRPr>
-            </a:lvl9pPr>
-          </a:lstStyle>
-          <a:p>
-            <a:r>
-              <a:rPr lang="en-GB" b="1" dirty="0">
-                <a:effectLst>
-                  <a:outerShdw blurRad="38100" dist="38100" dir="2700000" algn="tl">
-                    <a:srgbClr val="000000">
-                      <a:alpha val="43137"/>
-                    </a:srgbClr>
-                  </a:outerShdw>
-                </a:effectLst>
-              </a:rPr>
-              <a:t>Personas</a:t>
-            </a:r>
-          </a:p>
-        </p:txBody>
-      </p:sp>
-      <p:sp>
-        <p:nvSpPr>
-          <p:cNvPr id="8" name="TextBox 7">
-            <a:extLst>
-              <a:ext uri="{FF2B5EF4-FFF2-40B4-BE49-F238E27FC236}">
-                <a16:creationId xmlns:a16="http://schemas.microsoft.com/office/drawing/2014/main" id="{4B40FD6D-82C8-48B1-A5D3-456D8792334C}"/>
-              </a:ext>
-            </a:extLst>
-          </p:cNvPr>
-          <p:cNvSpPr txBox="1"/>
-          <p:nvPr/>
-        </p:nvSpPr>
-        <p:spPr>
-          <a:xfrm>
-            <a:off x="4645958" y="863550"/>
-            <a:ext cx="4269442" cy="1384995"/>
-          </a:xfrm>
-          <a:prstGeom prst="rect">
-            <a:avLst/>
-          </a:prstGeom>
-          <a:noFill/>
-        </p:spPr>
-        <p:txBody>
-          <a:bodyPr wrap="square" rtlCol="0">
-            <a:spAutoFit/>
-          </a:bodyPr>
-          <a:lstStyle/>
-          <a:p>
-            <a:r>
-              <a:rPr lang="en-US" b="1" dirty="0">
-                <a:solidFill>
-                  <a:schemeClr val="tx1"/>
-                </a:solidFill>
-              </a:rPr>
-              <a:t>Backend Developer (Alexander, 28 years old)</a:t>
-            </a:r>
-          </a:p>
-          <a:p>
-            <a:br>
-              <a:rPr lang="en-US" dirty="0">
-                <a:solidFill>
-                  <a:schemeClr val="tx1"/>
-                </a:solidFill>
-              </a:rPr>
-            </a:br>
-            <a:r>
-              <a:rPr lang="en-US" b="1" dirty="0">
-                <a:solidFill>
-                  <a:schemeClr val="tx1"/>
-                </a:solidFill>
-              </a:rPr>
-              <a:t>Goals:</a:t>
-            </a:r>
-            <a:endParaRPr lang="en-US" dirty="0">
-              <a:solidFill>
-                <a:schemeClr val="tx1"/>
-              </a:solidFill>
-            </a:endParaRPr>
-          </a:p>
-          <a:p>
-            <a:pPr marL="285750" indent="-285750">
-              <a:buFont typeface="Arial" panose="020B0604020202020204" pitchFamily="34" charset="0"/>
-              <a:buChar char="•"/>
-            </a:pPr>
-            <a:r>
-              <a:rPr lang="en-US" dirty="0">
-                <a:solidFill>
-                  <a:schemeClr val="tx1"/>
-                </a:solidFill>
-              </a:rPr>
-              <a:t>Use automatic </a:t>
-            </a:r>
-            <a:r>
-              <a:rPr lang="en-US" dirty="0" err="1">
-                <a:solidFill>
-                  <a:schemeClr val="tx1"/>
-                </a:solidFill>
-              </a:rPr>
-              <a:t>OpenAPI</a:t>
-            </a:r>
-            <a:r>
-              <a:rPr lang="en-US" dirty="0">
-                <a:solidFill>
-                  <a:schemeClr val="tx1"/>
-                </a:solidFill>
-              </a:rPr>
-              <a:t> schema generation.</a:t>
-            </a:r>
-          </a:p>
-          <a:p>
-            <a:pPr marL="285750" indent="-285750">
-              <a:buFont typeface="Arial" panose="020B0604020202020204" pitchFamily="34" charset="0"/>
-              <a:buChar char="•"/>
-            </a:pPr>
-            <a:r>
-              <a:rPr lang="en-US" dirty="0">
-                <a:solidFill>
-                  <a:schemeClr val="tx1"/>
-                </a:solidFill>
-              </a:rPr>
-              <a:t>Easily add API endpoints with request validation and security.</a:t>
-            </a:r>
-            <a:endParaRPr lang="ru-RU" dirty="0">
-              <a:solidFill>
-                <a:schemeClr val="tx1"/>
-              </a:solidFill>
-            </a:endParaRPr>
-          </a:p>
-        </p:txBody>
-      </p:sp>
-      <p:sp>
-        <p:nvSpPr>
-          <p:cNvPr id="2" name="Slide Number Placeholder 1">
-            <a:extLst>
-              <a:ext uri="{FF2B5EF4-FFF2-40B4-BE49-F238E27FC236}">
-                <a16:creationId xmlns:a16="http://schemas.microsoft.com/office/drawing/2014/main" id="{3178EC64-B23C-4E80-AA61-FE6C102031B5}"/>
-              </a:ext>
-            </a:extLst>
-          </p:cNvPr>
-          <p:cNvSpPr>
-            <a:spLocks noGrp="1"/>
-          </p:cNvSpPr>
-          <p:nvPr>
-            <p:ph type="sldNum" idx="12"/>
-          </p:nvPr>
-        </p:nvSpPr>
-        <p:spPr/>
-        <p:txBody>
-          <a:bodyPr/>
-          <a:lstStyle/>
-          <a:p>
-            <a:pPr marL="0" lvl="0" indent="0" algn="r" rtl="0">
-              <a:spcBef>
-                <a:spcPts val="0"/>
-              </a:spcBef>
-              <a:spcAft>
-                <a:spcPts val="0"/>
-              </a:spcAft>
-              <a:buNone/>
-            </a:pPr>
-            <a:fld id="{00000000-1234-1234-1234-123412341234}" type="slidenum">
-              <a:rPr lang="en-GB" smtClean="0"/>
-              <a:t>3</a:t>
-            </a:fld>
-            <a:endParaRPr lang="en-GB"/>
-          </a:p>
-        </p:txBody>
-      </p:sp>
-      <p:sp>
-        <p:nvSpPr>
-          <p:cNvPr id="4" name="TextBox 3">
-            <a:extLst>
-              <a:ext uri="{FF2B5EF4-FFF2-40B4-BE49-F238E27FC236}">
-                <a16:creationId xmlns:a16="http://schemas.microsoft.com/office/drawing/2014/main" id="{C9F9E3DC-5FD0-4211-A132-FB1036335AD0}"/>
-              </a:ext>
-            </a:extLst>
-          </p:cNvPr>
-          <p:cNvSpPr txBox="1"/>
-          <p:nvPr/>
-        </p:nvSpPr>
-        <p:spPr>
-          <a:xfrm>
-            <a:off x="311701" y="3476065"/>
-            <a:ext cx="4051870" cy="954107"/>
-          </a:xfrm>
-          <a:prstGeom prst="rect">
-            <a:avLst/>
-          </a:prstGeom>
-          <a:noFill/>
-        </p:spPr>
-        <p:txBody>
-          <a:bodyPr wrap="square" rtlCol="0">
-            <a:spAutoFit/>
-          </a:bodyPr>
-          <a:lstStyle/>
-          <a:p>
-            <a:r>
-              <a:rPr lang="en-US" b="1" dirty="0">
-                <a:solidFill>
-                  <a:schemeClr val="tx1"/>
-                </a:solidFill>
-              </a:rPr>
-              <a:t>Pain points:</a:t>
-            </a:r>
-            <a:endParaRPr lang="en-US" dirty="0">
-              <a:solidFill>
-                <a:schemeClr val="tx1"/>
-              </a:solidFill>
-            </a:endParaRPr>
-          </a:p>
-          <a:p>
-            <a:pPr marL="285750" indent="-285750">
-              <a:buFont typeface="Arial" panose="020B0604020202020204" pitchFamily="34" charset="0"/>
-              <a:buChar char="•"/>
-            </a:pPr>
-            <a:r>
-              <a:rPr lang="en-US" dirty="0">
-                <a:solidFill>
-                  <a:schemeClr val="tx1"/>
-                </a:solidFill>
-              </a:rPr>
-              <a:t>Manual API documentation.</a:t>
-            </a:r>
-          </a:p>
-          <a:p>
-            <a:pPr marL="285750" indent="-285750">
-              <a:buFont typeface="Arial" panose="020B0604020202020204" pitchFamily="34" charset="0"/>
-              <a:buChar char="•"/>
-            </a:pPr>
-            <a:r>
-              <a:rPr lang="en-US" dirty="0">
-                <a:solidFill>
-                  <a:schemeClr val="tx1"/>
-                </a:solidFill>
-              </a:rPr>
-              <a:t>Difficulties in monitoring model performance.</a:t>
-            </a:r>
-          </a:p>
-          <a:p>
-            <a:endParaRPr lang="ru-RU" dirty="0"/>
-          </a:p>
-        </p:txBody>
-      </p:sp>
-      <p:sp>
-        <p:nvSpPr>
-          <p:cNvPr id="5" name="TextBox 4">
-            <a:extLst>
-              <a:ext uri="{FF2B5EF4-FFF2-40B4-BE49-F238E27FC236}">
-                <a16:creationId xmlns:a16="http://schemas.microsoft.com/office/drawing/2014/main" id="{1DC75561-9819-4074-8766-C1882A1161D7}"/>
-              </a:ext>
-            </a:extLst>
-          </p:cNvPr>
-          <p:cNvSpPr txBox="1"/>
-          <p:nvPr/>
-        </p:nvSpPr>
-        <p:spPr>
-          <a:xfrm>
-            <a:off x="4645959" y="3368342"/>
-            <a:ext cx="4127216" cy="1169551"/>
-          </a:xfrm>
-          <a:prstGeom prst="rect">
-            <a:avLst/>
-          </a:prstGeom>
-          <a:noFill/>
-        </p:spPr>
-        <p:txBody>
-          <a:bodyPr wrap="square" rtlCol="0">
-            <a:spAutoFit/>
-          </a:bodyPr>
-          <a:lstStyle/>
-          <a:p>
-            <a:r>
-              <a:rPr lang="en-US" b="1" dirty="0">
-                <a:solidFill>
-                  <a:schemeClr val="tx1"/>
-                </a:solidFill>
-              </a:rPr>
-              <a:t>Pain points:</a:t>
-            </a:r>
-            <a:endParaRPr lang="en-US" dirty="0">
-              <a:solidFill>
-                <a:schemeClr val="tx1"/>
-              </a:solidFill>
-            </a:endParaRPr>
-          </a:p>
-          <a:p>
-            <a:pPr marL="285750" indent="-285750">
-              <a:buFont typeface="Arial" panose="020B0604020202020204" pitchFamily="34" charset="0"/>
-              <a:buChar char="•"/>
-            </a:pPr>
-            <a:r>
-              <a:rPr lang="en-US" dirty="0">
-                <a:solidFill>
-                  <a:schemeClr val="tx1"/>
-                </a:solidFill>
-              </a:rPr>
-              <a:t>Manual API documentation.</a:t>
-            </a:r>
-          </a:p>
-          <a:p>
-            <a:pPr marL="285750" indent="-285750">
-              <a:buFont typeface="Arial" panose="020B0604020202020204" pitchFamily="34" charset="0"/>
-              <a:buChar char="•"/>
-            </a:pPr>
-            <a:r>
-              <a:rPr lang="en-US" dirty="0">
-                <a:solidFill>
-                  <a:schemeClr val="tx1"/>
-                </a:solidFill>
-              </a:rPr>
-              <a:t>Challenges with integrating authorization and managing access control.</a:t>
-            </a:r>
-          </a:p>
-          <a:p>
-            <a:endParaRPr lang="ru-RU" dirty="0"/>
-          </a:p>
-        </p:txBody>
-      </p:sp>
-    </p:spTree>
-    <p:extLst>
-      <p:ext uri="{BB962C8B-B14F-4D97-AF65-F5344CB8AC3E}">
-        <p14:creationId xmlns:p14="http://schemas.microsoft.com/office/powerpoint/2010/main" val="2021445038"/>
-      </p:ext>
-    </p:extLst>
-  </p:cSld>
-  <p:clrMapOvr>
-    <a:masterClrMapping/>
-  </p:clrMapOvr>
-</p:sld>
-</file>
-
-<file path=ppt/slides/slide4.xml><?xml version="1.0" encoding="utf-8"?>
-<p:sld xmlns:a="http://schemas.openxmlformats.org/drawingml/2006/main" xmlns:r="http://schemas.openxmlformats.org/officeDocument/2006/relationships" xmlns:p="http://schemas.openxmlformats.org/presentationml/2006/main">
-  <p:cSld>
-    <p:spTree>
-      <p:nvGrpSpPr>
-        <p:cNvPr id="1" name=""/>
-        <p:cNvGrpSpPr/>
-        <p:nvPr/>
-      </p:nvGrpSpPr>
-      <p:grpSpPr>
-        <a:xfrm>
-          <a:off x="0" y="0"/>
-          <a:ext cx="0" cy="0"/>
-          <a:chOff x="0" y="0"/>
-          <a:chExt cx="0" cy="0"/>
-        </a:xfrm>
-      </p:grpSpPr>
-      <p:sp>
-        <p:nvSpPr>
-          <p:cNvPr id="7" name="Google Shape;66;p15">
-            <a:extLst>
-              <a:ext uri="{FF2B5EF4-FFF2-40B4-BE49-F238E27FC236}">
-                <a16:creationId xmlns:a16="http://schemas.microsoft.com/office/drawing/2014/main" id="{A2B7074F-A1D8-444B-9DA8-BFF70B4A2A8A}"/>
-              </a:ext>
-            </a:extLst>
-          </p:cNvPr>
-          <p:cNvSpPr txBox="1">
-            <a:spLocks/>
-          </p:cNvSpPr>
-          <p:nvPr/>
-        </p:nvSpPr>
-        <p:spPr>
-          <a:xfrm>
-            <a:off x="252575" y="140425"/>
-            <a:ext cx="8520600" cy="572700"/>
-          </a:xfrm>
-          <a:prstGeom prst="rect">
-            <a:avLst/>
-          </a:prstGeom>
-          <a:noFill/>
-          <a:ln>
-            <a:noFill/>
-          </a:ln>
-        </p:spPr>
-        <p:txBody>
-          <a:bodyPr spcFirstLastPara="1" wrap="square" lIns="91425" tIns="91425" rIns="91425" bIns="91425" anchor="t" anchorCtr="0">
-            <a:noAutofit/>
-          </a:bodyPr>
-          <a:lstStyle>
-            <a:defPPr marR="0" lvl="0" algn="l" rtl="0">
-              <a:lnSpc>
-                <a:spcPct val="100000"/>
-              </a:lnSpc>
-              <a:spcBef>
-                <a:spcPts val="0"/>
-              </a:spcBef>
-              <a:spcAft>
-                <a:spcPts val="0"/>
-              </a:spcAft>
-            </a:defPPr>
-            <a:lvl1pPr marR="0" lvl="0" algn="l" rtl="0">
-              <a:lnSpc>
-                <a:spcPct val="100000"/>
-              </a:lnSpc>
-              <a:spcBef>
-                <a:spcPts val="0"/>
-              </a:spcBef>
-              <a:spcAft>
-                <a:spcPts val="0"/>
-              </a:spcAft>
-              <a:buClr>
-                <a:schemeClr val="dk1"/>
-              </a:buClr>
-              <a:buSzPts val="2800"/>
-              <a:buFont typeface="Arial"/>
-              <a:buNone/>
-              <a:defRPr sz="2800" b="0" i="0" u="none" strike="noStrike" cap="none">
-                <a:solidFill>
-                  <a:schemeClr val="dk1"/>
-                </a:solidFill>
-                <a:latin typeface="Arial"/>
-                <a:ea typeface="Arial"/>
-                <a:cs typeface="Arial"/>
-                <a:sym typeface="Arial"/>
-              </a:defRPr>
-            </a:lvl1pPr>
-            <a:lvl2pPr marR="0" lvl="1" algn="l" rtl="0">
-              <a:lnSpc>
-                <a:spcPct val="100000"/>
-              </a:lnSpc>
-              <a:spcBef>
-                <a:spcPts val="0"/>
-              </a:spcBef>
-              <a:spcAft>
-                <a:spcPts val="0"/>
-              </a:spcAft>
-              <a:buClr>
-                <a:schemeClr val="dk1"/>
-              </a:buClr>
-              <a:buSzPts val="2800"/>
-              <a:buFont typeface="Arial"/>
-              <a:buNone/>
-              <a:defRPr sz="2800" b="0" i="0" u="none" strike="noStrike" cap="none">
-                <a:solidFill>
-                  <a:schemeClr val="dk1"/>
-                </a:solidFill>
-                <a:latin typeface="Arial"/>
-                <a:ea typeface="Arial"/>
-                <a:cs typeface="Arial"/>
-                <a:sym typeface="Arial"/>
-              </a:defRPr>
-            </a:lvl2pPr>
-            <a:lvl3pPr marR="0" lvl="2" algn="l" rtl="0">
-              <a:lnSpc>
-                <a:spcPct val="100000"/>
-              </a:lnSpc>
-              <a:spcBef>
-                <a:spcPts val="0"/>
-              </a:spcBef>
-              <a:spcAft>
-                <a:spcPts val="0"/>
-              </a:spcAft>
-              <a:buClr>
-                <a:schemeClr val="dk1"/>
-              </a:buClr>
-              <a:buSzPts val="2800"/>
-              <a:buFont typeface="Arial"/>
-              <a:buNone/>
-              <a:defRPr sz="2800" b="0" i="0" u="none" strike="noStrike" cap="none">
-                <a:solidFill>
-                  <a:schemeClr val="dk1"/>
-                </a:solidFill>
-                <a:latin typeface="Arial"/>
-                <a:ea typeface="Arial"/>
-                <a:cs typeface="Arial"/>
-                <a:sym typeface="Arial"/>
-              </a:defRPr>
-            </a:lvl3pPr>
-            <a:lvl4pPr marR="0" lvl="3" algn="l" rtl="0">
-              <a:lnSpc>
-                <a:spcPct val="100000"/>
-              </a:lnSpc>
-              <a:spcBef>
-                <a:spcPts val="0"/>
-              </a:spcBef>
-              <a:spcAft>
-                <a:spcPts val="0"/>
-              </a:spcAft>
-              <a:buClr>
-                <a:schemeClr val="dk1"/>
-              </a:buClr>
-              <a:buSzPts val="2800"/>
-              <a:buFont typeface="Arial"/>
-              <a:buNone/>
-              <a:defRPr sz="2800" b="0" i="0" u="none" strike="noStrike" cap="none">
-                <a:solidFill>
-                  <a:schemeClr val="dk1"/>
-                </a:solidFill>
-                <a:latin typeface="Arial"/>
-                <a:ea typeface="Arial"/>
-                <a:cs typeface="Arial"/>
-                <a:sym typeface="Arial"/>
-              </a:defRPr>
-            </a:lvl4pPr>
-            <a:lvl5pPr marR="0" lvl="4" algn="l" rtl="0">
-              <a:lnSpc>
-                <a:spcPct val="100000"/>
-              </a:lnSpc>
-              <a:spcBef>
-                <a:spcPts val="0"/>
-              </a:spcBef>
-              <a:spcAft>
-                <a:spcPts val="0"/>
-              </a:spcAft>
-              <a:buClr>
-                <a:schemeClr val="dk1"/>
-              </a:buClr>
-              <a:buSzPts val="2800"/>
-              <a:buFont typeface="Arial"/>
-              <a:buNone/>
-              <a:defRPr sz="2800" b="0" i="0" u="none" strike="noStrike" cap="none">
-                <a:solidFill>
-                  <a:schemeClr val="dk1"/>
-                </a:solidFill>
-                <a:latin typeface="Arial"/>
-                <a:ea typeface="Arial"/>
-                <a:cs typeface="Arial"/>
-                <a:sym typeface="Arial"/>
-              </a:defRPr>
-            </a:lvl5pPr>
-            <a:lvl6pPr marR="0" lvl="5" algn="l" rtl="0">
-              <a:lnSpc>
-                <a:spcPct val="100000"/>
-              </a:lnSpc>
-              <a:spcBef>
-                <a:spcPts val="0"/>
-              </a:spcBef>
-              <a:spcAft>
-                <a:spcPts val="0"/>
-              </a:spcAft>
-              <a:buClr>
-                <a:schemeClr val="dk1"/>
-              </a:buClr>
-              <a:buSzPts val="2800"/>
-              <a:buFont typeface="Arial"/>
-              <a:buNone/>
-              <a:defRPr sz="2800" b="0" i="0" u="none" strike="noStrike" cap="none">
-                <a:solidFill>
-                  <a:schemeClr val="dk1"/>
-                </a:solidFill>
-                <a:latin typeface="Arial"/>
-                <a:ea typeface="Arial"/>
-                <a:cs typeface="Arial"/>
-                <a:sym typeface="Arial"/>
-              </a:defRPr>
-            </a:lvl6pPr>
-            <a:lvl7pPr marR="0" lvl="6" algn="l" rtl="0">
-              <a:lnSpc>
-                <a:spcPct val="100000"/>
-              </a:lnSpc>
-              <a:spcBef>
-                <a:spcPts val="0"/>
-              </a:spcBef>
-              <a:spcAft>
-                <a:spcPts val="0"/>
-              </a:spcAft>
-              <a:buClr>
-                <a:schemeClr val="dk1"/>
-              </a:buClr>
-              <a:buSzPts val="2800"/>
-              <a:buFont typeface="Arial"/>
-              <a:buNone/>
-              <a:defRPr sz="2800" b="0" i="0" u="none" strike="noStrike" cap="none">
-                <a:solidFill>
-                  <a:schemeClr val="dk1"/>
-                </a:solidFill>
-                <a:latin typeface="Arial"/>
-                <a:ea typeface="Arial"/>
-                <a:cs typeface="Arial"/>
-                <a:sym typeface="Arial"/>
-              </a:defRPr>
-            </a:lvl7pPr>
-            <a:lvl8pPr marR="0" lvl="7" algn="l" rtl="0">
-              <a:lnSpc>
-                <a:spcPct val="100000"/>
-              </a:lnSpc>
-              <a:spcBef>
-                <a:spcPts val="0"/>
-              </a:spcBef>
-              <a:spcAft>
-                <a:spcPts val="0"/>
-              </a:spcAft>
-              <a:buClr>
-                <a:schemeClr val="dk1"/>
-              </a:buClr>
-              <a:buSzPts val="2800"/>
-              <a:buFont typeface="Arial"/>
-              <a:buNone/>
-              <a:defRPr sz="2800" b="0" i="0" u="none" strike="noStrike" cap="none">
-                <a:solidFill>
-                  <a:schemeClr val="dk1"/>
-                </a:solidFill>
-                <a:latin typeface="Arial"/>
-                <a:ea typeface="Arial"/>
-                <a:cs typeface="Arial"/>
-                <a:sym typeface="Arial"/>
-              </a:defRPr>
-            </a:lvl8pPr>
-            <a:lvl9pPr marR="0" lvl="8" algn="l" rtl="0">
-              <a:lnSpc>
-                <a:spcPct val="100000"/>
-              </a:lnSpc>
-              <a:spcBef>
-                <a:spcPts val="0"/>
-              </a:spcBef>
-              <a:spcAft>
-                <a:spcPts val="0"/>
-              </a:spcAft>
-              <a:buClr>
-                <a:schemeClr val="dk1"/>
-              </a:buClr>
-              <a:buSzPts val="2800"/>
-              <a:buFont typeface="Arial"/>
-              <a:buNone/>
-              <a:defRPr sz="2800" b="0" i="0" u="none" strike="noStrike" cap="none">
-                <a:solidFill>
-                  <a:schemeClr val="dk1"/>
-                </a:solidFill>
-                <a:latin typeface="Arial"/>
-                <a:ea typeface="Arial"/>
-                <a:cs typeface="Arial"/>
-                <a:sym typeface="Arial"/>
-              </a:defRPr>
-            </a:lvl9pPr>
-          </a:lstStyle>
-          <a:p>
-            <a:r>
-              <a:rPr lang="en-GB" b="1" dirty="0">
-                <a:effectLst>
-                  <a:outerShdw blurRad="38100" dist="38100" dir="2700000" algn="tl">
-                    <a:srgbClr val="000000">
-                      <a:alpha val="43137"/>
-                    </a:srgbClr>
-                  </a:outerShdw>
-                </a:effectLst>
-              </a:rPr>
-              <a:t>Personas</a:t>
-            </a:r>
-          </a:p>
-        </p:txBody>
-      </p:sp>
-      <p:sp>
-        <p:nvSpPr>
-          <p:cNvPr id="8" name="TextBox 7">
-            <a:extLst>
-              <a:ext uri="{FF2B5EF4-FFF2-40B4-BE49-F238E27FC236}">
-                <a16:creationId xmlns:a16="http://schemas.microsoft.com/office/drawing/2014/main" id="{4B40FD6D-82C8-48B1-A5D3-456D8792334C}"/>
-              </a:ext>
-            </a:extLst>
-          </p:cNvPr>
-          <p:cNvSpPr txBox="1"/>
-          <p:nvPr/>
-        </p:nvSpPr>
-        <p:spPr>
-          <a:xfrm>
-            <a:off x="4740089" y="893382"/>
-            <a:ext cx="4269442" cy="1384995"/>
-          </a:xfrm>
-          <a:prstGeom prst="rect">
-            <a:avLst/>
-          </a:prstGeom>
-          <a:noFill/>
-        </p:spPr>
-        <p:txBody>
-          <a:bodyPr wrap="square" rtlCol="0">
-            <a:spAutoFit/>
-          </a:bodyPr>
-          <a:lstStyle/>
-          <a:p>
-            <a:r>
-              <a:rPr lang="en-US" b="1" dirty="0"/>
-              <a:t>Corporate Client (Yandex, </a:t>
-            </a:r>
-            <a:r>
-              <a:rPr lang="en-US" b="1" dirty="0" err="1"/>
-              <a:t>Sber</a:t>
-            </a:r>
-            <a:r>
-              <a:rPr lang="en-US" b="1" dirty="0"/>
-              <a:t>)</a:t>
-            </a:r>
-          </a:p>
-          <a:p>
-            <a:br>
-              <a:rPr lang="en-US" dirty="0"/>
-            </a:br>
-            <a:r>
-              <a:rPr lang="en-US" b="1" dirty="0"/>
-              <a:t>Goals:</a:t>
-            </a:r>
-            <a:endParaRPr lang="en-US" dirty="0"/>
-          </a:p>
-          <a:p>
-            <a:pPr marL="285750" indent="-285750">
-              <a:buFont typeface="Arial" panose="020B0604020202020204" pitchFamily="34" charset="0"/>
-              <a:buChar char="•"/>
-            </a:pPr>
-            <a:r>
-              <a:rPr lang="en-US" dirty="0"/>
-              <a:t>Scalable and secure deployment of ML models.</a:t>
-            </a:r>
-          </a:p>
-          <a:p>
-            <a:pPr marL="285750" indent="-285750">
-              <a:buFont typeface="Arial" panose="020B0604020202020204" pitchFamily="34" charset="0"/>
-              <a:buChar char="•"/>
-            </a:pPr>
-            <a:r>
-              <a:rPr lang="en-US" dirty="0"/>
-              <a:t>Integration of the API gateway into existing infrastructure.</a:t>
-            </a:r>
-          </a:p>
-        </p:txBody>
-      </p:sp>
-      <p:sp>
-        <p:nvSpPr>
-          <p:cNvPr id="2" name="TextBox 1">
-            <a:extLst>
-              <a:ext uri="{FF2B5EF4-FFF2-40B4-BE49-F238E27FC236}">
-                <a16:creationId xmlns:a16="http://schemas.microsoft.com/office/drawing/2014/main" id="{BC8183E0-B6FC-471C-B2F8-14996330AB16}"/>
-              </a:ext>
-            </a:extLst>
-          </p:cNvPr>
-          <p:cNvSpPr txBox="1"/>
-          <p:nvPr/>
-        </p:nvSpPr>
-        <p:spPr>
-          <a:xfrm>
-            <a:off x="352043" y="903891"/>
-            <a:ext cx="4051870" cy="1384995"/>
-          </a:xfrm>
-          <a:prstGeom prst="rect">
-            <a:avLst/>
-          </a:prstGeom>
-          <a:noFill/>
-        </p:spPr>
-        <p:txBody>
-          <a:bodyPr wrap="square" rtlCol="0">
-            <a:spAutoFit/>
-          </a:bodyPr>
-          <a:lstStyle/>
-          <a:p>
-            <a:r>
-              <a:rPr lang="en-US" b="1" dirty="0"/>
-              <a:t>API Consumer (Sergey, 30 years old)</a:t>
-            </a:r>
-          </a:p>
-          <a:p>
-            <a:br>
-              <a:rPr lang="en-US" dirty="0"/>
-            </a:br>
-            <a:r>
-              <a:rPr lang="en-US" b="1" dirty="0"/>
-              <a:t>Goals:</a:t>
-            </a:r>
-            <a:endParaRPr lang="en-US" dirty="0"/>
-          </a:p>
-          <a:p>
-            <a:pPr marL="285750" indent="-285750">
-              <a:buFont typeface="Arial" panose="020B0604020202020204" pitchFamily="34" charset="0"/>
-              <a:buChar char="•"/>
-            </a:pPr>
-            <a:r>
-              <a:rPr lang="en-US" dirty="0"/>
-              <a:t>Get documentation for quick access to ML models.</a:t>
-            </a:r>
-          </a:p>
-          <a:p>
-            <a:pPr marL="285750" indent="-285750">
-              <a:buFont typeface="Arial" panose="020B0604020202020204" pitchFamily="34" charset="0"/>
-              <a:buChar char="•"/>
-            </a:pPr>
-            <a:r>
-              <a:rPr lang="en-US" dirty="0"/>
-              <a:t>Work with reliable and validated APIs.</a:t>
-            </a:r>
-            <a:endParaRPr lang="ru-RU" dirty="0"/>
-          </a:p>
-        </p:txBody>
-      </p:sp>
-      <p:sp>
-        <p:nvSpPr>
-          <p:cNvPr id="3" name="Slide Number Placeholder 2">
-            <a:extLst>
-              <a:ext uri="{FF2B5EF4-FFF2-40B4-BE49-F238E27FC236}">
-                <a16:creationId xmlns:a16="http://schemas.microsoft.com/office/drawing/2014/main" id="{C78D3A78-ED79-4CFE-9690-1D96304C679A}"/>
-              </a:ext>
-            </a:extLst>
-          </p:cNvPr>
-          <p:cNvSpPr>
-            <a:spLocks noGrp="1"/>
-          </p:cNvSpPr>
-          <p:nvPr>
-            <p:ph type="sldNum" idx="12"/>
-          </p:nvPr>
-        </p:nvSpPr>
-        <p:spPr/>
-        <p:txBody>
-          <a:bodyPr/>
-          <a:lstStyle/>
-          <a:p>
-            <a:pPr marL="0" lvl="0" indent="0" algn="r" rtl="0">
-              <a:spcBef>
-                <a:spcPts val="0"/>
-              </a:spcBef>
-              <a:spcAft>
-                <a:spcPts val="0"/>
-              </a:spcAft>
-              <a:buNone/>
-            </a:pPr>
-            <a:fld id="{00000000-1234-1234-1234-123412341234}" type="slidenum">
-              <a:rPr lang="en-GB" smtClean="0"/>
-              <a:t>4</a:t>
-            </a:fld>
-            <a:endParaRPr lang="en-GB"/>
-          </a:p>
-        </p:txBody>
-      </p:sp>
-      <p:sp>
-        <p:nvSpPr>
-          <p:cNvPr id="4" name="TextBox 3">
-            <a:extLst>
-              <a:ext uri="{FF2B5EF4-FFF2-40B4-BE49-F238E27FC236}">
-                <a16:creationId xmlns:a16="http://schemas.microsoft.com/office/drawing/2014/main" id="{FFDCAFA8-B478-40D2-932B-498A36B6913F}"/>
-              </a:ext>
-            </a:extLst>
-          </p:cNvPr>
-          <p:cNvSpPr txBox="1"/>
-          <p:nvPr/>
-        </p:nvSpPr>
-        <p:spPr>
-          <a:xfrm>
-            <a:off x="4861112" y="2955581"/>
-            <a:ext cx="3912063" cy="954107"/>
-          </a:xfrm>
-          <a:prstGeom prst="rect">
-            <a:avLst/>
-          </a:prstGeom>
-          <a:noFill/>
-        </p:spPr>
-        <p:txBody>
-          <a:bodyPr wrap="square" rtlCol="0">
-            <a:spAutoFit/>
-          </a:bodyPr>
-          <a:lstStyle/>
-          <a:p>
-            <a:r>
-              <a:rPr lang="en-US" b="1" dirty="0"/>
-              <a:t>Pain points:</a:t>
-            </a:r>
-            <a:endParaRPr lang="en-US" dirty="0"/>
-          </a:p>
-          <a:p>
-            <a:pPr marL="285750" indent="-285750">
-              <a:buFont typeface="Arial" panose="020B0604020202020204" pitchFamily="34" charset="0"/>
-              <a:buChar char="•"/>
-            </a:pPr>
-            <a:r>
-              <a:rPr lang="en-US" dirty="0"/>
-              <a:t>Challenges with integration and corporate standards.</a:t>
-            </a:r>
-          </a:p>
-          <a:p>
-            <a:endParaRPr lang="ru-RU" dirty="0"/>
-          </a:p>
-        </p:txBody>
-      </p:sp>
-      <p:sp>
-        <p:nvSpPr>
-          <p:cNvPr id="5" name="TextBox 4">
-            <a:extLst>
-              <a:ext uri="{FF2B5EF4-FFF2-40B4-BE49-F238E27FC236}">
-                <a16:creationId xmlns:a16="http://schemas.microsoft.com/office/drawing/2014/main" id="{8BDC0A45-240C-4BA7-909B-5DD2FA0DB4FB}"/>
-              </a:ext>
-            </a:extLst>
-          </p:cNvPr>
-          <p:cNvSpPr txBox="1"/>
-          <p:nvPr/>
-        </p:nvSpPr>
-        <p:spPr>
-          <a:xfrm>
-            <a:off x="370825" y="2955580"/>
-            <a:ext cx="3912063" cy="954107"/>
-          </a:xfrm>
-          <a:prstGeom prst="rect">
-            <a:avLst/>
-          </a:prstGeom>
-          <a:noFill/>
-        </p:spPr>
-        <p:txBody>
-          <a:bodyPr wrap="square" rtlCol="0">
-            <a:spAutoFit/>
-          </a:bodyPr>
-          <a:lstStyle/>
-          <a:p>
-            <a:r>
-              <a:rPr lang="en-US" b="1" dirty="0"/>
-              <a:t>Pain points:</a:t>
-            </a:r>
-            <a:endParaRPr lang="en-US" dirty="0"/>
-          </a:p>
-          <a:p>
-            <a:pPr marL="285750" indent="-285750">
-              <a:buFont typeface="Arial" panose="020B0604020202020204" pitchFamily="34" charset="0"/>
-              <a:buChar char="•"/>
-            </a:pPr>
-            <a:r>
-              <a:rPr lang="en-US" dirty="0"/>
-              <a:t>Incomplete or outdated documentation.</a:t>
-            </a:r>
-          </a:p>
-          <a:p>
-            <a:pPr marL="285750" indent="-285750">
-              <a:buFont typeface="Arial" panose="020B0604020202020204" pitchFamily="34" charset="0"/>
-              <a:buChar char="•"/>
-            </a:pPr>
-            <a:r>
-              <a:rPr lang="en-US" dirty="0"/>
-              <a:t>API instability and delays.</a:t>
-            </a:r>
-          </a:p>
-          <a:p>
-            <a:endParaRPr lang="ru-RU" dirty="0"/>
-          </a:p>
-        </p:txBody>
-      </p:sp>
-    </p:spTree>
-    <p:extLst>
-      <p:ext uri="{BB962C8B-B14F-4D97-AF65-F5344CB8AC3E}">
-        <p14:creationId xmlns:p14="http://schemas.microsoft.com/office/powerpoint/2010/main" val="2691937146"/>
-      </p:ext>
-    </p:extLst>
-  </p:cSld>
-  <p:clrMapOvr>
-    <a:masterClrMapping/>
-  </p:clrMapOvr>
-</p:sld>
-</file>
-
-<file path=ppt/slides/slide5.xml><?xml version="1.0" encoding="utf-8"?>
-<p:sld xmlns:a="http://schemas.openxmlformats.org/drawingml/2006/main" xmlns:r="http://schemas.openxmlformats.org/officeDocument/2006/relationships" xmlns:p="http://schemas.openxmlformats.org/presentationml/2006/main">
-  <p:cSld>
-    <p:spTree>
-      <p:nvGrpSpPr>
         <p:cNvPr id="1" name="Shape 65"/>
         <p:cNvGrpSpPr/>
         <p:nvPr/>
@@ -13158,7 +11568,7 @@
             </a:pPr>
             <a:fld id="{00000000-1234-1234-1234-123412341234}" type="slidenum">
               <a:rPr lang="en-GB" smtClean="0"/>
-              <a:t>5</a:t>
+              <a:t>3</a:t>
             </a:fld>
             <a:endParaRPr lang="en-GB"/>
           </a:p>
@@ -13177,7 +11587,803 @@
 </p:sld>
 </file>
 
-<file path=ppt/slides/slide6.xml><?xml version="1.0" encoding="utf-8"?>
+<file path=ppt/slides/slide4.xml><?xml version="1.0" encoding="utf-8"?>
+<p:sld xmlns:a="http://schemas.openxmlformats.org/drawingml/2006/main" xmlns:r="http://schemas.openxmlformats.org/officeDocument/2006/relationships" xmlns:p="http://schemas.openxmlformats.org/presentationml/2006/main">
+  <p:cSld>
+    <p:spTree>
+      <p:nvGrpSpPr>
+        <p:cNvPr id="1" name=""/>
+        <p:cNvGrpSpPr/>
+        <p:nvPr/>
+      </p:nvGrpSpPr>
+      <p:grpSpPr>
+        <a:xfrm>
+          <a:off x="0" y="0"/>
+          <a:ext cx="0" cy="0"/>
+          <a:chOff x="0" y="0"/>
+          <a:chExt cx="0" cy="0"/>
+        </a:xfrm>
+      </p:grpSpPr>
+      <p:sp>
+        <p:nvSpPr>
+          <p:cNvPr id="3" name="Текст 2">
+            <a:extLst>
+              <a:ext uri="{FF2B5EF4-FFF2-40B4-BE49-F238E27FC236}">
+                <a16:creationId xmlns:a16="http://schemas.microsoft.com/office/drawing/2014/main" id="{73D9E495-74CF-49FC-8FE9-9E20997A0616}"/>
+              </a:ext>
+            </a:extLst>
+          </p:cNvPr>
+          <p:cNvSpPr>
+            <a:spLocks noGrp="1"/>
+          </p:cNvSpPr>
+          <p:nvPr>
+            <p:ph type="body" idx="1"/>
+          </p:nvPr>
+        </p:nvSpPr>
+        <p:spPr>
+          <a:xfrm>
+            <a:off x="179078" y="713125"/>
+            <a:ext cx="4051870" cy="2249444"/>
+          </a:xfrm>
+        </p:spPr>
+        <p:txBody>
+          <a:bodyPr/>
+          <a:lstStyle/>
+          <a:p>
+            <a:pPr marL="139700" indent="0">
+              <a:buNone/>
+            </a:pPr>
+            <a:r>
+              <a:rPr lang="en-US" b="1" dirty="0">
+                <a:solidFill>
+                  <a:schemeClr val="tx1"/>
+                </a:solidFill>
+              </a:rPr>
+              <a:t>ML Engineer (Maria, 32 years old)</a:t>
+            </a:r>
+          </a:p>
+          <a:p>
+            <a:pPr marL="139700" indent="0">
+              <a:buNone/>
+            </a:pPr>
+            <a:br>
+              <a:rPr lang="en-US" dirty="0">
+                <a:solidFill>
+                  <a:schemeClr val="tx1"/>
+                </a:solidFill>
+              </a:rPr>
+            </a:br>
+            <a:r>
+              <a:rPr lang="en-US" b="1" dirty="0">
+                <a:solidFill>
+                  <a:schemeClr val="tx1"/>
+                </a:solidFill>
+              </a:rPr>
+              <a:t>Goals:</a:t>
+            </a:r>
+            <a:endParaRPr lang="en-US" dirty="0">
+              <a:solidFill>
+                <a:schemeClr val="tx1"/>
+              </a:solidFill>
+            </a:endParaRPr>
+          </a:p>
+          <a:p>
+            <a:pPr>
+              <a:lnSpc>
+                <a:spcPct val="120000"/>
+              </a:lnSpc>
+              <a:buFont typeface="Arial" panose="020B0604020202020204" pitchFamily="34" charset="0"/>
+              <a:buChar char="•"/>
+            </a:pPr>
+            <a:r>
+              <a:rPr lang="en-US" dirty="0">
+                <a:solidFill>
+                  <a:schemeClr val="tx1"/>
+                </a:solidFill>
+              </a:rPr>
+              <a:t>Deploy and version ML models in Kubernetes.</a:t>
+            </a:r>
+          </a:p>
+          <a:p>
+            <a:pPr>
+              <a:lnSpc>
+                <a:spcPct val="120000"/>
+              </a:lnSpc>
+              <a:buFont typeface="Arial" panose="020B0604020202020204" pitchFamily="34" charset="0"/>
+              <a:buChar char="•"/>
+            </a:pPr>
+            <a:r>
+              <a:rPr lang="en-US" dirty="0">
+                <a:solidFill>
+                  <a:schemeClr val="tx1"/>
+                </a:solidFill>
+              </a:rPr>
+              <a:t>Automatic deploy and further documentation.</a:t>
+            </a:r>
+          </a:p>
+          <a:p>
+            <a:pPr>
+              <a:lnSpc>
+                <a:spcPct val="120000"/>
+              </a:lnSpc>
+              <a:buFont typeface="Arial" panose="020B0604020202020204" pitchFamily="34" charset="0"/>
+              <a:buChar char="•"/>
+            </a:pPr>
+            <a:r>
+              <a:rPr lang="en-US" dirty="0">
+                <a:solidFill>
+                  <a:schemeClr val="tx1"/>
+                </a:solidFill>
+              </a:rPr>
+              <a:t>Flexibility for different ML frameworks.</a:t>
+            </a:r>
+          </a:p>
+        </p:txBody>
+      </p:sp>
+      <p:sp>
+        <p:nvSpPr>
+          <p:cNvPr id="7" name="Google Shape;66;p15">
+            <a:extLst>
+              <a:ext uri="{FF2B5EF4-FFF2-40B4-BE49-F238E27FC236}">
+                <a16:creationId xmlns:a16="http://schemas.microsoft.com/office/drawing/2014/main" id="{A2B7074F-A1D8-444B-9DA8-BFF70B4A2A8A}"/>
+              </a:ext>
+            </a:extLst>
+          </p:cNvPr>
+          <p:cNvSpPr txBox="1">
+            <a:spLocks/>
+          </p:cNvSpPr>
+          <p:nvPr/>
+        </p:nvSpPr>
+        <p:spPr>
+          <a:xfrm>
+            <a:off x="252575" y="140425"/>
+            <a:ext cx="8520600" cy="572700"/>
+          </a:xfrm>
+          <a:prstGeom prst="rect">
+            <a:avLst/>
+          </a:prstGeom>
+          <a:noFill/>
+          <a:ln>
+            <a:noFill/>
+          </a:ln>
+        </p:spPr>
+        <p:txBody>
+          <a:bodyPr spcFirstLastPara="1" wrap="square" lIns="91425" tIns="91425" rIns="91425" bIns="91425" anchor="t" anchorCtr="0">
+            <a:noAutofit/>
+          </a:bodyPr>
+          <a:lstStyle>
+            <a:defPPr marR="0" lvl="0" algn="l" rtl="0">
+              <a:lnSpc>
+                <a:spcPct val="100000"/>
+              </a:lnSpc>
+              <a:spcBef>
+                <a:spcPts val="0"/>
+              </a:spcBef>
+              <a:spcAft>
+                <a:spcPts val="0"/>
+              </a:spcAft>
+            </a:defPPr>
+            <a:lvl1pPr marR="0" lvl="0" algn="l" rtl="0">
+              <a:lnSpc>
+                <a:spcPct val="100000"/>
+              </a:lnSpc>
+              <a:spcBef>
+                <a:spcPts val="0"/>
+              </a:spcBef>
+              <a:spcAft>
+                <a:spcPts val="0"/>
+              </a:spcAft>
+              <a:buClr>
+                <a:schemeClr val="dk1"/>
+              </a:buClr>
+              <a:buSzPts val="2800"/>
+              <a:buFont typeface="Arial"/>
+              <a:buNone/>
+              <a:defRPr sz="2800" b="0" i="0" u="none" strike="noStrike" cap="none">
+                <a:solidFill>
+                  <a:schemeClr val="dk1"/>
+                </a:solidFill>
+                <a:latin typeface="Arial"/>
+                <a:ea typeface="Arial"/>
+                <a:cs typeface="Arial"/>
+                <a:sym typeface="Arial"/>
+              </a:defRPr>
+            </a:lvl1pPr>
+            <a:lvl2pPr marR="0" lvl="1" algn="l" rtl="0">
+              <a:lnSpc>
+                <a:spcPct val="100000"/>
+              </a:lnSpc>
+              <a:spcBef>
+                <a:spcPts val="0"/>
+              </a:spcBef>
+              <a:spcAft>
+                <a:spcPts val="0"/>
+              </a:spcAft>
+              <a:buClr>
+                <a:schemeClr val="dk1"/>
+              </a:buClr>
+              <a:buSzPts val="2800"/>
+              <a:buFont typeface="Arial"/>
+              <a:buNone/>
+              <a:defRPr sz="2800" b="0" i="0" u="none" strike="noStrike" cap="none">
+                <a:solidFill>
+                  <a:schemeClr val="dk1"/>
+                </a:solidFill>
+                <a:latin typeface="Arial"/>
+                <a:ea typeface="Arial"/>
+                <a:cs typeface="Arial"/>
+                <a:sym typeface="Arial"/>
+              </a:defRPr>
+            </a:lvl2pPr>
+            <a:lvl3pPr marR="0" lvl="2" algn="l" rtl="0">
+              <a:lnSpc>
+                <a:spcPct val="100000"/>
+              </a:lnSpc>
+              <a:spcBef>
+                <a:spcPts val="0"/>
+              </a:spcBef>
+              <a:spcAft>
+                <a:spcPts val="0"/>
+              </a:spcAft>
+              <a:buClr>
+                <a:schemeClr val="dk1"/>
+              </a:buClr>
+              <a:buSzPts val="2800"/>
+              <a:buFont typeface="Arial"/>
+              <a:buNone/>
+              <a:defRPr sz="2800" b="0" i="0" u="none" strike="noStrike" cap="none">
+                <a:solidFill>
+                  <a:schemeClr val="dk1"/>
+                </a:solidFill>
+                <a:latin typeface="Arial"/>
+                <a:ea typeface="Arial"/>
+                <a:cs typeface="Arial"/>
+                <a:sym typeface="Arial"/>
+              </a:defRPr>
+            </a:lvl3pPr>
+            <a:lvl4pPr marR="0" lvl="3" algn="l" rtl="0">
+              <a:lnSpc>
+                <a:spcPct val="100000"/>
+              </a:lnSpc>
+              <a:spcBef>
+                <a:spcPts val="0"/>
+              </a:spcBef>
+              <a:spcAft>
+                <a:spcPts val="0"/>
+              </a:spcAft>
+              <a:buClr>
+                <a:schemeClr val="dk1"/>
+              </a:buClr>
+              <a:buSzPts val="2800"/>
+              <a:buFont typeface="Arial"/>
+              <a:buNone/>
+              <a:defRPr sz="2800" b="0" i="0" u="none" strike="noStrike" cap="none">
+                <a:solidFill>
+                  <a:schemeClr val="dk1"/>
+                </a:solidFill>
+                <a:latin typeface="Arial"/>
+                <a:ea typeface="Arial"/>
+                <a:cs typeface="Arial"/>
+                <a:sym typeface="Arial"/>
+              </a:defRPr>
+            </a:lvl4pPr>
+            <a:lvl5pPr marR="0" lvl="4" algn="l" rtl="0">
+              <a:lnSpc>
+                <a:spcPct val="100000"/>
+              </a:lnSpc>
+              <a:spcBef>
+                <a:spcPts val="0"/>
+              </a:spcBef>
+              <a:spcAft>
+                <a:spcPts val="0"/>
+              </a:spcAft>
+              <a:buClr>
+                <a:schemeClr val="dk1"/>
+              </a:buClr>
+              <a:buSzPts val="2800"/>
+              <a:buFont typeface="Arial"/>
+              <a:buNone/>
+              <a:defRPr sz="2800" b="0" i="0" u="none" strike="noStrike" cap="none">
+                <a:solidFill>
+                  <a:schemeClr val="dk1"/>
+                </a:solidFill>
+                <a:latin typeface="Arial"/>
+                <a:ea typeface="Arial"/>
+                <a:cs typeface="Arial"/>
+                <a:sym typeface="Arial"/>
+              </a:defRPr>
+            </a:lvl5pPr>
+            <a:lvl6pPr marR="0" lvl="5" algn="l" rtl="0">
+              <a:lnSpc>
+                <a:spcPct val="100000"/>
+              </a:lnSpc>
+              <a:spcBef>
+                <a:spcPts val="0"/>
+              </a:spcBef>
+              <a:spcAft>
+                <a:spcPts val="0"/>
+              </a:spcAft>
+              <a:buClr>
+                <a:schemeClr val="dk1"/>
+              </a:buClr>
+              <a:buSzPts val="2800"/>
+              <a:buFont typeface="Arial"/>
+              <a:buNone/>
+              <a:defRPr sz="2800" b="0" i="0" u="none" strike="noStrike" cap="none">
+                <a:solidFill>
+                  <a:schemeClr val="dk1"/>
+                </a:solidFill>
+                <a:latin typeface="Arial"/>
+                <a:ea typeface="Arial"/>
+                <a:cs typeface="Arial"/>
+                <a:sym typeface="Arial"/>
+              </a:defRPr>
+            </a:lvl6pPr>
+            <a:lvl7pPr marR="0" lvl="6" algn="l" rtl="0">
+              <a:lnSpc>
+                <a:spcPct val="100000"/>
+              </a:lnSpc>
+              <a:spcBef>
+                <a:spcPts val="0"/>
+              </a:spcBef>
+              <a:spcAft>
+                <a:spcPts val="0"/>
+              </a:spcAft>
+              <a:buClr>
+                <a:schemeClr val="dk1"/>
+              </a:buClr>
+              <a:buSzPts val="2800"/>
+              <a:buFont typeface="Arial"/>
+              <a:buNone/>
+              <a:defRPr sz="2800" b="0" i="0" u="none" strike="noStrike" cap="none">
+                <a:solidFill>
+                  <a:schemeClr val="dk1"/>
+                </a:solidFill>
+                <a:latin typeface="Arial"/>
+                <a:ea typeface="Arial"/>
+                <a:cs typeface="Arial"/>
+                <a:sym typeface="Arial"/>
+              </a:defRPr>
+            </a:lvl7pPr>
+            <a:lvl8pPr marR="0" lvl="7" algn="l" rtl="0">
+              <a:lnSpc>
+                <a:spcPct val="100000"/>
+              </a:lnSpc>
+              <a:spcBef>
+                <a:spcPts val="0"/>
+              </a:spcBef>
+              <a:spcAft>
+                <a:spcPts val="0"/>
+              </a:spcAft>
+              <a:buClr>
+                <a:schemeClr val="dk1"/>
+              </a:buClr>
+              <a:buSzPts val="2800"/>
+              <a:buFont typeface="Arial"/>
+              <a:buNone/>
+              <a:defRPr sz="2800" b="0" i="0" u="none" strike="noStrike" cap="none">
+                <a:solidFill>
+                  <a:schemeClr val="dk1"/>
+                </a:solidFill>
+                <a:latin typeface="Arial"/>
+                <a:ea typeface="Arial"/>
+                <a:cs typeface="Arial"/>
+                <a:sym typeface="Arial"/>
+              </a:defRPr>
+            </a:lvl8pPr>
+            <a:lvl9pPr marR="0" lvl="8" algn="l" rtl="0">
+              <a:lnSpc>
+                <a:spcPct val="100000"/>
+              </a:lnSpc>
+              <a:spcBef>
+                <a:spcPts val="0"/>
+              </a:spcBef>
+              <a:spcAft>
+                <a:spcPts val="0"/>
+              </a:spcAft>
+              <a:buClr>
+                <a:schemeClr val="dk1"/>
+              </a:buClr>
+              <a:buSzPts val="2800"/>
+              <a:buFont typeface="Arial"/>
+              <a:buNone/>
+              <a:defRPr sz="2800" b="0" i="0" u="none" strike="noStrike" cap="none">
+                <a:solidFill>
+                  <a:schemeClr val="dk1"/>
+                </a:solidFill>
+                <a:latin typeface="Arial"/>
+                <a:ea typeface="Arial"/>
+                <a:cs typeface="Arial"/>
+                <a:sym typeface="Arial"/>
+              </a:defRPr>
+            </a:lvl9pPr>
+          </a:lstStyle>
+          <a:p>
+            <a:r>
+              <a:rPr lang="en-GB" b="1" dirty="0">
+                <a:effectLst>
+                  <a:outerShdw blurRad="38100" dist="38100" dir="2700000" algn="tl">
+                    <a:srgbClr val="000000">
+                      <a:alpha val="43137"/>
+                    </a:srgbClr>
+                  </a:outerShdw>
+                </a:effectLst>
+              </a:rPr>
+              <a:t>Personas</a:t>
+            </a:r>
+          </a:p>
+        </p:txBody>
+      </p:sp>
+      <p:sp>
+        <p:nvSpPr>
+          <p:cNvPr id="8" name="TextBox 7">
+            <a:extLst>
+              <a:ext uri="{FF2B5EF4-FFF2-40B4-BE49-F238E27FC236}">
+                <a16:creationId xmlns:a16="http://schemas.microsoft.com/office/drawing/2014/main" id="{4B40FD6D-82C8-48B1-A5D3-456D8792334C}"/>
+              </a:ext>
+            </a:extLst>
+          </p:cNvPr>
+          <p:cNvSpPr txBox="1"/>
+          <p:nvPr/>
+        </p:nvSpPr>
+        <p:spPr>
+          <a:xfrm>
+            <a:off x="4681106" y="713125"/>
+            <a:ext cx="4210319" cy="2007537"/>
+          </a:xfrm>
+          <a:prstGeom prst="rect">
+            <a:avLst/>
+          </a:prstGeom>
+          <a:noFill/>
+        </p:spPr>
+        <p:txBody>
+          <a:bodyPr wrap="square" rtlCol="0">
+            <a:spAutoFit/>
+          </a:bodyPr>
+          <a:lstStyle/>
+          <a:p>
+            <a:r>
+              <a:rPr lang="en-US" b="1" dirty="0">
+                <a:solidFill>
+                  <a:schemeClr val="tx1"/>
+                </a:solidFill>
+              </a:rPr>
+              <a:t>Backend Developer (Alexander, 28 years old)</a:t>
+            </a:r>
+          </a:p>
+          <a:p>
+            <a:br>
+              <a:rPr lang="en-US" dirty="0">
+                <a:solidFill>
+                  <a:schemeClr val="tx1"/>
+                </a:solidFill>
+              </a:rPr>
+            </a:br>
+            <a:r>
+              <a:rPr lang="en-US" b="1" dirty="0">
+                <a:solidFill>
+                  <a:schemeClr val="tx1"/>
+                </a:solidFill>
+              </a:rPr>
+              <a:t>Goals:</a:t>
+            </a:r>
+            <a:endParaRPr lang="en-US" dirty="0">
+              <a:solidFill>
+                <a:schemeClr val="tx1"/>
+              </a:solidFill>
+            </a:endParaRPr>
+          </a:p>
+          <a:p>
+            <a:pPr marL="285750" indent="-285750">
+              <a:lnSpc>
+                <a:spcPct val="120000"/>
+              </a:lnSpc>
+              <a:buFont typeface="Arial" panose="020B0604020202020204" pitchFamily="34" charset="0"/>
+              <a:buChar char="•"/>
+            </a:pPr>
+            <a:r>
+              <a:rPr lang="en-US" dirty="0"/>
+              <a:t>Integration of the API gateway into existing infrastructure.</a:t>
+            </a:r>
+          </a:p>
+          <a:p>
+            <a:pPr marL="285750" indent="-285750">
+              <a:lnSpc>
+                <a:spcPct val="120000"/>
+              </a:lnSpc>
+              <a:buFont typeface="Arial" panose="020B0604020202020204" pitchFamily="34" charset="0"/>
+              <a:buChar char="•"/>
+            </a:pPr>
+            <a:r>
+              <a:rPr lang="en-US" dirty="0">
+                <a:solidFill>
+                  <a:schemeClr val="tx1"/>
+                </a:solidFill>
+              </a:rPr>
+              <a:t>Use automatic </a:t>
+            </a:r>
+            <a:r>
+              <a:rPr lang="en-US" dirty="0" err="1">
+                <a:solidFill>
+                  <a:schemeClr val="tx1"/>
+                </a:solidFill>
+              </a:rPr>
+              <a:t>OpenAPI</a:t>
+            </a:r>
+            <a:r>
+              <a:rPr lang="en-US" dirty="0">
+                <a:solidFill>
+                  <a:schemeClr val="tx1"/>
+                </a:solidFill>
+              </a:rPr>
+              <a:t> schema generation.</a:t>
+            </a:r>
+          </a:p>
+          <a:p>
+            <a:pPr marL="285750" indent="-285750">
+              <a:lnSpc>
+                <a:spcPct val="120000"/>
+              </a:lnSpc>
+              <a:buFont typeface="Arial" panose="020B0604020202020204" pitchFamily="34" charset="0"/>
+              <a:buChar char="•"/>
+            </a:pPr>
+            <a:r>
+              <a:rPr lang="en-US" dirty="0">
+                <a:solidFill>
+                  <a:schemeClr val="tx1"/>
+                </a:solidFill>
+              </a:rPr>
+              <a:t>Manage access rules.</a:t>
+            </a:r>
+          </a:p>
+          <a:p>
+            <a:pPr marL="285750" indent="-285750">
+              <a:lnSpc>
+                <a:spcPct val="120000"/>
+              </a:lnSpc>
+              <a:buFont typeface="Arial" panose="020B0604020202020204" pitchFamily="34" charset="0"/>
+              <a:buChar char="•"/>
+            </a:pPr>
+            <a:r>
+              <a:rPr lang="en-US" dirty="0"/>
+              <a:t>Scalable and secure deployment of ML models.</a:t>
+            </a:r>
+          </a:p>
+        </p:txBody>
+      </p:sp>
+      <p:sp>
+        <p:nvSpPr>
+          <p:cNvPr id="2" name="Slide Number Placeholder 1">
+            <a:extLst>
+              <a:ext uri="{FF2B5EF4-FFF2-40B4-BE49-F238E27FC236}">
+                <a16:creationId xmlns:a16="http://schemas.microsoft.com/office/drawing/2014/main" id="{3178EC64-B23C-4E80-AA61-FE6C102031B5}"/>
+              </a:ext>
+            </a:extLst>
+          </p:cNvPr>
+          <p:cNvSpPr>
+            <a:spLocks noGrp="1"/>
+          </p:cNvSpPr>
+          <p:nvPr>
+            <p:ph type="sldNum" idx="12"/>
+          </p:nvPr>
+        </p:nvSpPr>
+        <p:spPr/>
+        <p:txBody>
+          <a:bodyPr/>
+          <a:lstStyle/>
+          <a:p>
+            <a:pPr marL="0" lvl="0" indent="0" algn="r" rtl="0">
+              <a:spcBef>
+                <a:spcPts val="0"/>
+              </a:spcBef>
+              <a:spcAft>
+                <a:spcPts val="0"/>
+              </a:spcAft>
+              <a:buNone/>
+            </a:pPr>
+            <a:fld id="{00000000-1234-1234-1234-123412341234}" type="slidenum">
+              <a:rPr lang="en-GB" smtClean="0"/>
+              <a:t>4</a:t>
+            </a:fld>
+            <a:endParaRPr lang="en-GB"/>
+          </a:p>
+        </p:txBody>
+      </p:sp>
+      <p:sp>
+        <p:nvSpPr>
+          <p:cNvPr id="4" name="TextBox 3">
+            <a:extLst>
+              <a:ext uri="{FF2B5EF4-FFF2-40B4-BE49-F238E27FC236}">
+                <a16:creationId xmlns:a16="http://schemas.microsoft.com/office/drawing/2014/main" id="{C9F9E3DC-5FD0-4211-A132-FB1036335AD0}"/>
+              </a:ext>
+            </a:extLst>
+          </p:cNvPr>
+          <p:cNvSpPr txBox="1"/>
+          <p:nvPr/>
+        </p:nvSpPr>
+        <p:spPr>
+          <a:xfrm>
+            <a:off x="252575" y="3309023"/>
+            <a:ext cx="4051870" cy="1040285"/>
+          </a:xfrm>
+          <a:prstGeom prst="rect">
+            <a:avLst/>
+          </a:prstGeom>
+          <a:noFill/>
+        </p:spPr>
+        <p:txBody>
+          <a:bodyPr wrap="square" rtlCol="0">
+            <a:spAutoFit/>
+          </a:bodyPr>
+          <a:lstStyle/>
+          <a:p>
+            <a:r>
+              <a:rPr lang="en-US" b="1" dirty="0">
+                <a:solidFill>
+                  <a:schemeClr val="tx1"/>
+                </a:solidFill>
+              </a:rPr>
+              <a:t>Pain points:</a:t>
+            </a:r>
+            <a:endParaRPr lang="en-US" dirty="0">
+              <a:solidFill>
+                <a:schemeClr val="tx1"/>
+              </a:solidFill>
+            </a:endParaRPr>
+          </a:p>
+          <a:p>
+            <a:pPr marL="285750" indent="-285750">
+              <a:lnSpc>
+                <a:spcPct val="120000"/>
+              </a:lnSpc>
+              <a:buFont typeface="Arial" panose="020B0604020202020204" pitchFamily="34" charset="0"/>
+              <a:buChar char="•"/>
+            </a:pPr>
+            <a:r>
+              <a:rPr lang="en-US" dirty="0">
+                <a:solidFill>
+                  <a:schemeClr val="tx1"/>
+                </a:solidFill>
+              </a:rPr>
+              <a:t>Manual API documentation.</a:t>
+            </a:r>
+          </a:p>
+          <a:p>
+            <a:pPr marL="285750" indent="-285750">
+              <a:lnSpc>
+                <a:spcPct val="120000"/>
+              </a:lnSpc>
+              <a:buFont typeface="Arial" panose="020B0604020202020204" pitchFamily="34" charset="0"/>
+              <a:buChar char="•"/>
+            </a:pPr>
+            <a:r>
+              <a:rPr lang="en-US" dirty="0">
+                <a:solidFill>
+                  <a:schemeClr val="tx1"/>
+                </a:solidFill>
+              </a:rPr>
+              <a:t>Difficulties in monitoring model performance.</a:t>
+            </a:r>
+          </a:p>
+          <a:p>
+            <a:endParaRPr lang="ru-RU" dirty="0"/>
+          </a:p>
+        </p:txBody>
+      </p:sp>
+      <p:sp>
+        <p:nvSpPr>
+          <p:cNvPr id="5" name="TextBox 4">
+            <a:extLst>
+              <a:ext uri="{FF2B5EF4-FFF2-40B4-BE49-F238E27FC236}">
+                <a16:creationId xmlns:a16="http://schemas.microsoft.com/office/drawing/2014/main" id="{1DC75561-9819-4074-8766-C1882A1161D7}"/>
+              </a:ext>
+            </a:extLst>
+          </p:cNvPr>
+          <p:cNvSpPr txBox="1"/>
+          <p:nvPr/>
+        </p:nvSpPr>
+        <p:spPr>
+          <a:xfrm>
+            <a:off x="4645959" y="3309023"/>
+            <a:ext cx="4127216" cy="1576650"/>
+          </a:xfrm>
+          <a:prstGeom prst="rect">
+            <a:avLst/>
+          </a:prstGeom>
+          <a:noFill/>
+        </p:spPr>
+        <p:txBody>
+          <a:bodyPr wrap="square" rtlCol="0">
+            <a:spAutoFit/>
+          </a:bodyPr>
+          <a:lstStyle/>
+          <a:p>
+            <a:r>
+              <a:rPr lang="en-US" b="1" dirty="0">
+                <a:solidFill>
+                  <a:schemeClr val="tx1"/>
+                </a:solidFill>
+              </a:rPr>
+              <a:t>Pain points:</a:t>
+            </a:r>
+            <a:endParaRPr lang="en-US" dirty="0">
+              <a:solidFill>
+                <a:schemeClr val="tx1"/>
+              </a:solidFill>
+            </a:endParaRPr>
+          </a:p>
+          <a:p>
+            <a:pPr marL="285750" indent="-285750">
+              <a:lnSpc>
+                <a:spcPct val="120000"/>
+              </a:lnSpc>
+              <a:buFont typeface="Arial" panose="020B0604020202020204" pitchFamily="34" charset="0"/>
+              <a:buChar char="•"/>
+            </a:pPr>
+            <a:r>
+              <a:rPr lang="en-US" dirty="0"/>
+              <a:t>Incomplete or outdated</a:t>
+            </a:r>
+            <a:r>
+              <a:rPr lang="en-US" dirty="0">
+                <a:solidFill>
+                  <a:schemeClr val="tx1"/>
+                </a:solidFill>
+              </a:rPr>
+              <a:t> API documentation.</a:t>
+            </a:r>
+          </a:p>
+          <a:p>
+            <a:pPr marL="285750" indent="-285750">
+              <a:lnSpc>
+                <a:spcPct val="120000"/>
+              </a:lnSpc>
+              <a:buFont typeface="Arial" panose="020B0604020202020204" pitchFamily="34" charset="0"/>
+              <a:buChar char="•"/>
+            </a:pPr>
+            <a:r>
+              <a:rPr lang="en-US" dirty="0">
+                <a:solidFill>
+                  <a:schemeClr val="tx1"/>
+                </a:solidFill>
+              </a:rPr>
+              <a:t>Challenges with integrating authorization and managing access control.</a:t>
+            </a:r>
+          </a:p>
+          <a:p>
+            <a:pPr marL="285750" indent="-285750">
+              <a:lnSpc>
+                <a:spcPct val="120000"/>
+              </a:lnSpc>
+              <a:buFont typeface="Arial" panose="020B0604020202020204" pitchFamily="34" charset="0"/>
+              <a:buChar char="•"/>
+            </a:pPr>
+            <a:r>
+              <a:rPr lang="en-US" dirty="0"/>
+              <a:t>Challenges with integration and corporate standards.</a:t>
+            </a:r>
+            <a:endParaRPr lang="en-US" dirty="0">
+              <a:solidFill>
+                <a:schemeClr val="tx1"/>
+              </a:solidFill>
+            </a:endParaRPr>
+          </a:p>
+        </p:txBody>
+      </p:sp>
+    </p:spTree>
+    <p:extLst>
+      <p:ext uri="{BB962C8B-B14F-4D97-AF65-F5344CB8AC3E}">
+        <p14:creationId xmlns:p14="http://schemas.microsoft.com/office/powerpoint/2010/main" val="2021445038"/>
+      </p:ext>
+    </p:extLst>
+  </p:cSld>
+  <p:clrMapOvr>
+    <a:masterClrMapping/>
+  </p:clrMapOvr>
+</p:sld>
+</file>
+
+<file path=ppt/slides/slide5.xml><?xml version="1.0" encoding="utf-8"?>
 <p:sld xmlns:a="http://schemas.openxmlformats.org/drawingml/2006/main" xmlns:r="http://schemas.openxmlformats.org/officeDocument/2006/relationships" xmlns:p="http://schemas.openxmlformats.org/presentationml/2006/main">
   <p:cSld>
     <p:spTree>
@@ -13328,7 +12534,7 @@
             </a:pPr>
             <a:fld id="{00000000-1234-1234-1234-123412341234}" type="slidenum">
               <a:rPr lang="en-GB" smtClean="0"/>
-              <a:t>6</a:t>
+              <a:t>5</a:t>
             </a:fld>
             <a:endParaRPr lang="en-GB"/>
           </a:p>
@@ -13347,7 +12553,7 @@
 </p:sld>
 </file>
 
-<file path=ppt/slides/slide7.xml><?xml version="1.0" encoding="utf-8"?>
+<file path=ppt/slides/slide6.xml><?xml version="1.0" encoding="utf-8"?>
 <p:sld xmlns:a="http://schemas.openxmlformats.org/drawingml/2006/main" xmlns:r="http://schemas.openxmlformats.org/officeDocument/2006/relationships" xmlns:p="http://schemas.openxmlformats.org/presentationml/2006/main">
   <p:cSld>
     <p:spTree>
@@ -13460,7 +12666,7 @@
             </a:pPr>
             <a:fld id="{00000000-1234-1234-1234-123412341234}" type="slidenum">
               <a:rPr lang="en-GB" smtClean="0"/>
-              <a:t>7</a:t>
+              <a:t>6</a:t>
             </a:fld>
             <a:endParaRPr lang="en-GB"/>
           </a:p>
@@ -13557,7 +12763,7 @@
 </p:sld>
 </file>
 
-<file path=ppt/slides/slide8.xml><?xml version="1.0" encoding="utf-8"?>
+<file path=ppt/slides/slide7.xml><?xml version="1.0" encoding="utf-8"?>
 <p:sld xmlns:a="http://schemas.openxmlformats.org/drawingml/2006/main" xmlns:r="http://schemas.openxmlformats.org/officeDocument/2006/relationships" xmlns:p="http://schemas.openxmlformats.org/presentationml/2006/main">
   <p:cSld>
     <p:spTree>
@@ -13670,7 +12876,7 @@
             </a:pPr>
             <a:fld id="{00000000-1234-1234-1234-123412341234}" type="slidenum">
               <a:rPr lang="en-GB" smtClean="0"/>
-              <a:t>8</a:t>
+              <a:t>7</a:t>
             </a:fld>
             <a:endParaRPr lang="en-GB"/>
           </a:p>
@@ -13691,21 +12897,21 @@
           <p:nvPr>
             <p:extLst>
               <p:ext uri="{D42A27DB-BD31-4B8C-83A1-F6EECF244321}">
-                <p14:modId xmlns:p14="http://schemas.microsoft.com/office/powerpoint/2010/main" val="2275922058"/>
+                <p14:modId xmlns:p14="http://schemas.microsoft.com/office/powerpoint/2010/main" val="2043209152"/>
               </p:ext>
             </p:extLst>
           </p:nvPr>
         </p:nvGraphicFramePr>
         <p:xfrm>
-          <a:off x="457199" y="968187"/>
-          <a:ext cx="8243048" cy="3695029"/>
+          <a:off x="416859" y="968187"/>
+          <a:ext cx="8283388" cy="3723030"/>
         </p:xfrm>
         <a:graphic>
           <a:graphicData uri="http://schemas.openxmlformats.org/drawingml/2006/table">
             <a:tbl>
               <a:tblPr/>
               <a:tblGrid>
-                <a:gridCol w="1761566">
+                <a:gridCol w="1801906">
                   <a:extLst>
                     <a:ext uri="{9D8B030D-6E8A-4147-A177-3AD203B41FA5}">
                       <a16:colId xmlns:a16="http://schemas.microsoft.com/office/drawing/2014/main" val="820218566"/>
@@ -13741,7 +12947,7 @@
                     <a:lstStyle/>
                     <a:p>
                       <a:r>
-                        <a:rPr lang="en-US" sz="900" b="1">
+                        <a:rPr lang="en-US" sz="1200" b="1" dirty="0">
                           <a:effectLst/>
                         </a:rPr>
                         <a:t>Use Case</a:t>
@@ -13796,7 +13002,7 @@
                     <a:lstStyle/>
                     <a:p>
                       <a:r>
-                        <a:rPr lang="en-US" sz="900" b="1" dirty="0">
+                        <a:rPr lang="en-US" sz="1200" b="1" dirty="0">
                           <a:effectLst/>
                         </a:rPr>
                         <a:t>Cooperation Name</a:t>
@@ -13851,7 +13057,7 @@
                     <a:lstStyle/>
                     <a:p>
                       <a:r>
-                        <a:rPr lang="en-US" sz="900" b="1">
+                        <a:rPr lang="en-US" sz="1200" b="1" dirty="0">
                           <a:effectLst/>
                         </a:rPr>
                         <a:t>Used Roles</a:t>
@@ -13906,7 +13112,7 @@
                     <a:lstStyle/>
                     <a:p>
                       <a:r>
-                        <a:rPr lang="en-US" sz="900" b="1">
+                        <a:rPr lang="en-US" sz="1200" b="1" dirty="0">
                           <a:effectLst/>
                         </a:rPr>
                         <a:t>Candidate Classes</a:t>
@@ -13968,7 +13174,7 @@
                     <a:lstStyle/>
                     <a:p>
                       <a:r>
-                        <a:rPr lang="en-US" sz="900" b="1">
+                        <a:rPr lang="en-US" sz="1200" b="1" dirty="0">
                           <a:effectLst/>
                         </a:rPr>
                         <a:t>Forward Request</a:t>
@@ -14195,7 +13401,7 @@
                     <a:lstStyle/>
                     <a:p>
                       <a:r>
-                        <a:rPr lang="en-US" sz="900" b="1">
+                        <a:rPr lang="en-US" sz="1200" b="1" dirty="0">
                           <a:effectLst/>
                         </a:rPr>
                         <a:t>Load Balancing</a:t>
@@ -14422,7 +13628,7 @@
                     <a:lstStyle/>
                     <a:p>
                       <a:r>
-                        <a:rPr lang="en-US" sz="900" b="1">
+                        <a:rPr lang="en-US" sz="1200" b="1" dirty="0">
                           <a:effectLst/>
                         </a:rPr>
                         <a:t>Authenticate</a:t>
@@ -14649,7 +13855,7 @@
                     <a:lstStyle/>
                     <a:p>
                       <a:r>
-                        <a:rPr lang="en-US" sz="900" b="1">
+                        <a:rPr lang="en-US" sz="1200" b="1" dirty="0">
                           <a:effectLst/>
                         </a:rPr>
                         <a:t>Cache Response</a:t>
@@ -14876,7 +14082,7 @@
                     <a:lstStyle/>
                     <a:p>
                       <a:r>
-                        <a:rPr lang="en-US" sz="900" b="1">
+                        <a:rPr lang="en-US" sz="1200" b="1" dirty="0">
                           <a:effectLst/>
                         </a:rPr>
                         <a:t>Collect Logs</a:t>
@@ -15103,7 +14309,7 @@
                     <a:lstStyle/>
                     <a:p>
                       <a:r>
-                        <a:rPr lang="en-US" sz="900" b="1">
+                        <a:rPr lang="en-US" sz="1200" b="1" dirty="0">
                           <a:effectLst/>
                         </a:rPr>
                         <a:t>Deploy Model</a:t>
@@ -15330,7 +14536,7 @@
                     <a:lstStyle/>
                     <a:p>
                       <a:r>
-                        <a:rPr lang="en-US" sz="900" b="1">
+                        <a:rPr lang="en-US" sz="1200" b="1" dirty="0">
                           <a:effectLst/>
                         </a:rPr>
                         <a:t>Publish Model</a:t>
@@ -15557,13 +14763,13 @@
                     <a:lstStyle/>
                     <a:p>
                       <a:r>
-                        <a:rPr lang="en-US" sz="900" b="1" dirty="0" err="1">
+                        <a:rPr lang="en-US" sz="1200" b="1" dirty="0" err="1">
                           <a:effectLst/>
                         </a:rPr>
                         <a:t>OpenAPI</a:t>
                       </a:r>
                       <a:r>
-                        <a:rPr lang="en-US" sz="900" b="1" dirty="0">
+                        <a:rPr lang="en-US" sz="1200" b="1" dirty="0">
                           <a:effectLst/>
                         </a:rPr>
                         <a:t> Schema Generation</a:t>
@@ -15795,7 +15001,7 @@
 </p:sld>
 </file>
 
-<file path=ppt/slides/slide9.xml><?xml version="1.0" encoding="utf-8"?>
+<file path=ppt/slides/slide8.xml><?xml version="1.0" encoding="utf-8"?>
 <p:sld xmlns:a="http://schemas.openxmlformats.org/drawingml/2006/main" xmlns:r="http://schemas.openxmlformats.org/officeDocument/2006/relationships" xmlns:p="http://schemas.openxmlformats.org/presentationml/2006/main">
   <p:cSld>
     <p:spTree>
@@ -15908,7 +15114,7 @@
             </a:pPr>
             <a:fld id="{00000000-1234-1234-1234-123412341234}" type="slidenum">
               <a:rPr lang="en-GB" smtClean="0"/>
-              <a:t>9</a:t>
+              <a:t>8</a:t>
             </a:fld>
             <a:endParaRPr lang="en-GB"/>
           </a:p>
@@ -15961,6 +15167,315 @@
           </a:extLst>
         </p:spPr>
       </p:pic>
+    </p:spTree>
+  </p:cSld>
+  <p:clrMapOvr>
+    <a:masterClrMapping/>
+  </p:clrMapOvr>
+</p:sld>
+</file>
+
+<file path=ppt/slides/slide9.xml><?xml version="1.0" encoding="utf-8"?>
+<p:sld xmlns:a="http://schemas.openxmlformats.org/drawingml/2006/main" xmlns:r="http://schemas.openxmlformats.org/officeDocument/2006/relationships" xmlns:p="http://schemas.openxmlformats.org/presentationml/2006/main">
+  <p:cSld>
+    <p:spTree>
+      <p:nvGrpSpPr>
+        <p:cNvPr id="1" name="Shape 101"/>
+        <p:cNvGrpSpPr/>
+        <p:nvPr/>
+      </p:nvGrpSpPr>
+      <p:grpSpPr>
+        <a:xfrm>
+          <a:off x="0" y="0"/>
+          <a:ext cx="0" cy="0"/>
+          <a:chOff x="0" y="0"/>
+          <a:chExt cx="0" cy="0"/>
+        </a:xfrm>
+      </p:grpSpPr>
+      <p:sp>
+        <p:nvSpPr>
+          <p:cNvPr id="102" name="Google Shape;102;p20"/>
+          <p:cNvSpPr txBox="1">
+            <a:spLocks noGrp="1"/>
+          </p:cNvSpPr>
+          <p:nvPr>
+            <p:ph type="title"/>
+          </p:nvPr>
+        </p:nvSpPr>
+        <p:spPr>
+          <a:xfrm>
+            <a:off x="226208" y="185742"/>
+            <a:ext cx="8520600" cy="572700"/>
+          </a:xfrm>
+          <a:prstGeom prst="rect">
+            <a:avLst/>
+          </a:prstGeom>
+        </p:spPr>
+        <p:txBody>
+          <a:bodyPr spcFirstLastPara="1" wrap="square" lIns="91425" tIns="91425" rIns="91425" bIns="91425" anchor="t" anchorCtr="0">
+            <a:noAutofit/>
+          </a:bodyPr>
+          <a:lstStyle/>
+          <a:p>
+            <a:pPr marL="0" lvl="0" indent="0" algn="l" rtl="0">
+              <a:spcBef>
+                <a:spcPts val="0"/>
+              </a:spcBef>
+              <a:spcAft>
+                <a:spcPts val="0"/>
+              </a:spcAft>
+              <a:buNone/>
+            </a:pPr>
+            <a:r>
+              <a:rPr lang="en-GB" b="1" dirty="0">
+                <a:solidFill>
+                  <a:schemeClr val="tx1"/>
+                </a:solidFill>
+                <a:effectLst>
+                  <a:outerShdw blurRad="38100" dist="38100" dir="2700000" algn="tl">
+                    <a:srgbClr val="000000">
+                      <a:alpha val="43137"/>
+                    </a:srgbClr>
+                  </a:outerShdw>
+                </a:effectLst>
+              </a:rPr>
+              <a:t>Detailed behaviour</a:t>
+            </a:r>
+            <a:endParaRPr b="1" dirty="0">
+              <a:solidFill>
+                <a:schemeClr val="tx1"/>
+              </a:solidFill>
+              <a:effectLst>
+                <a:outerShdw blurRad="38100" dist="38100" dir="2700000" algn="tl">
+                  <a:srgbClr val="000000">
+                    <a:alpha val="43137"/>
+                  </a:srgbClr>
+                </a:outerShdw>
+              </a:effectLst>
+            </a:endParaRPr>
+          </a:p>
+        </p:txBody>
+      </p:sp>
+      <p:sp>
+        <p:nvSpPr>
+          <p:cNvPr id="2" name="Slide Number Placeholder 1">
+            <a:extLst>
+              <a:ext uri="{FF2B5EF4-FFF2-40B4-BE49-F238E27FC236}">
+                <a16:creationId xmlns:a16="http://schemas.microsoft.com/office/drawing/2014/main" id="{1993C304-8938-41C3-9583-2C7227088CD4}"/>
+              </a:ext>
+            </a:extLst>
+          </p:cNvPr>
+          <p:cNvSpPr>
+            <a:spLocks noGrp="1"/>
+          </p:cNvSpPr>
+          <p:nvPr>
+            <p:ph type="sldNum" idx="12"/>
+          </p:nvPr>
+        </p:nvSpPr>
+        <p:spPr/>
+        <p:txBody>
+          <a:bodyPr/>
+          <a:lstStyle/>
+          <a:p>
+            <a:pPr marL="0" lvl="0" indent="0" algn="r" rtl="0">
+              <a:spcBef>
+                <a:spcPts val="0"/>
+              </a:spcBef>
+              <a:spcAft>
+                <a:spcPts val="0"/>
+              </a:spcAft>
+              <a:buNone/>
+            </a:pPr>
+            <a:fld id="{00000000-1234-1234-1234-123412341234}" type="slidenum">
+              <a:rPr lang="en-GB" smtClean="0"/>
+              <a:t>9</a:t>
+            </a:fld>
+            <a:endParaRPr lang="en-GB"/>
+          </a:p>
+        </p:txBody>
+      </p:sp>
+      <p:pic>
+        <p:nvPicPr>
+          <p:cNvPr id="3074" name="Picture 2" descr="UC Request Routing">
+            <a:extLst>
+              <a:ext uri="{FF2B5EF4-FFF2-40B4-BE49-F238E27FC236}">
+                <a16:creationId xmlns:a16="http://schemas.microsoft.com/office/drawing/2014/main" id="{37B485D5-D86F-4696-BEBC-3226D81EFDF7}"/>
+              </a:ext>
+            </a:extLst>
+          </p:cNvPr>
+          <p:cNvPicPr>
+            <a:picLocks noChangeAspect="1" noChangeArrowheads="1"/>
+          </p:cNvPicPr>
+          <p:nvPr/>
+        </p:nvPicPr>
+        <p:blipFill>
+          <a:blip r:embed="rId3">
+            <a:extLst>
+              <a:ext uri="{28A0092B-C50C-407E-A947-70E740481C1C}">
+                <a14:useLocalDpi xmlns:a14="http://schemas.microsoft.com/office/drawing/2010/main" val="0"/>
+              </a:ext>
+            </a:extLst>
+          </a:blip>
+          <a:srcRect/>
+          <a:stretch>
+            <a:fillRect/>
+          </a:stretch>
+        </p:blipFill>
+        <p:spPr bwMode="auto">
+          <a:xfrm>
+            <a:off x="611842" y="1238099"/>
+            <a:ext cx="3556746" cy="3517662"/>
+          </a:xfrm>
+          <a:prstGeom prst="rect">
+            <a:avLst/>
+          </a:prstGeom>
+          <a:noFill/>
+          <a:ln w="19050">
+            <a:solidFill>
+              <a:schemeClr val="tx1"/>
+            </a:solidFill>
+          </a:ln>
+          <a:extLst>
+            <a:ext uri="{909E8E84-426E-40DD-AFC4-6F175D3DCCD1}">
+              <a14:hiddenFill xmlns:a14="http://schemas.microsoft.com/office/drawing/2010/main">
+                <a:solidFill>
+                  <a:srgbClr val="FFFFFF"/>
+                </a:solidFill>
+              </a14:hiddenFill>
+            </a:ext>
+          </a:extLst>
+        </p:spPr>
+      </p:pic>
+      <p:sp>
+        <p:nvSpPr>
+          <p:cNvPr id="5" name="TextBox 4">
+            <a:extLst>
+              <a:ext uri="{FF2B5EF4-FFF2-40B4-BE49-F238E27FC236}">
+                <a16:creationId xmlns:a16="http://schemas.microsoft.com/office/drawing/2014/main" id="{40FBE421-E6EC-4AE8-B9CD-ADEA23C49AAD}"/>
+              </a:ext>
+            </a:extLst>
+          </p:cNvPr>
+          <p:cNvSpPr txBox="1"/>
+          <p:nvPr/>
+        </p:nvSpPr>
+        <p:spPr>
+          <a:xfrm>
+            <a:off x="611842" y="844382"/>
+            <a:ext cx="3556746" cy="307777"/>
+          </a:xfrm>
+          <a:prstGeom prst="rect">
+            <a:avLst/>
+          </a:prstGeom>
+          <a:noFill/>
+        </p:spPr>
+        <p:txBody>
+          <a:bodyPr wrap="square" rtlCol="0">
+            <a:spAutoFit/>
+          </a:bodyPr>
+          <a:lstStyle/>
+          <a:p>
+            <a:pPr algn="ctr"/>
+            <a:r>
+              <a:rPr lang="en-US" b="1" dirty="0"/>
+              <a:t>Request Validator</a:t>
+            </a:r>
+            <a:endParaRPr lang="ru-RU" b="1" dirty="0"/>
+          </a:p>
+        </p:txBody>
+      </p:sp>
+      <p:pic>
+        <p:nvPicPr>
+          <p:cNvPr id="3076" name="Picture 4" descr="UC Request Routing">
+            <a:extLst>
+              <a:ext uri="{FF2B5EF4-FFF2-40B4-BE49-F238E27FC236}">
+                <a16:creationId xmlns:a16="http://schemas.microsoft.com/office/drawing/2014/main" id="{39D3E833-044C-4439-9822-90E0A5F85F5D}"/>
+              </a:ext>
+            </a:extLst>
+          </p:cNvPr>
+          <p:cNvPicPr>
+            <a:picLocks noChangeAspect="1" noChangeArrowheads="1"/>
+          </p:cNvPicPr>
+          <p:nvPr/>
+        </p:nvPicPr>
+        <p:blipFill>
+          <a:blip r:embed="rId4">
+            <a:extLst>
+              <a:ext uri="{28A0092B-C50C-407E-A947-70E740481C1C}">
+                <a14:useLocalDpi xmlns:a14="http://schemas.microsoft.com/office/drawing/2010/main" val="0"/>
+              </a:ext>
+            </a:extLst>
+          </a:blip>
+          <a:srcRect/>
+          <a:stretch>
+            <a:fillRect/>
+          </a:stretch>
+        </p:blipFill>
+        <p:spPr bwMode="auto">
+          <a:xfrm>
+            <a:off x="5232495" y="1238099"/>
+            <a:ext cx="3029098" cy="3517662"/>
+          </a:xfrm>
+          <a:prstGeom prst="rect">
+            <a:avLst/>
+          </a:prstGeom>
+          <a:noFill/>
+          <a:ln w="19050">
+            <a:solidFill>
+              <a:schemeClr val="tx1"/>
+            </a:solidFill>
+          </a:ln>
+          <a:extLst>
+            <a:ext uri="{909E8E84-426E-40DD-AFC4-6F175D3DCCD1}">
+              <a14:hiddenFill xmlns:a14="http://schemas.microsoft.com/office/drawing/2010/main">
+                <a:solidFill>
+                  <a:srgbClr val="FFFFFF"/>
+                </a:solidFill>
+              </a14:hiddenFill>
+            </a:ext>
+          </a:extLst>
+        </p:spPr>
+      </p:pic>
+      <p:sp>
+        <p:nvSpPr>
+          <p:cNvPr id="10" name="TextBox 9">
+            <a:extLst>
+              <a:ext uri="{FF2B5EF4-FFF2-40B4-BE49-F238E27FC236}">
+                <a16:creationId xmlns:a16="http://schemas.microsoft.com/office/drawing/2014/main" id="{5FEE58F1-6A47-41C8-A39B-651FD571848E}"/>
+              </a:ext>
+            </a:extLst>
+          </p:cNvPr>
+          <p:cNvSpPr txBox="1"/>
+          <p:nvPr/>
+        </p:nvSpPr>
+        <p:spPr>
+          <a:xfrm>
+            <a:off x="5232495" y="844381"/>
+            <a:ext cx="3029098" cy="307777"/>
+          </a:xfrm>
+          <a:prstGeom prst="rect">
+            <a:avLst/>
+          </a:prstGeom>
+          <a:noFill/>
+        </p:spPr>
+        <p:txBody>
+          <a:bodyPr wrap="square" rtlCol="0">
+            <a:spAutoFit/>
+          </a:bodyPr>
+          <a:lstStyle/>
+          <a:p>
+            <a:pPr algn="ctr"/>
+            <a:r>
+              <a:rPr lang="en-US" b="1" dirty="0" err="1"/>
+              <a:t>OpenAPI</a:t>
+            </a:r>
+            <a:r>
+              <a:rPr lang="en-US" b="1" dirty="0"/>
+              <a:t> Schema Generator</a:t>
+            </a:r>
+            <a:endParaRPr lang="ru-RU" b="1" dirty="0"/>
+          </a:p>
+        </p:txBody>
+      </p:sp>
     </p:spTree>
   </p:cSld>
   <p:clrMapOvr>

</xml_diff>

<commit_message>
fin of the fin of the fin (#5)
</commit_message>
<xml_diff>
--- a/PracticeTasks/Final_Task/K8C_FinalTask1_(Task8).pptx
+++ b/PracticeTasks/Final_Task/K8C_FinalTask1_(Task8).pptx
@@ -5,35 +5,34 @@
     <p:sldMasterId id="2147483659" r:id="rId1"/>
   </p:sldMasterIdLst>
   <p:notesMasterIdLst>
-    <p:notesMasterId r:id="rId28"/>
+    <p:notesMasterId r:id="rId27"/>
   </p:notesMasterIdLst>
   <p:sldIdLst>
     <p:sldId id="256" r:id="rId2"/>
     <p:sldId id="267" r:id="rId3"/>
-    <p:sldId id="269" r:id="rId4"/>
-    <p:sldId id="270" r:id="rId5"/>
-    <p:sldId id="268" r:id="rId6"/>
-    <p:sldId id="272" r:id="rId7"/>
-    <p:sldId id="260" r:id="rId8"/>
-    <p:sldId id="261" r:id="rId9"/>
-    <p:sldId id="262" r:id="rId10"/>
-    <p:sldId id="263" r:id="rId11"/>
-    <p:sldId id="284" r:id="rId12"/>
-    <p:sldId id="264" r:id="rId13"/>
-    <p:sldId id="265" r:id="rId14"/>
-    <p:sldId id="273" r:id="rId15"/>
-    <p:sldId id="285" r:id="rId16"/>
-    <p:sldId id="271" r:id="rId17"/>
-    <p:sldId id="274" r:id="rId18"/>
-    <p:sldId id="275" r:id="rId19"/>
-    <p:sldId id="276" r:id="rId20"/>
-    <p:sldId id="277" r:id="rId21"/>
-    <p:sldId id="278" r:id="rId22"/>
-    <p:sldId id="279" r:id="rId23"/>
-    <p:sldId id="280" r:id="rId24"/>
-    <p:sldId id="281" r:id="rId25"/>
-    <p:sldId id="282" r:id="rId26"/>
-    <p:sldId id="283" r:id="rId27"/>
+    <p:sldId id="268" r:id="rId4"/>
+    <p:sldId id="269" r:id="rId5"/>
+    <p:sldId id="272" r:id="rId6"/>
+    <p:sldId id="260" r:id="rId7"/>
+    <p:sldId id="261" r:id="rId8"/>
+    <p:sldId id="262" r:id="rId9"/>
+    <p:sldId id="263" r:id="rId10"/>
+    <p:sldId id="284" r:id="rId11"/>
+    <p:sldId id="264" r:id="rId12"/>
+    <p:sldId id="265" r:id="rId13"/>
+    <p:sldId id="273" r:id="rId14"/>
+    <p:sldId id="285" r:id="rId15"/>
+    <p:sldId id="271" r:id="rId16"/>
+    <p:sldId id="274" r:id="rId17"/>
+    <p:sldId id="275" r:id="rId18"/>
+    <p:sldId id="276" r:id="rId19"/>
+    <p:sldId id="277" r:id="rId20"/>
+    <p:sldId id="278" r:id="rId21"/>
+    <p:sldId id="279" r:id="rId22"/>
+    <p:sldId id="280" r:id="rId23"/>
+    <p:sldId id="281" r:id="rId24"/>
+    <p:sldId id="282" r:id="rId25"/>
+    <p:sldId id="283" r:id="rId26"/>
   </p:sldIdLst>
   <p:sldSz cx="9144000" cy="5143500" type="screen16x9"/>
   <p:notesSz cx="6858000" cy="9144000"/>
@@ -273,9 +272,8 @@
           <p14:sldIdLst>
             <p14:sldId id="256"/>
             <p14:sldId id="267"/>
+            <p14:sldId id="268"/>
             <p14:sldId id="269"/>
-            <p14:sldId id="270"/>
-            <p14:sldId id="268"/>
             <p14:sldId id="272"/>
             <p14:sldId id="260"/>
             <p14:sldId id="261"/>
@@ -6776,315 +6774,6 @@
       </p:sp>
       <p:pic>
         <p:nvPicPr>
-          <p:cNvPr id="3074" name="Picture 2" descr="UC Request Routing">
-            <a:extLst>
-              <a:ext uri="{FF2B5EF4-FFF2-40B4-BE49-F238E27FC236}">
-                <a16:creationId xmlns:a16="http://schemas.microsoft.com/office/drawing/2014/main" id="{37B485D5-D86F-4696-BEBC-3226D81EFDF7}"/>
-              </a:ext>
-            </a:extLst>
-          </p:cNvPr>
-          <p:cNvPicPr>
-            <a:picLocks noChangeAspect="1" noChangeArrowheads="1"/>
-          </p:cNvPicPr>
-          <p:nvPr/>
-        </p:nvPicPr>
-        <p:blipFill>
-          <a:blip r:embed="rId3">
-            <a:extLst>
-              <a:ext uri="{28A0092B-C50C-407E-A947-70E740481C1C}">
-                <a14:useLocalDpi xmlns:a14="http://schemas.microsoft.com/office/drawing/2010/main" val="0"/>
-              </a:ext>
-            </a:extLst>
-          </a:blip>
-          <a:srcRect/>
-          <a:stretch>
-            <a:fillRect/>
-          </a:stretch>
-        </p:blipFill>
-        <p:spPr bwMode="auto">
-          <a:xfrm>
-            <a:off x="611842" y="1238099"/>
-            <a:ext cx="3556746" cy="3517662"/>
-          </a:xfrm>
-          <a:prstGeom prst="rect">
-            <a:avLst/>
-          </a:prstGeom>
-          <a:noFill/>
-          <a:ln w="19050">
-            <a:solidFill>
-              <a:schemeClr val="tx1"/>
-            </a:solidFill>
-          </a:ln>
-          <a:extLst>
-            <a:ext uri="{909E8E84-426E-40DD-AFC4-6F175D3DCCD1}">
-              <a14:hiddenFill xmlns:a14="http://schemas.microsoft.com/office/drawing/2010/main">
-                <a:solidFill>
-                  <a:srgbClr val="FFFFFF"/>
-                </a:solidFill>
-              </a14:hiddenFill>
-            </a:ext>
-          </a:extLst>
-        </p:spPr>
-      </p:pic>
-      <p:sp>
-        <p:nvSpPr>
-          <p:cNvPr id="5" name="TextBox 4">
-            <a:extLst>
-              <a:ext uri="{FF2B5EF4-FFF2-40B4-BE49-F238E27FC236}">
-                <a16:creationId xmlns:a16="http://schemas.microsoft.com/office/drawing/2014/main" id="{40FBE421-E6EC-4AE8-B9CD-ADEA23C49AAD}"/>
-              </a:ext>
-            </a:extLst>
-          </p:cNvPr>
-          <p:cNvSpPr txBox="1"/>
-          <p:nvPr/>
-        </p:nvSpPr>
-        <p:spPr>
-          <a:xfrm>
-            <a:off x="611842" y="844382"/>
-            <a:ext cx="3556746" cy="307777"/>
-          </a:xfrm>
-          <a:prstGeom prst="rect">
-            <a:avLst/>
-          </a:prstGeom>
-          <a:noFill/>
-        </p:spPr>
-        <p:txBody>
-          <a:bodyPr wrap="square" rtlCol="0">
-            <a:spAutoFit/>
-          </a:bodyPr>
-          <a:lstStyle/>
-          <a:p>
-            <a:pPr algn="ctr"/>
-            <a:r>
-              <a:rPr lang="en-US" b="1" dirty="0"/>
-              <a:t>Request Validator</a:t>
-            </a:r>
-            <a:endParaRPr lang="ru-RU" b="1" dirty="0"/>
-          </a:p>
-        </p:txBody>
-      </p:sp>
-      <p:pic>
-        <p:nvPicPr>
-          <p:cNvPr id="3076" name="Picture 4" descr="UC Request Routing">
-            <a:extLst>
-              <a:ext uri="{FF2B5EF4-FFF2-40B4-BE49-F238E27FC236}">
-                <a16:creationId xmlns:a16="http://schemas.microsoft.com/office/drawing/2014/main" id="{39D3E833-044C-4439-9822-90E0A5F85F5D}"/>
-              </a:ext>
-            </a:extLst>
-          </p:cNvPr>
-          <p:cNvPicPr>
-            <a:picLocks noChangeAspect="1" noChangeArrowheads="1"/>
-          </p:cNvPicPr>
-          <p:nvPr/>
-        </p:nvPicPr>
-        <p:blipFill>
-          <a:blip r:embed="rId4">
-            <a:extLst>
-              <a:ext uri="{28A0092B-C50C-407E-A947-70E740481C1C}">
-                <a14:useLocalDpi xmlns:a14="http://schemas.microsoft.com/office/drawing/2010/main" val="0"/>
-              </a:ext>
-            </a:extLst>
-          </a:blip>
-          <a:srcRect/>
-          <a:stretch>
-            <a:fillRect/>
-          </a:stretch>
-        </p:blipFill>
-        <p:spPr bwMode="auto">
-          <a:xfrm>
-            <a:off x="5232495" y="1238099"/>
-            <a:ext cx="3029098" cy="3517662"/>
-          </a:xfrm>
-          <a:prstGeom prst="rect">
-            <a:avLst/>
-          </a:prstGeom>
-          <a:noFill/>
-          <a:ln w="19050">
-            <a:solidFill>
-              <a:schemeClr val="tx1"/>
-            </a:solidFill>
-          </a:ln>
-          <a:extLst>
-            <a:ext uri="{909E8E84-426E-40DD-AFC4-6F175D3DCCD1}">
-              <a14:hiddenFill xmlns:a14="http://schemas.microsoft.com/office/drawing/2010/main">
-                <a:solidFill>
-                  <a:srgbClr val="FFFFFF"/>
-                </a:solidFill>
-              </a14:hiddenFill>
-            </a:ext>
-          </a:extLst>
-        </p:spPr>
-      </p:pic>
-      <p:sp>
-        <p:nvSpPr>
-          <p:cNvPr id="10" name="TextBox 9">
-            <a:extLst>
-              <a:ext uri="{FF2B5EF4-FFF2-40B4-BE49-F238E27FC236}">
-                <a16:creationId xmlns:a16="http://schemas.microsoft.com/office/drawing/2014/main" id="{5FEE58F1-6A47-41C8-A39B-651FD571848E}"/>
-              </a:ext>
-            </a:extLst>
-          </p:cNvPr>
-          <p:cNvSpPr txBox="1"/>
-          <p:nvPr/>
-        </p:nvSpPr>
-        <p:spPr>
-          <a:xfrm>
-            <a:off x="5232495" y="844381"/>
-            <a:ext cx="3029098" cy="307777"/>
-          </a:xfrm>
-          <a:prstGeom prst="rect">
-            <a:avLst/>
-          </a:prstGeom>
-          <a:noFill/>
-        </p:spPr>
-        <p:txBody>
-          <a:bodyPr wrap="square" rtlCol="0">
-            <a:spAutoFit/>
-          </a:bodyPr>
-          <a:lstStyle/>
-          <a:p>
-            <a:pPr algn="ctr"/>
-            <a:r>
-              <a:rPr lang="en-US" b="1" dirty="0" err="1"/>
-              <a:t>OpenAPI</a:t>
-            </a:r>
-            <a:r>
-              <a:rPr lang="en-US" b="1" dirty="0"/>
-              <a:t> Schema Generator</a:t>
-            </a:r>
-            <a:endParaRPr lang="ru-RU" b="1" dirty="0"/>
-          </a:p>
-        </p:txBody>
-      </p:sp>
-    </p:spTree>
-  </p:cSld>
-  <p:clrMapOvr>
-    <a:masterClrMapping/>
-  </p:clrMapOvr>
-</p:sld>
-</file>
-
-<file path=ppt/slides/slide11.xml><?xml version="1.0" encoding="utf-8"?>
-<p:sld xmlns:a="http://schemas.openxmlformats.org/drawingml/2006/main" xmlns:r="http://schemas.openxmlformats.org/officeDocument/2006/relationships" xmlns:p="http://schemas.openxmlformats.org/presentationml/2006/main">
-  <p:cSld>
-    <p:spTree>
-      <p:nvGrpSpPr>
-        <p:cNvPr id="1" name="Shape 101"/>
-        <p:cNvGrpSpPr/>
-        <p:nvPr/>
-      </p:nvGrpSpPr>
-      <p:grpSpPr>
-        <a:xfrm>
-          <a:off x="0" y="0"/>
-          <a:ext cx="0" cy="0"/>
-          <a:chOff x="0" y="0"/>
-          <a:chExt cx="0" cy="0"/>
-        </a:xfrm>
-      </p:grpSpPr>
-      <p:sp>
-        <p:nvSpPr>
-          <p:cNvPr id="102" name="Google Shape;102;p20"/>
-          <p:cNvSpPr txBox="1">
-            <a:spLocks noGrp="1"/>
-          </p:cNvSpPr>
-          <p:nvPr>
-            <p:ph type="title"/>
-          </p:nvPr>
-        </p:nvSpPr>
-        <p:spPr>
-          <a:xfrm>
-            <a:off x="226208" y="185742"/>
-            <a:ext cx="8520600" cy="572700"/>
-          </a:xfrm>
-          <a:prstGeom prst="rect">
-            <a:avLst/>
-          </a:prstGeom>
-        </p:spPr>
-        <p:txBody>
-          <a:bodyPr spcFirstLastPara="1" wrap="square" lIns="91425" tIns="91425" rIns="91425" bIns="91425" anchor="t" anchorCtr="0">
-            <a:noAutofit/>
-          </a:bodyPr>
-          <a:lstStyle/>
-          <a:p>
-            <a:pPr marL="0" lvl="0" indent="0" algn="l" rtl="0">
-              <a:spcBef>
-                <a:spcPts val="0"/>
-              </a:spcBef>
-              <a:spcAft>
-                <a:spcPts val="0"/>
-              </a:spcAft>
-              <a:buNone/>
-            </a:pPr>
-            <a:r>
-              <a:rPr lang="en-GB" b="1" dirty="0">
-                <a:solidFill>
-                  <a:schemeClr val="tx1"/>
-                </a:solidFill>
-                <a:effectLst>
-                  <a:outerShdw blurRad="38100" dist="38100" dir="2700000" algn="tl">
-                    <a:srgbClr val="000000">
-                      <a:alpha val="43137"/>
-                    </a:srgbClr>
-                  </a:outerShdw>
-                </a:effectLst>
-              </a:rPr>
-              <a:t>Detailed behaviour</a:t>
-            </a:r>
-            <a:endParaRPr b="1" dirty="0">
-              <a:solidFill>
-                <a:schemeClr val="tx1"/>
-              </a:solidFill>
-              <a:effectLst>
-                <a:outerShdw blurRad="38100" dist="38100" dir="2700000" algn="tl">
-                  <a:srgbClr val="000000">
-                    <a:alpha val="43137"/>
-                  </a:srgbClr>
-                </a:outerShdw>
-              </a:effectLst>
-            </a:endParaRPr>
-          </a:p>
-        </p:txBody>
-      </p:sp>
-      <p:sp>
-        <p:nvSpPr>
-          <p:cNvPr id="2" name="Slide Number Placeholder 1">
-            <a:extLst>
-              <a:ext uri="{FF2B5EF4-FFF2-40B4-BE49-F238E27FC236}">
-                <a16:creationId xmlns:a16="http://schemas.microsoft.com/office/drawing/2014/main" id="{1993C304-8938-41C3-9583-2C7227088CD4}"/>
-              </a:ext>
-            </a:extLst>
-          </p:cNvPr>
-          <p:cNvSpPr>
-            <a:spLocks noGrp="1"/>
-          </p:cNvSpPr>
-          <p:nvPr>
-            <p:ph type="sldNum" idx="12"/>
-          </p:nvPr>
-        </p:nvSpPr>
-        <p:spPr/>
-        <p:txBody>
-          <a:bodyPr/>
-          <a:lstStyle/>
-          <a:p>
-            <a:pPr marL="0" lvl="0" indent="0" algn="r" rtl="0">
-              <a:spcBef>
-                <a:spcPts val="0"/>
-              </a:spcBef>
-              <a:spcAft>
-                <a:spcPts val="0"/>
-              </a:spcAft>
-              <a:buNone/>
-            </a:pPr>
-            <a:fld id="{00000000-1234-1234-1234-123412341234}" type="slidenum">
-              <a:rPr lang="en-GB" smtClean="0"/>
-              <a:t>11</a:t>
-            </a:fld>
-            <a:endParaRPr lang="en-GB"/>
-          </a:p>
-        </p:txBody>
-      </p:sp>
-      <p:pic>
-        <p:nvPicPr>
           <p:cNvPr id="3074" name="Picture 2">
             <a:extLst>
               <a:ext uri="{FF2B5EF4-FFF2-40B4-BE49-F238E27FC236}">
@@ -7262,7 +6951,7 @@
 </p:sld>
 </file>
 
-<file path=ppt/slides/slide12.xml><?xml version="1.0" encoding="utf-8"?>
+<file path=ppt/slides/slide11.xml><?xml version="1.0" encoding="utf-8"?>
 <p:sld xmlns:a="http://schemas.openxmlformats.org/drawingml/2006/main" xmlns:r="http://schemas.openxmlformats.org/officeDocument/2006/relationships" xmlns:p="http://schemas.openxmlformats.org/presentationml/2006/main">
   <p:cSld>
     <p:spTree>
@@ -7355,7 +7044,7 @@
         </p:nvSpPr>
         <p:spPr>
           <a:xfrm>
-            <a:off x="311700" y="1152475"/>
+            <a:off x="304977" y="964831"/>
             <a:ext cx="2924368" cy="3698386"/>
           </a:xfrm>
           <a:prstGeom prst="rect">
@@ -7694,7 +7383,7 @@
         </p:nvSpPr>
         <p:spPr>
           <a:xfrm>
-            <a:off x="5265905" y="1152475"/>
+            <a:off x="5306246" y="964831"/>
             <a:ext cx="2386519" cy="1154162"/>
           </a:xfrm>
           <a:prstGeom prst="rect">
@@ -7785,7 +7474,7 @@
             </a:pPr>
             <a:fld id="{00000000-1234-1234-1234-123412341234}" type="slidenum">
               <a:rPr lang="en-GB" smtClean="0"/>
-              <a:t>12</a:t>
+              <a:t>11</a:t>
             </a:fld>
             <a:endParaRPr lang="en-GB"/>
           </a:p>
@@ -7799,7 +7488,7 @@
 </p:sld>
 </file>
 
-<file path=ppt/slides/slide13.xml><?xml version="1.0" encoding="utf-8"?>
+<file path=ppt/slides/slide12.xml><?xml version="1.0" encoding="utf-8"?>
 <p:sld xmlns:a="http://schemas.openxmlformats.org/drawingml/2006/main" xmlns:r="http://schemas.openxmlformats.org/officeDocument/2006/relationships" xmlns:p="http://schemas.openxmlformats.org/presentationml/2006/main">
   <p:cSld>
     <p:spTree>
@@ -7895,7 +7584,7 @@
           <p:nvPr>
             <p:extLst>
               <p:ext uri="{D42A27DB-BD31-4B8C-83A1-F6EECF244321}">
-                <p14:modId xmlns:p14="http://schemas.microsoft.com/office/powerpoint/2010/main" val="1093907184"/>
+                <p14:modId xmlns:p14="http://schemas.microsoft.com/office/powerpoint/2010/main" val="3813174674"/>
               </p:ext>
             </p:extLst>
           </p:nvPr>
@@ -7962,7 +7651,7 @@
                             <a:schemeClr val="tx1"/>
                           </a:solidFill>
                         </a:rPr>
-                        <a:t>Story Map, CRC</a:t>
+                        <a:t>Story Map, CRC Cards</a:t>
                       </a:r>
                       <a:endParaRPr lang="ru-RU" dirty="0">
                         <a:solidFill>
@@ -8027,7 +7716,7 @@
                             <a:schemeClr val="tx1"/>
                           </a:solidFill>
                         </a:rPr>
-                        <a:t>Use cases, Interactions Diagram</a:t>
+                        <a:t>Use cases, Interactions Analysis</a:t>
                       </a:r>
                       <a:endParaRPr lang="ru-RU" dirty="0">
                         <a:solidFill>
@@ -8171,7 +7860,17 @@
                             <a:schemeClr val="tx1"/>
                           </a:solidFill>
                         </a:rPr>
-                        <a:t>CRC Cards, Behavior model</a:t>
+                        <a:t>Story Map,</a:t>
+                      </a:r>
+                    </a:p>
+                    <a:p>
+                      <a:r>
+                        <a:rPr lang="en-US" dirty="0">
+                          <a:solidFill>
+                            <a:schemeClr val="tx1"/>
+                          </a:solidFill>
+                        </a:rPr>
+                        <a:t>Behavior model</a:t>
                       </a:r>
                       <a:endParaRPr lang="ru-RU" dirty="0">
                         <a:solidFill>
@@ -9079,7 +8778,7 @@
             </a:pPr>
             <a:fld id="{00000000-1234-1234-1234-123412341234}" type="slidenum">
               <a:rPr lang="en-GB" smtClean="0"/>
-              <a:t>13</a:t>
+              <a:t>12</a:t>
             </a:fld>
             <a:endParaRPr lang="en-GB"/>
           </a:p>
@@ -9093,7 +8792,7 @@
 </p:sld>
 </file>
 
-<file path=ppt/slides/slide14.xml><?xml version="1.0" encoding="utf-8"?>
+<file path=ppt/slides/slide13.xml><?xml version="1.0" encoding="utf-8"?>
 <p:sld xmlns:a="http://schemas.openxmlformats.org/drawingml/2006/main" xmlns:r="http://schemas.openxmlformats.org/officeDocument/2006/relationships" xmlns:p="http://schemas.openxmlformats.org/presentationml/2006/main">
   <p:cSld>
     <p:spTree>
@@ -9192,7 +8891,7 @@
             </a:pPr>
             <a:fld id="{00000000-1234-1234-1234-123412341234}" type="slidenum">
               <a:rPr lang="en-GB" smtClean="0"/>
-              <a:t>14</a:t>
+              <a:t>13</a:t>
             </a:fld>
             <a:endParaRPr lang="en-GB"/>
           </a:p>
@@ -9211,7 +8910,7 @@
 </p:sld>
 </file>
 
-<file path=ppt/slides/slide15.xml><?xml version="1.0" encoding="utf-8"?>
+<file path=ppt/slides/slide14.xml><?xml version="1.0" encoding="utf-8"?>
 <p:sld xmlns:a="http://schemas.openxmlformats.org/drawingml/2006/main" xmlns:r="http://schemas.openxmlformats.org/officeDocument/2006/relationships" xmlns:p="http://schemas.openxmlformats.org/presentationml/2006/main">
   <p:cSld>
     <p:spTree>
@@ -9311,7 +9010,7 @@
             </a:pPr>
             <a:fld id="{00000000-1234-1234-1234-123412341234}" type="slidenum">
               <a:rPr lang="en-GB" smtClean="0"/>
-              <a:t>15</a:t>
+              <a:t>14</a:t>
             </a:fld>
             <a:endParaRPr lang="en-GB"/>
           </a:p>
@@ -9330,7 +9029,7 @@
 </p:sld>
 </file>
 
-<file path=ppt/slides/slide16.xml><?xml version="1.0" encoding="utf-8"?>
+<file path=ppt/slides/slide15.xml><?xml version="1.0" encoding="utf-8"?>
 <p:sld xmlns:a="http://schemas.openxmlformats.org/drawingml/2006/main" xmlns:r="http://schemas.openxmlformats.org/officeDocument/2006/relationships" xmlns:p="http://schemas.openxmlformats.org/presentationml/2006/main">
   <p:cSld>
     <p:spTree>
@@ -9478,7 +9177,7 @@
             </a:pPr>
             <a:fld id="{00000000-1234-1234-1234-123412341234}" type="slidenum">
               <a:rPr lang="en-GB" smtClean="0"/>
-              <a:t>16</a:t>
+              <a:t>15</a:t>
             </a:fld>
             <a:endParaRPr lang="en-GB"/>
           </a:p>
@@ -9492,7 +9191,7 @@
 </p:sld>
 </file>
 
-<file path=ppt/slides/slide17.xml><?xml version="1.0" encoding="utf-8"?>
+<file path=ppt/slides/slide16.xml><?xml version="1.0" encoding="utf-8"?>
 <p:sld xmlns:a="http://schemas.openxmlformats.org/drawingml/2006/main" xmlns:r="http://schemas.openxmlformats.org/officeDocument/2006/relationships" xmlns:p="http://schemas.openxmlformats.org/presentationml/2006/main">
   <p:cSld>
     <p:spTree>
@@ -9591,7 +9290,7 @@
             </a:pPr>
             <a:fld id="{00000000-1234-1234-1234-123412341234}" type="slidenum">
               <a:rPr lang="en-GB" smtClean="0"/>
-              <a:t>17</a:t>
+              <a:t>16</a:t>
             </a:fld>
             <a:endParaRPr lang="en-GB"/>
           </a:p>
@@ -9657,7 +9356,7 @@
 </p:sld>
 </file>
 
-<file path=ppt/slides/slide18.xml><?xml version="1.0" encoding="utf-8"?>
+<file path=ppt/slides/slide17.xml><?xml version="1.0" encoding="utf-8"?>
 <p:sld xmlns:a="http://schemas.openxmlformats.org/drawingml/2006/main" xmlns:r="http://schemas.openxmlformats.org/officeDocument/2006/relationships" xmlns:p="http://schemas.openxmlformats.org/presentationml/2006/main">
   <p:cSld>
     <p:spTree>
@@ -9756,7 +9455,7 @@
             </a:pPr>
             <a:fld id="{00000000-1234-1234-1234-123412341234}" type="slidenum">
               <a:rPr lang="en-GB" smtClean="0"/>
-              <a:t>18</a:t>
+              <a:t>17</a:t>
             </a:fld>
             <a:endParaRPr lang="en-GB"/>
           </a:p>
@@ -9822,7 +9521,7 @@
 </p:sld>
 </file>
 
-<file path=ppt/slides/slide19.xml><?xml version="1.0" encoding="utf-8"?>
+<file path=ppt/slides/slide18.xml><?xml version="1.0" encoding="utf-8"?>
 <p:sld xmlns:a="http://schemas.openxmlformats.org/drawingml/2006/main" xmlns:r="http://schemas.openxmlformats.org/officeDocument/2006/relationships" xmlns:p="http://schemas.openxmlformats.org/presentationml/2006/main">
   <p:cSld>
     <p:spTree>
@@ -9921,7 +9620,7 @@
             </a:pPr>
             <a:fld id="{00000000-1234-1234-1234-123412341234}" type="slidenum">
               <a:rPr lang="en-GB" smtClean="0"/>
-              <a:t>19</a:t>
+              <a:t>18</a:t>
             </a:fld>
             <a:endParaRPr lang="en-GB"/>
           </a:p>
@@ -9987,6 +9686,171 @@
 </p:sld>
 </file>
 
+<file path=ppt/slides/slide19.xml><?xml version="1.0" encoding="utf-8"?>
+<p:sld xmlns:a="http://schemas.openxmlformats.org/drawingml/2006/main" xmlns:r="http://schemas.openxmlformats.org/officeDocument/2006/relationships" xmlns:p="http://schemas.openxmlformats.org/presentationml/2006/main">
+  <p:cSld>
+    <p:spTree>
+      <p:nvGrpSpPr>
+        <p:cNvPr id="1" name=""/>
+        <p:cNvGrpSpPr/>
+        <p:nvPr/>
+      </p:nvGrpSpPr>
+      <p:grpSpPr>
+        <a:xfrm>
+          <a:off x="0" y="0"/>
+          <a:ext cx="0" cy="0"/>
+          <a:chOff x="0" y="0"/>
+          <a:chExt cx="0" cy="0"/>
+        </a:xfrm>
+      </p:grpSpPr>
+      <p:sp>
+        <p:nvSpPr>
+          <p:cNvPr id="2" name="Заголовок 1">
+            <a:extLst>
+              <a:ext uri="{FF2B5EF4-FFF2-40B4-BE49-F238E27FC236}">
+                <a16:creationId xmlns:a16="http://schemas.microsoft.com/office/drawing/2014/main" id="{BF8EE9D0-0305-4DAD-A8A5-E3E71B917267}"/>
+              </a:ext>
+            </a:extLst>
+          </p:cNvPr>
+          <p:cNvSpPr>
+            <a:spLocks noGrp="1"/>
+          </p:cNvSpPr>
+          <p:nvPr>
+            <p:ph type="title"/>
+          </p:nvPr>
+        </p:nvSpPr>
+        <p:spPr>
+          <a:xfrm>
+            <a:off x="311700" y="243319"/>
+            <a:ext cx="8520600" cy="572700"/>
+          </a:xfrm>
+        </p:spPr>
+        <p:txBody>
+          <a:bodyPr/>
+          <a:lstStyle/>
+          <a:p>
+            <a:r>
+              <a:rPr lang="en-US" b="1" dirty="0">
+                <a:effectLst>
+                  <a:outerShdw blurRad="38100" dist="38100" dir="2700000" algn="tl">
+                    <a:srgbClr val="000000">
+                      <a:alpha val="43137"/>
+                    </a:srgbClr>
+                  </a:outerShdw>
+                </a:effectLst>
+              </a:rPr>
+              <a:t>Use Cases: Authorization (SSO)</a:t>
+            </a:r>
+            <a:endParaRPr lang="ru-RU" b="1" dirty="0">
+              <a:effectLst>
+                <a:outerShdw blurRad="38100" dist="38100" dir="2700000" algn="tl">
+                  <a:srgbClr val="000000">
+                    <a:alpha val="43137"/>
+                  </a:srgbClr>
+                </a:outerShdw>
+              </a:effectLst>
+            </a:endParaRPr>
+          </a:p>
+        </p:txBody>
+      </p:sp>
+      <p:sp>
+        <p:nvSpPr>
+          <p:cNvPr id="3" name="Номер слайда 2">
+            <a:extLst>
+              <a:ext uri="{FF2B5EF4-FFF2-40B4-BE49-F238E27FC236}">
+                <a16:creationId xmlns:a16="http://schemas.microsoft.com/office/drawing/2014/main" id="{09FB8480-1FB4-49A4-B531-A9B589ECD31D}"/>
+              </a:ext>
+            </a:extLst>
+          </p:cNvPr>
+          <p:cNvSpPr>
+            <a:spLocks noGrp="1"/>
+          </p:cNvSpPr>
+          <p:nvPr>
+            <p:ph type="sldNum" idx="12"/>
+          </p:nvPr>
+        </p:nvSpPr>
+        <p:spPr/>
+        <p:txBody>
+          <a:bodyPr/>
+          <a:lstStyle/>
+          <a:p>
+            <a:pPr marL="0" lvl="0" indent="0" algn="r" rtl="0">
+              <a:spcBef>
+                <a:spcPts val="0"/>
+              </a:spcBef>
+              <a:spcAft>
+                <a:spcPts val="0"/>
+              </a:spcAft>
+              <a:buNone/>
+            </a:pPr>
+            <a:fld id="{00000000-1234-1234-1234-123412341234}" type="slidenum">
+              <a:rPr lang="en-GB" smtClean="0"/>
+              <a:t>19</a:t>
+            </a:fld>
+            <a:endParaRPr lang="en-GB"/>
+          </a:p>
+        </p:txBody>
+      </p:sp>
+      <p:pic>
+        <p:nvPicPr>
+          <p:cNvPr id="8194" name="Picture 2" descr="UC Authorization">
+            <a:extLst>
+              <a:ext uri="{FF2B5EF4-FFF2-40B4-BE49-F238E27FC236}">
+                <a16:creationId xmlns:a16="http://schemas.microsoft.com/office/drawing/2014/main" id="{7D28B00A-004C-4E41-880C-3BCEA35E704D}"/>
+              </a:ext>
+            </a:extLst>
+          </p:cNvPr>
+          <p:cNvPicPr>
+            <a:picLocks noChangeAspect="1" noChangeArrowheads="1"/>
+          </p:cNvPicPr>
+          <p:nvPr/>
+        </p:nvPicPr>
+        <p:blipFill>
+          <a:blip r:embed="rId2">
+            <a:extLst>
+              <a:ext uri="{28A0092B-C50C-407E-A947-70E740481C1C}">
+                <a14:useLocalDpi xmlns:a14="http://schemas.microsoft.com/office/drawing/2010/main" val="0"/>
+              </a:ext>
+            </a:extLst>
+          </a:blip>
+          <a:srcRect/>
+          <a:stretch>
+            <a:fillRect/>
+          </a:stretch>
+        </p:blipFill>
+        <p:spPr bwMode="auto">
+          <a:xfrm>
+            <a:off x="1600199" y="1238229"/>
+            <a:ext cx="5515535" cy="3187815"/>
+          </a:xfrm>
+          <a:prstGeom prst="rect">
+            <a:avLst/>
+          </a:prstGeom>
+          <a:noFill/>
+          <a:extLst>
+            <a:ext uri="{909E8E84-426E-40DD-AFC4-6F175D3DCCD1}">
+              <a14:hiddenFill xmlns:a14="http://schemas.microsoft.com/office/drawing/2010/main">
+                <a:solidFill>
+                  <a:srgbClr val="FFFFFF"/>
+                </a:solidFill>
+              </a14:hiddenFill>
+            </a:ext>
+          </a:extLst>
+        </p:spPr>
+      </p:pic>
+    </p:spTree>
+    <p:extLst>
+      <p:ext uri="{BB962C8B-B14F-4D97-AF65-F5344CB8AC3E}">
+        <p14:creationId xmlns:p14="http://schemas.microsoft.com/office/powerpoint/2010/main" val="853089160"/>
+      </p:ext>
+    </p:extLst>
+  </p:cSld>
+  <p:clrMapOvr>
+    <a:masterClrMapping/>
+  </p:clrMapOvr>
+</p:sld>
+</file>
+
 <file path=ppt/slides/slide2.xml><?xml version="1.0" encoding="utf-8"?>
 <p:sld xmlns:a="http://schemas.openxmlformats.org/drawingml/2006/main" xmlns:r="http://schemas.openxmlformats.org/officeDocument/2006/relationships" xmlns:p="http://schemas.openxmlformats.org/presentationml/2006/main">
   <p:cSld>
@@ -10096,7 +9960,7 @@
                   <a:schemeClr val="dk1"/>
                 </a:solidFill>
               </a:rPr>
-              <a:t>The product is a platform for deploying, managing, and scaling machine learning models in production. It offers a secure, flexible environment for automating ML tasks like model versioning, routing, and monitoring. With Kubernetes integration and containerization support, it's designed for developers, ML engineers, and enterprises needing scalable, resilient ML infrastructure.</a:t>
+              <a:t>The product is a platform for deploying, managing, and scaling machine learning models in production. It offers a secure, flexible environment for automating ML tasks like model versioning, routing, and monitoring. With Kubernetes integration and containerization support, it's designed for developers, ML engineers, and enterprises needing scalable, reliable ML infrastructure.</a:t>
             </a:r>
           </a:p>
           <a:p>
@@ -10241,14 +10105,21 @@
             <a:r>
               <a:rPr lang="en-GB" sz="1400" u="sng" dirty="0">
                 <a:solidFill>
-                  <a:schemeClr val="dk1"/>
+                  <a:schemeClr val="tx1"/>
                 </a:solidFill>
+                <a:hlinkClick r:id="rId3">
+                  <a:extLst>
+                    <a:ext uri="{A12FA001-AC4F-418D-AE19-62706E023703}">
+                      <ahyp:hlinkClr xmlns:ahyp="http://schemas.microsoft.com/office/drawing/2018/hyperlinkcolor" val="tx"/>
+                    </a:ext>
+                  </a:extLst>
+                </a:hlinkClick>
               </a:rPr>
               <a:t>https://github.com/fanglores/Advanced-Software-Design</a:t>
             </a:r>
             <a:endParaRPr sz="1400" dirty="0">
               <a:solidFill>
-                <a:schemeClr val="dk1"/>
+                <a:schemeClr val="tx1"/>
               </a:solidFill>
             </a:endParaRPr>
           </a:p>
@@ -10283,6 +10154,13 @@
                 <a:solidFill>
                   <a:schemeClr val="dk1"/>
                 </a:solidFill>
+                <a:hlinkClick r:id="rId4">
+                  <a:extLst>
+                    <a:ext uri="{A12FA001-AC4F-418D-AE19-62706E023703}">
+                      <ahyp:hlinkClr xmlns:ahyp="http://schemas.microsoft.com/office/drawing/2018/hyperlinkcolor" val="tx"/>
+                    </a:ext>
+                  </a:extLst>
+                </a:hlinkClick>
               </a:rPr>
               <a:t>https://github.com/fanglores/Advanced-Software-Design</a:t>
             </a:r>
@@ -10291,6 +10169,13 @@
                 <a:solidFill>
                   <a:schemeClr val="dk1"/>
                 </a:solidFill>
+                <a:hlinkClick r:id="rId4">
+                  <a:extLst>
+                    <a:ext uri="{A12FA001-AC4F-418D-AE19-62706E023703}">
+                      <ahyp:hlinkClr xmlns:ahyp="http://schemas.microsoft.com/office/drawing/2018/hyperlinkcolor" val="tx"/>
+                    </a:ext>
+                  </a:extLst>
+                </a:hlinkClick>
               </a:rPr>
             </a:br>
             <a:r>
@@ -10298,6 +10183,13 @@
                 <a:solidFill>
                   <a:schemeClr val="dk1"/>
                 </a:solidFill>
+                <a:hlinkClick r:id="rId4">
+                  <a:extLst>
+                    <a:ext uri="{A12FA001-AC4F-418D-AE19-62706E023703}">
+                      <ahyp:hlinkClr xmlns:ahyp="http://schemas.microsoft.com/office/drawing/2018/hyperlinkcolor" val="tx"/>
+                    </a:ext>
+                  </a:extLst>
+                </a:hlinkClick>
               </a:rPr>
               <a:t>		</a:t>
             </a:r>
@@ -10306,6 +10198,13 @@
                 <a:solidFill>
                   <a:schemeClr val="dk1"/>
                 </a:solidFill>
+                <a:hlinkClick r:id="rId4">
+                  <a:extLst>
+                    <a:ext uri="{A12FA001-AC4F-418D-AE19-62706E023703}">
+                      <ahyp:hlinkClr xmlns:ahyp="http://schemas.microsoft.com/office/drawing/2018/hyperlinkcolor" val="tx"/>
+                    </a:ext>
+                  </a:extLst>
+                </a:hlinkClick>
               </a:rPr>
               <a:t>/blob/master/Practice%20Tasks/</a:t>
             </a:r>
@@ -10314,6 +10213,13 @@
                 <a:solidFill>
                   <a:schemeClr val="dk1"/>
                 </a:solidFill>
+                <a:hlinkClick r:id="rId4">
+                  <a:extLst>
+                    <a:ext uri="{A12FA001-AC4F-418D-AE19-62706E023703}">
+                      <ahyp:hlinkClr xmlns:ahyp="http://schemas.microsoft.com/office/drawing/2018/hyperlinkcolor" val="tx"/>
+                    </a:ext>
+                  </a:extLst>
+                </a:hlinkClick>
               </a:rPr>
               <a:t>Final_Task</a:t>
             </a:r>
@@ -10322,10 +10228,17 @@
                 <a:solidFill>
                   <a:schemeClr val="dk1"/>
                 </a:solidFill>
+                <a:hlinkClick r:id="rId4">
+                  <a:extLst>
+                    <a:ext uri="{A12FA001-AC4F-418D-AE19-62706E023703}">
+                      <ahyp:hlinkClr xmlns:ahyp="http://schemas.microsoft.com/office/drawing/2018/hyperlinkcolor" val="tx"/>
+                    </a:ext>
+                  </a:extLst>
+                </a:hlinkClick>
               </a:rPr>
-              <a:t>/K8C_FinalTask1_(Task7).pdf</a:t>
+              <a:t>/K8C_FinalTask1_(Task8).pdf</a:t>
             </a:r>
-            <a:endParaRPr sz="1400" dirty="0">
+            <a:endParaRPr sz="1400" u="sng" dirty="0">
               <a:solidFill>
                 <a:schemeClr val="dk1"/>
               </a:solidFill>
@@ -10385,171 +10298,6 @@
 </file>
 
 <file path=ppt/slides/slide20.xml><?xml version="1.0" encoding="utf-8"?>
-<p:sld xmlns:a="http://schemas.openxmlformats.org/drawingml/2006/main" xmlns:r="http://schemas.openxmlformats.org/officeDocument/2006/relationships" xmlns:p="http://schemas.openxmlformats.org/presentationml/2006/main">
-  <p:cSld>
-    <p:spTree>
-      <p:nvGrpSpPr>
-        <p:cNvPr id="1" name=""/>
-        <p:cNvGrpSpPr/>
-        <p:nvPr/>
-      </p:nvGrpSpPr>
-      <p:grpSpPr>
-        <a:xfrm>
-          <a:off x="0" y="0"/>
-          <a:ext cx="0" cy="0"/>
-          <a:chOff x="0" y="0"/>
-          <a:chExt cx="0" cy="0"/>
-        </a:xfrm>
-      </p:grpSpPr>
-      <p:sp>
-        <p:nvSpPr>
-          <p:cNvPr id="2" name="Заголовок 1">
-            <a:extLst>
-              <a:ext uri="{FF2B5EF4-FFF2-40B4-BE49-F238E27FC236}">
-                <a16:creationId xmlns:a16="http://schemas.microsoft.com/office/drawing/2014/main" id="{BF8EE9D0-0305-4DAD-A8A5-E3E71B917267}"/>
-              </a:ext>
-            </a:extLst>
-          </p:cNvPr>
-          <p:cNvSpPr>
-            <a:spLocks noGrp="1"/>
-          </p:cNvSpPr>
-          <p:nvPr>
-            <p:ph type="title"/>
-          </p:nvPr>
-        </p:nvSpPr>
-        <p:spPr>
-          <a:xfrm>
-            <a:off x="311700" y="243319"/>
-            <a:ext cx="8520600" cy="572700"/>
-          </a:xfrm>
-        </p:spPr>
-        <p:txBody>
-          <a:bodyPr/>
-          <a:lstStyle/>
-          <a:p>
-            <a:r>
-              <a:rPr lang="en-US" b="1" dirty="0">
-                <a:effectLst>
-                  <a:outerShdw blurRad="38100" dist="38100" dir="2700000" algn="tl">
-                    <a:srgbClr val="000000">
-                      <a:alpha val="43137"/>
-                    </a:srgbClr>
-                  </a:outerShdw>
-                </a:effectLst>
-              </a:rPr>
-              <a:t>Use Cases: Authorization (SSO)</a:t>
-            </a:r>
-            <a:endParaRPr lang="ru-RU" b="1" dirty="0">
-              <a:effectLst>
-                <a:outerShdw blurRad="38100" dist="38100" dir="2700000" algn="tl">
-                  <a:srgbClr val="000000">
-                    <a:alpha val="43137"/>
-                  </a:srgbClr>
-                </a:outerShdw>
-              </a:effectLst>
-            </a:endParaRPr>
-          </a:p>
-        </p:txBody>
-      </p:sp>
-      <p:sp>
-        <p:nvSpPr>
-          <p:cNvPr id="3" name="Номер слайда 2">
-            <a:extLst>
-              <a:ext uri="{FF2B5EF4-FFF2-40B4-BE49-F238E27FC236}">
-                <a16:creationId xmlns:a16="http://schemas.microsoft.com/office/drawing/2014/main" id="{09FB8480-1FB4-49A4-B531-A9B589ECD31D}"/>
-              </a:ext>
-            </a:extLst>
-          </p:cNvPr>
-          <p:cNvSpPr>
-            <a:spLocks noGrp="1"/>
-          </p:cNvSpPr>
-          <p:nvPr>
-            <p:ph type="sldNum" idx="12"/>
-          </p:nvPr>
-        </p:nvSpPr>
-        <p:spPr/>
-        <p:txBody>
-          <a:bodyPr/>
-          <a:lstStyle/>
-          <a:p>
-            <a:pPr marL="0" lvl="0" indent="0" algn="r" rtl="0">
-              <a:spcBef>
-                <a:spcPts val="0"/>
-              </a:spcBef>
-              <a:spcAft>
-                <a:spcPts val="0"/>
-              </a:spcAft>
-              <a:buNone/>
-            </a:pPr>
-            <a:fld id="{00000000-1234-1234-1234-123412341234}" type="slidenum">
-              <a:rPr lang="en-GB" smtClean="0"/>
-              <a:t>20</a:t>
-            </a:fld>
-            <a:endParaRPr lang="en-GB"/>
-          </a:p>
-        </p:txBody>
-      </p:sp>
-      <p:pic>
-        <p:nvPicPr>
-          <p:cNvPr id="8194" name="Picture 2" descr="UC Authorization">
-            <a:extLst>
-              <a:ext uri="{FF2B5EF4-FFF2-40B4-BE49-F238E27FC236}">
-                <a16:creationId xmlns:a16="http://schemas.microsoft.com/office/drawing/2014/main" id="{7D28B00A-004C-4E41-880C-3BCEA35E704D}"/>
-              </a:ext>
-            </a:extLst>
-          </p:cNvPr>
-          <p:cNvPicPr>
-            <a:picLocks noChangeAspect="1" noChangeArrowheads="1"/>
-          </p:cNvPicPr>
-          <p:nvPr/>
-        </p:nvPicPr>
-        <p:blipFill>
-          <a:blip r:embed="rId2">
-            <a:extLst>
-              <a:ext uri="{28A0092B-C50C-407E-A947-70E740481C1C}">
-                <a14:useLocalDpi xmlns:a14="http://schemas.microsoft.com/office/drawing/2010/main" val="0"/>
-              </a:ext>
-            </a:extLst>
-          </a:blip>
-          <a:srcRect/>
-          <a:stretch>
-            <a:fillRect/>
-          </a:stretch>
-        </p:blipFill>
-        <p:spPr bwMode="auto">
-          <a:xfrm>
-            <a:off x="1600199" y="1238229"/>
-            <a:ext cx="5515535" cy="3187815"/>
-          </a:xfrm>
-          <a:prstGeom prst="rect">
-            <a:avLst/>
-          </a:prstGeom>
-          <a:noFill/>
-          <a:extLst>
-            <a:ext uri="{909E8E84-426E-40DD-AFC4-6F175D3DCCD1}">
-              <a14:hiddenFill xmlns:a14="http://schemas.microsoft.com/office/drawing/2010/main">
-                <a:solidFill>
-                  <a:srgbClr val="FFFFFF"/>
-                </a:solidFill>
-              </a14:hiddenFill>
-            </a:ext>
-          </a:extLst>
-        </p:spPr>
-      </p:pic>
-    </p:spTree>
-    <p:extLst>
-      <p:ext uri="{BB962C8B-B14F-4D97-AF65-F5344CB8AC3E}">
-        <p14:creationId xmlns:p14="http://schemas.microsoft.com/office/powerpoint/2010/main" val="853089160"/>
-      </p:ext>
-    </p:extLst>
-  </p:cSld>
-  <p:clrMapOvr>
-    <a:masterClrMapping/>
-  </p:clrMapOvr>
-</p:sld>
-</file>
-
-<file path=ppt/slides/slide21.xml><?xml version="1.0" encoding="utf-8"?>
 <p:sld xmlns:a="http://schemas.openxmlformats.org/drawingml/2006/main" xmlns:r="http://schemas.openxmlformats.org/officeDocument/2006/relationships" xmlns:p="http://schemas.openxmlformats.org/presentationml/2006/main">
   <p:cSld>
     <p:spTree>
@@ -10657,7 +10405,7 @@
             </a:pPr>
             <a:fld id="{00000000-1234-1234-1234-123412341234}" type="slidenum">
               <a:rPr lang="en-GB" smtClean="0"/>
-              <a:t>21</a:t>
+              <a:t>20</a:t>
             </a:fld>
             <a:endParaRPr lang="en-GB"/>
           </a:p>
@@ -10723,7 +10471,7 @@
 </p:sld>
 </file>
 
-<file path=ppt/slides/slide22.xml><?xml version="1.0" encoding="utf-8"?>
+<file path=ppt/slides/slide21.xml><?xml version="1.0" encoding="utf-8"?>
 <p:sld xmlns:a="http://schemas.openxmlformats.org/drawingml/2006/main" xmlns:r="http://schemas.openxmlformats.org/officeDocument/2006/relationships" xmlns:p="http://schemas.openxmlformats.org/presentationml/2006/main">
   <p:cSld>
     <p:spTree>
@@ -10822,7 +10570,7 @@
             </a:pPr>
             <a:fld id="{00000000-1234-1234-1234-123412341234}" type="slidenum">
               <a:rPr lang="en-GB" smtClean="0"/>
-              <a:t>22</a:t>
+              <a:t>21</a:t>
             </a:fld>
             <a:endParaRPr lang="en-GB"/>
           </a:p>
@@ -10888,7 +10636,7 @@
 </p:sld>
 </file>
 
-<file path=ppt/slides/slide23.xml><?xml version="1.0" encoding="utf-8"?>
+<file path=ppt/slides/slide22.xml><?xml version="1.0" encoding="utf-8"?>
 <p:sld xmlns:a="http://schemas.openxmlformats.org/drawingml/2006/main" xmlns:r="http://schemas.openxmlformats.org/officeDocument/2006/relationships" xmlns:p="http://schemas.openxmlformats.org/presentationml/2006/main">
   <p:cSld>
     <p:spTree>
@@ -10987,7 +10735,7 @@
             </a:pPr>
             <a:fld id="{00000000-1234-1234-1234-123412341234}" type="slidenum">
               <a:rPr lang="en-GB" smtClean="0"/>
-              <a:t>23</a:t>
+              <a:t>22</a:t>
             </a:fld>
             <a:endParaRPr lang="en-GB"/>
           </a:p>
@@ -11053,7 +10801,7 @@
 </p:sld>
 </file>
 
-<file path=ppt/slides/slide24.xml><?xml version="1.0" encoding="utf-8"?>
+<file path=ppt/slides/slide23.xml><?xml version="1.0" encoding="utf-8"?>
 <p:sld xmlns:a="http://schemas.openxmlformats.org/drawingml/2006/main" xmlns:r="http://schemas.openxmlformats.org/officeDocument/2006/relationships" xmlns:p="http://schemas.openxmlformats.org/presentationml/2006/main">
   <p:cSld>
     <p:spTree>
@@ -11152,7 +10900,7 @@
             </a:pPr>
             <a:fld id="{00000000-1234-1234-1234-123412341234}" type="slidenum">
               <a:rPr lang="en-GB" smtClean="0"/>
-              <a:t>24</a:t>
+              <a:t>23</a:t>
             </a:fld>
             <a:endParaRPr lang="en-GB"/>
           </a:p>
@@ -11218,7 +10966,7 @@
 </p:sld>
 </file>
 
-<file path=ppt/slides/slide25.xml><?xml version="1.0" encoding="utf-8"?>
+<file path=ppt/slides/slide24.xml><?xml version="1.0" encoding="utf-8"?>
 <p:sld xmlns:a="http://schemas.openxmlformats.org/drawingml/2006/main" xmlns:r="http://schemas.openxmlformats.org/officeDocument/2006/relationships" xmlns:p="http://schemas.openxmlformats.org/presentationml/2006/main">
   <p:cSld>
     <p:spTree>
@@ -11317,7 +11065,7 @@
             </a:pPr>
             <a:fld id="{00000000-1234-1234-1234-123412341234}" type="slidenum">
               <a:rPr lang="en-GB" smtClean="0"/>
-              <a:t>25</a:t>
+              <a:t>24</a:t>
             </a:fld>
             <a:endParaRPr lang="en-GB"/>
           </a:p>
@@ -11383,7 +11131,7 @@
 </p:sld>
 </file>
 
-<file path=ppt/slides/slide26.xml><?xml version="1.0" encoding="utf-8"?>
+<file path=ppt/slides/slide25.xml><?xml version="1.0" encoding="utf-8"?>
 <p:sld xmlns:a="http://schemas.openxmlformats.org/drawingml/2006/main" xmlns:r="http://schemas.openxmlformats.org/officeDocument/2006/relationships" xmlns:p="http://schemas.openxmlformats.org/presentationml/2006/main">
   <p:cSld>
     <p:spTree>
@@ -11482,7 +11230,7 @@
             </a:pPr>
             <a:fld id="{00000000-1234-1234-1234-123412341234}" type="slidenum">
               <a:rPr lang="en-GB" smtClean="0"/>
-              <a:t>26</a:t>
+              <a:t>25</a:t>
             </a:fld>
             <a:endParaRPr lang="en-GB"/>
           </a:p>
@@ -11553,1344 +11301,6 @@
   <p:cSld>
     <p:spTree>
       <p:nvGrpSpPr>
-        <p:cNvPr id="1" name=""/>
-        <p:cNvGrpSpPr/>
-        <p:nvPr/>
-      </p:nvGrpSpPr>
-      <p:grpSpPr>
-        <a:xfrm>
-          <a:off x="0" y="0"/>
-          <a:ext cx="0" cy="0"/>
-          <a:chOff x="0" y="0"/>
-          <a:chExt cx="0" cy="0"/>
-        </a:xfrm>
-      </p:grpSpPr>
-      <p:sp>
-        <p:nvSpPr>
-          <p:cNvPr id="3" name="Текст 2">
-            <a:extLst>
-              <a:ext uri="{FF2B5EF4-FFF2-40B4-BE49-F238E27FC236}">
-                <a16:creationId xmlns:a16="http://schemas.microsoft.com/office/drawing/2014/main" id="{73D9E495-74CF-49FC-8FE9-9E20997A0616}"/>
-              </a:ext>
-            </a:extLst>
-          </p:cNvPr>
-          <p:cNvSpPr>
-            <a:spLocks noGrp="1"/>
-          </p:cNvSpPr>
-          <p:nvPr>
-            <p:ph type="body" idx="1"/>
-          </p:nvPr>
-        </p:nvSpPr>
-        <p:spPr>
-          <a:xfrm>
-            <a:off x="311701" y="863550"/>
-            <a:ext cx="4051870" cy="2249444"/>
-          </a:xfrm>
-        </p:spPr>
-        <p:txBody>
-          <a:bodyPr/>
-          <a:lstStyle/>
-          <a:p>
-            <a:pPr marL="139700" indent="0">
-              <a:buNone/>
-            </a:pPr>
-            <a:r>
-              <a:rPr lang="en-US" b="1" dirty="0">
-                <a:solidFill>
-                  <a:schemeClr val="tx1"/>
-                </a:solidFill>
-              </a:rPr>
-              <a:t>ML Engineer (Maria, 32 years old)</a:t>
-            </a:r>
-          </a:p>
-          <a:p>
-            <a:pPr marL="139700" indent="0">
-              <a:buNone/>
-            </a:pPr>
-            <a:br>
-              <a:rPr lang="en-US" dirty="0">
-                <a:solidFill>
-                  <a:schemeClr val="tx1"/>
-                </a:solidFill>
-              </a:rPr>
-            </a:br>
-            <a:r>
-              <a:rPr lang="en-US" b="1" dirty="0">
-                <a:solidFill>
-                  <a:schemeClr val="tx1"/>
-                </a:solidFill>
-              </a:rPr>
-              <a:t>Goals:</a:t>
-            </a:r>
-            <a:endParaRPr lang="en-US" dirty="0">
-              <a:solidFill>
-                <a:schemeClr val="tx1"/>
-              </a:solidFill>
-            </a:endParaRPr>
-          </a:p>
-          <a:p>
-            <a:pPr>
-              <a:buFont typeface="Arial" panose="020B0604020202020204" pitchFamily="34" charset="0"/>
-              <a:buChar char="•"/>
-            </a:pPr>
-            <a:r>
-              <a:rPr lang="en-US" dirty="0">
-                <a:solidFill>
-                  <a:schemeClr val="tx1"/>
-                </a:solidFill>
-              </a:rPr>
-              <a:t>Deploy and version ML models in Kubernetes.</a:t>
-            </a:r>
-          </a:p>
-          <a:p>
-            <a:pPr>
-              <a:buFont typeface="Arial" panose="020B0604020202020204" pitchFamily="34" charset="0"/>
-              <a:buChar char="•"/>
-            </a:pPr>
-            <a:r>
-              <a:rPr lang="en-US" dirty="0">
-                <a:solidFill>
-                  <a:schemeClr val="tx1"/>
-                </a:solidFill>
-              </a:rPr>
-              <a:t>Automatic API documentation and request validation.</a:t>
-            </a:r>
-          </a:p>
-          <a:p>
-            <a:pPr>
-              <a:buFont typeface="Arial" panose="020B0604020202020204" pitchFamily="34" charset="0"/>
-              <a:buChar char="•"/>
-            </a:pPr>
-            <a:r>
-              <a:rPr lang="en-US" dirty="0">
-                <a:solidFill>
-                  <a:schemeClr val="tx1"/>
-                </a:solidFill>
-              </a:rPr>
-              <a:t>Flexibility for different ML frameworks.</a:t>
-            </a:r>
-          </a:p>
-        </p:txBody>
-      </p:sp>
-      <p:sp>
-        <p:nvSpPr>
-          <p:cNvPr id="7" name="Google Shape;66;p15">
-            <a:extLst>
-              <a:ext uri="{FF2B5EF4-FFF2-40B4-BE49-F238E27FC236}">
-                <a16:creationId xmlns:a16="http://schemas.microsoft.com/office/drawing/2014/main" id="{A2B7074F-A1D8-444B-9DA8-BFF70B4A2A8A}"/>
-              </a:ext>
-            </a:extLst>
-          </p:cNvPr>
-          <p:cNvSpPr txBox="1">
-            <a:spLocks/>
-          </p:cNvSpPr>
-          <p:nvPr/>
-        </p:nvSpPr>
-        <p:spPr>
-          <a:xfrm>
-            <a:off x="252575" y="140425"/>
-            <a:ext cx="8520600" cy="572700"/>
-          </a:xfrm>
-          <a:prstGeom prst="rect">
-            <a:avLst/>
-          </a:prstGeom>
-          <a:noFill/>
-          <a:ln>
-            <a:noFill/>
-          </a:ln>
-        </p:spPr>
-        <p:txBody>
-          <a:bodyPr spcFirstLastPara="1" wrap="square" lIns="91425" tIns="91425" rIns="91425" bIns="91425" anchor="t" anchorCtr="0">
-            <a:noAutofit/>
-          </a:bodyPr>
-          <a:lstStyle>
-            <a:defPPr marR="0" lvl="0" algn="l" rtl="0">
-              <a:lnSpc>
-                <a:spcPct val="100000"/>
-              </a:lnSpc>
-              <a:spcBef>
-                <a:spcPts val="0"/>
-              </a:spcBef>
-              <a:spcAft>
-                <a:spcPts val="0"/>
-              </a:spcAft>
-            </a:defPPr>
-            <a:lvl1pPr marR="0" lvl="0" algn="l" rtl="0">
-              <a:lnSpc>
-                <a:spcPct val="100000"/>
-              </a:lnSpc>
-              <a:spcBef>
-                <a:spcPts val="0"/>
-              </a:spcBef>
-              <a:spcAft>
-                <a:spcPts val="0"/>
-              </a:spcAft>
-              <a:buClr>
-                <a:schemeClr val="dk1"/>
-              </a:buClr>
-              <a:buSzPts val="2800"/>
-              <a:buFont typeface="Arial"/>
-              <a:buNone/>
-              <a:defRPr sz="2800" b="0" i="0" u="none" strike="noStrike" cap="none">
-                <a:solidFill>
-                  <a:schemeClr val="dk1"/>
-                </a:solidFill>
-                <a:latin typeface="Arial"/>
-                <a:ea typeface="Arial"/>
-                <a:cs typeface="Arial"/>
-                <a:sym typeface="Arial"/>
-              </a:defRPr>
-            </a:lvl1pPr>
-            <a:lvl2pPr marR="0" lvl="1" algn="l" rtl="0">
-              <a:lnSpc>
-                <a:spcPct val="100000"/>
-              </a:lnSpc>
-              <a:spcBef>
-                <a:spcPts val="0"/>
-              </a:spcBef>
-              <a:spcAft>
-                <a:spcPts val="0"/>
-              </a:spcAft>
-              <a:buClr>
-                <a:schemeClr val="dk1"/>
-              </a:buClr>
-              <a:buSzPts val="2800"/>
-              <a:buFont typeface="Arial"/>
-              <a:buNone/>
-              <a:defRPr sz="2800" b="0" i="0" u="none" strike="noStrike" cap="none">
-                <a:solidFill>
-                  <a:schemeClr val="dk1"/>
-                </a:solidFill>
-                <a:latin typeface="Arial"/>
-                <a:ea typeface="Arial"/>
-                <a:cs typeface="Arial"/>
-                <a:sym typeface="Arial"/>
-              </a:defRPr>
-            </a:lvl2pPr>
-            <a:lvl3pPr marR="0" lvl="2" algn="l" rtl="0">
-              <a:lnSpc>
-                <a:spcPct val="100000"/>
-              </a:lnSpc>
-              <a:spcBef>
-                <a:spcPts val="0"/>
-              </a:spcBef>
-              <a:spcAft>
-                <a:spcPts val="0"/>
-              </a:spcAft>
-              <a:buClr>
-                <a:schemeClr val="dk1"/>
-              </a:buClr>
-              <a:buSzPts val="2800"/>
-              <a:buFont typeface="Arial"/>
-              <a:buNone/>
-              <a:defRPr sz="2800" b="0" i="0" u="none" strike="noStrike" cap="none">
-                <a:solidFill>
-                  <a:schemeClr val="dk1"/>
-                </a:solidFill>
-                <a:latin typeface="Arial"/>
-                <a:ea typeface="Arial"/>
-                <a:cs typeface="Arial"/>
-                <a:sym typeface="Arial"/>
-              </a:defRPr>
-            </a:lvl3pPr>
-            <a:lvl4pPr marR="0" lvl="3" algn="l" rtl="0">
-              <a:lnSpc>
-                <a:spcPct val="100000"/>
-              </a:lnSpc>
-              <a:spcBef>
-                <a:spcPts val="0"/>
-              </a:spcBef>
-              <a:spcAft>
-                <a:spcPts val="0"/>
-              </a:spcAft>
-              <a:buClr>
-                <a:schemeClr val="dk1"/>
-              </a:buClr>
-              <a:buSzPts val="2800"/>
-              <a:buFont typeface="Arial"/>
-              <a:buNone/>
-              <a:defRPr sz="2800" b="0" i="0" u="none" strike="noStrike" cap="none">
-                <a:solidFill>
-                  <a:schemeClr val="dk1"/>
-                </a:solidFill>
-                <a:latin typeface="Arial"/>
-                <a:ea typeface="Arial"/>
-                <a:cs typeface="Arial"/>
-                <a:sym typeface="Arial"/>
-              </a:defRPr>
-            </a:lvl4pPr>
-            <a:lvl5pPr marR="0" lvl="4" algn="l" rtl="0">
-              <a:lnSpc>
-                <a:spcPct val="100000"/>
-              </a:lnSpc>
-              <a:spcBef>
-                <a:spcPts val="0"/>
-              </a:spcBef>
-              <a:spcAft>
-                <a:spcPts val="0"/>
-              </a:spcAft>
-              <a:buClr>
-                <a:schemeClr val="dk1"/>
-              </a:buClr>
-              <a:buSzPts val="2800"/>
-              <a:buFont typeface="Arial"/>
-              <a:buNone/>
-              <a:defRPr sz="2800" b="0" i="0" u="none" strike="noStrike" cap="none">
-                <a:solidFill>
-                  <a:schemeClr val="dk1"/>
-                </a:solidFill>
-                <a:latin typeface="Arial"/>
-                <a:ea typeface="Arial"/>
-                <a:cs typeface="Arial"/>
-                <a:sym typeface="Arial"/>
-              </a:defRPr>
-            </a:lvl5pPr>
-            <a:lvl6pPr marR="0" lvl="5" algn="l" rtl="0">
-              <a:lnSpc>
-                <a:spcPct val="100000"/>
-              </a:lnSpc>
-              <a:spcBef>
-                <a:spcPts val="0"/>
-              </a:spcBef>
-              <a:spcAft>
-                <a:spcPts val="0"/>
-              </a:spcAft>
-              <a:buClr>
-                <a:schemeClr val="dk1"/>
-              </a:buClr>
-              <a:buSzPts val="2800"/>
-              <a:buFont typeface="Arial"/>
-              <a:buNone/>
-              <a:defRPr sz="2800" b="0" i="0" u="none" strike="noStrike" cap="none">
-                <a:solidFill>
-                  <a:schemeClr val="dk1"/>
-                </a:solidFill>
-                <a:latin typeface="Arial"/>
-                <a:ea typeface="Arial"/>
-                <a:cs typeface="Arial"/>
-                <a:sym typeface="Arial"/>
-              </a:defRPr>
-            </a:lvl6pPr>
-            <a:lvl7pPr marR="0" lvl="6" algn="l" rtl="0">
-              <a:lnSpc>
-                <a:spcPct val="100000"/>
-              </a:lnSpc>
-              <a:spcBef>
-                <a:spcPts val="0"/>
-              </a:spcBef>
-              <a:spcAft>
-                <a:spcPts val="0"/>
-              </a:spcAft>
-              <a:buClr>
-                <a:schemeClr val="dk1"/>
-              </a:buClr>
-              <a:buSzPts val="2800"/>
-              <a:buFont typeface="Arial"/>
-              <a:buNone/>
-              <a:defRPr sz="2800" b="0" i="0" u="none" strike="noStrike" cap="none">
-                <a:solidFill>
-                  <a:schemeClr val="dk1"/>
-                </a:solidFill>
-                <a:latin typeface="Arial"/>
-                <a:ea typeface="Arial"/>
-                <a:cs typeface="Arial"/>
-                <a:sym typeface="Arial"/>
-              </a:defRPr>
-            </a:lvl7pPr>
-            <a:lvl8pPr marR="0" lvl="7" algn="l" rtl="0">
-              <a:lnSpc>
-                <a:spcPct val="100000"/>
-              </a:lnSpc>
-              <a:spcBef>
-                <a:spcPts val="0"/>
-              </a:spcBef>
-              <a:spcAft>
-                <a:spcPts val="0"/>
-              </a:spcAft>
-              <a:buClr>
-                <a:schemeClr val="dk1"/>
-              </a:buClr>
-              <a:buSzPts val="2800"/>
-              <a:buFont typeface="Arial"/>
-              <a:buNone/>
-              <a:defRPr sz="2800" b="0" i="0" u="none" strike="noStrike" cap="none">
-                <a:solidFill>
-                  <a:schemeClr val="dk1"/>
-                </a:solidFill>
-                <a:latin typeface="Arial"/>
-                <a:ea typeface="Arial"/>
-                <a:cs typeface="Arial"/>
-                <a:sym typeface="Arial"/>
-              </a:defRPr>
-            </a:lvl8pPr>
-            <a:lvl9pPr marR="0" lvl="8" algn="l" rtl="0">
-              <a:lnSpc>
-                <a:spcPct val="100000"/>
-              </a:lnSpc>
-              <a:spcBef>
-                <a:spcPts val="0"/>
-              </a:spcBef>
-              <a:spcAft>
-                <a:spcPts val="0"/>
-              </a:spcAft>
-              <a:buClr>
-                <a:schemeClr val="dk1"/>
-              </a:buClr>
-              <a:buSzPts val="2800"/>
-              <a:buFont typeface="Arial"/>
-              <a:buNone/>
-              <a:defRPr sz="2800" b="0" i="0" u="none" strike="noStrike" cap="none">
-                <a:solidFill>
-                  <a:schemeClr val="dk1"/>
-                </a:solidFill>
-                <a:latin typeface="Arial"/>
-                <a:ea typeface="Arial"/>
-                <a:cs typeface="Arial"/>
-                <a:sym typeface="Arial"/>
-              </a:defRPr>
-            </a:lvl9pPr>
-          </a:lstStyle>
-          <a:p>
-            <a:r>
-              <a:rPr lang="en-GB" b="1" dirty="0">
-                <a:effectLst>
-                  <a:outerShdw blurRad="38100" dist="38100" dir="2700000" algn="tl">
-                    <a:srgbClr val="000000">
-                      <a:alpha val="43137"/>
-                    </a:srgbClr>
-                  </a:outerShdw>
-                </a:effectLst>
-              </a:rPr>
-              <a:t>Personas</a:t>
-            </a:r>
-          </a:p>
-        </p:txBody>
-      </p:sp>
-      <p:sp>
-        <p:nvSpPr>
-          <p:cNvPr id="8" name="TextBox 7">
-            <a:extLst>
-              <a:ext uri="{FF2B5EF4-FFF2-40B4-BE49-F238E27FC236}">
-                <a16:creationId xmlns:a16="http://schemas.microsoft.com/office/drawing/2014/main" id="{4B40FD6D-82C8-48B1-A5D3-456D8792334C}"/>
-              </a:ext>
-            </a:extLst>
-          </p:cNvPr>
-          <p:cNvSpPr txBox="1"/>
-          <p:nvPr/>
-        </p:nvSpPr>
-        <p:spPr>
-          <a:xfrm>
-            <a:off x="4645958" y="863550"/>
-            <a:ext cx="4269442" cy="1384995"/>
-          </a:xfrm>
-          <a:prstGeom prst="rect">
-            <a:avLst/>
-          </a:prstGeom>
-          <a:noFill/>
-        </p:spPr>
-        <p:txBody>
-          <a:bodyPr wrap="square" rtlCol="0">
-            <a:spAutoFit/>
-          </a:bodyPr>
-          <a:lstStyle/>
-          <a:p>
-            <a:r>
-              <a:rPr lang="en-US" b="1" dirty="0">
-                <a:solidFill>
-                  <a:schemeClr val="tx1"/>
-                </a:solidFill>
-              </a:rPr>
-              <a:t>Backend Developer (Alexander, 28 years old)</a:t>
-            </a:r>
-          </a:p>
-          <a:p>
-            <a:br>
-              <a:rPr lang="en-US" dirty="0">
-                <a:solidFill>
-                  <a:schemeClr val="tx1"/>
-                </a:solidFill>
-              </a:rPr>
-            </a:br>
-            <a:r>
-              <a:rPr lang="en-US" b="1" dirty="0">
-                <a:solidFill>
-                  <a:schemeClr val="tx1"/>
-                </a:solidFill>
-              </a:rPr>
-              <a:t>Goals:</a:t>
-            </a:r>
-            <a:endParaRPr lang="en-US" dirty="0">
-              <a:solidFill>
-                <a:schemeClr val="tx1"/>
-              </a:solidFill>
-            </a:endParaRPr>
-          </a:p>
-          <a:p>
-            <a:pPr marL="285750" indent="-285750">
-              <a:buFont typeface="Arial" panose="020B0604020202020204" pitchFamily="34" charset="0"/>
-              <a:buChar char="•"/>
-            </a:pPr>
-            <a:r>
-              <a:rPr lang="en-US" dirty="0">
-                <a:solidFill>
-                  <a:schemeClr val="tx1"/>
-                </a:solidFill>
-              </a:rPr>
-              <a:t>Use automatic </a:t>
-            </a:r>
-            <a:r>
-              <a:rPr lang="en-US" dirty="0" err="1">
-                <a:solidFill>
-                  <a:schemeClr val="tx1"/>
-                </a:solidFill>
-              </a:rPr>
-              <a:t>OpenAPI</a:t>
-            </a:r>
-            <a:r>
-              <a:rPr lang="en-US" dirty="0">
-                <a:solidFill>
-                  <a:schemeClr val="tx1"/>
-                </a:solidFill>
-              </a:rPr>
-              <a:t> schema generation.</a:t>
-            </a:r>
-          </a:p>
-          <a:p>
-            <a:pPr marL="285750" indent="-285750">
-              <a:buFont typeface="Arial" panose="020B0604020202020204" pitchFamily="34" charset="0"/>
-              <a:buChar char="•"/>
-            </a:pPr>
-            <a:r>
-              <a:rPr lang="en-US" dirty="0">
-                <a:solidFill>
-                  <a:schemeClr val="tx1"/>
-                </a:solidFill>
-              </a:rPr>
-              <a:t>Easily add API endpoints with request validation and security.</a:t>
-            </a:r>
-            <a:endParaRPr lang="ru-RU" dirty="0">
-              <a:solidFill>
-                <a:schemeClr val="tx1"/>
-              </a:solidFill>
-            </a:endParaRPr>
-          </a:p>
-        </p:txBody>
-      </p:sp>
-      <p:sp>
-        <p:nvSpPr>
-          <p:cNvPr id="2" name="Slide Number Placeholder 1">
-            <a:extLst>
-              <a:ext uri="{FF2B5EF4-FFF2-40B4-BE49-F238E27FC236}">
-                <a16:creationId xmlns:a16="http://schemas.microsoft.com/office/drawing/2014/main" id="{3178EC64-B23C-4E80-AA61-FE6C102031B5}"/>
-              </a:ext>
-            </a:extLst>
-          </p:cNvPr>
-          <p:cNvSpPr>
-            <a:spLocks noGrp="1"/>
-          </p:cNvSpPr>
-          <p:nvPr>
-            <p:ph type="sldNum" idx="12"/>
-          </p:nvPr>
-        </p:nvSpPr>
-        <p:spPr/>
-        <p:txBody>
-          <a:bodyPr/>
-          <a:lstStyle/>
-          <a:p>
-            <a:pPr marL="0" lvl="0" indent="0" algn="r" rtl="0">
-              <a:spcBef>
-                <a:spcPts val="0"/>
-              </a:spcBef>
-              <a:spcAft>
-                <a:spcPts val="0"/>
-              </a:spcAft>
-              <a:buNone/>
-            </a:pPr>
-            <a:fld id="{00000000-1234-1234-1234-123412341234}" type="slidenum">
-              <a:rPr lang="en-GB" smtClean="0"/>
-              <a:t>3</a:t>
-            </a:fld>
-            <a:endParaRPr lang="en-GB"/>
-          </a:p>
-        </p:txBody>
-      </p:sp>
-      <p:sp>
-        <p:nvSpPr>
-          <p:cNvPr id="4" name="TextBox 3">
-            <a:extLst>
-              <a:ext uri="{FF2B5EF4-FFF2-40B4-BE49-F238E27FC236}">
-                <a16:creationId xmlns:a16="http://schemas.microsoft.com/office/drawing/2014/main" id="{C9F9E3DC-5FD0-4211-A132-FB1036335AD0}"/>
-              </a:ext>
-            </a:extLst>
-          </p:cNvPr>
-          <p:cNvSpPr txBox="1"/>
-          <p:nvPr/>
-        </p:nvSpPr>
-        <p:spPr>
-          <a:xfrm>
-            <a:off x="311701" y="3476065"/>
-            <a:ext cx="4051870" cy="954107"/>
-          </a:xfrm>
-          <a:prstGeom prst="rect">
-            <a:avLst/>
-          </a:prstGeom>
-          <a:noFill/>
-        </p:spPr>
-        <p:txBody>
-          <a:bodyPr wrap="square" rtlCol="0">
-            <a:spAutoFit/>
-          </a:bodyPr>
-          <a:lstStyle/>
-          <a:p>
-            <a:r>
-              <a:rPr lang="en-US" b="1" dirty="0">
-                <a:solidFill>
-                  <a:schemeClr val="tx1"/>
-                </a:solidFill>
-              </a:rPr>
-              <a:t>Pain points:</a:t>
-            </a:r>
-            <a:endParaRPr lang="en-US" dirty="0">
-              <a:solidFill>
-                <a:schemeClr val="tx1"/>
-              </a:solidFill>
-            </a:endParaRPr>
-          </a:p>
-          <a:p>
-            <a:pPr marL="285750" indent="-285750">
-              <a:buFont typeface="Arial" panose="020B0604020202020204" pitchFamily="34" charset="0"/>
-              <a:buChar char="•"/>
-            </a:pPr>
-            <a:r>
-              <a:rPr lang="en-US" dirty="0">
-                <a:solidFill>
-                  <a:schemeClr val="tx1"/>
-                </a:solidFill>
-              </a:rPr>
-              <a:t>Manual API documentation.</a:t>
-            </a:r>
-          </a:p>
-          <a:p>
-            <a:pPr marL="285750" indent="-285750">
-              <a:buFont typeface="Arial" panose="020B0604020202020204" pitchFamily="34" charset="0"/>
-              <a:buChar char="•"/>
-            </a:pPr>
-            <a:r>
-              <a:rPr lang="en-US" dirty="0">
-                <a:solidFill>
-                  <a:schemeClr val="tx1"/>
-                </a:solidFill>
-              </a:rPr>
-              <a:t>Difficulties in monitoring model performance.</a:t>
-            </a:r>
-          </a:p>
-          <a:p>
-            <a:endParaRPr lang="ru-RU" dirty="0"/>
-          </a:p>
-        </p:txBody>
-      </p:sp>
-      <p:sp>
-        <p:nvSpPr>
-          <p:cNvPr id="5" name="TextBox 4">
-            <a:extLst>
-              <a:ext uri="{FF2B5EF4-FFF2-40B4-BE49-F238E27FC236}">
-                <a16:creationId xmlns:a16="http://schemas.microsoft.com/office/drawing/2014/main" id="{1DC75561-9819-4074-8766-C1882A1161D7}"/>
-              </a:ext>
-            </a:extLst>
-          </p:cNvPr>
-          <p:cNvSpPr txBox="1"/>
-          <p:nvPr/>
-        </p:nvSpPr>
-        <p:spPr>
-          <a:xfrm>
-            <a:off x="4645959" y="3368342"/>
-            <a:ext cx="4127216" cy="1169551"/>
-          </a:xfrm>
-          <a:prstGeom prst="rect">
-            <a:avLst/>
-          </a:prstGeom>
-          <a:noFill/>
-        </p:spPr>
-        <p:txBody>
-          <a:bodyPr wrap="square" rtlCol="0">
-            <a:spAutoFit/>
-          </a:bodyPr>
-          <a:lstStyle/>
-          <a:p>
-            <a:r>
-              <a:rPr lang="en-US" b="1" dirty="0">
-                <a:solidFill>
-                  <a:schemeClr val="tx1"/>
-                </a:solidFill>
-              </a:rPr>
-              <a:t>Pain points:</a:t>
-            </a:r>
-            <a:endParaRPr lang="en-US" dirty="0">
-              <a:solidFill>
-                <a:schemeClr val="tx1"/>
-              </a:solidFill>
-            </a:endParaRPr>
-          </a:p>
-          <a:p>
-            <a:pPr marL="285750" indent="-285750">
-              <a:buFont typeface="Arial" panose="020B0604020202020204" pitchFamily="34" charset="0"/>
-              <a:buChar char="•"/>
-            </a:pPr>
-            <a:r>
-              <a:rPr lang="en-US" dirty="0">
-                <a:solidFill>
-                  <a:schemeClr val="tx1"/>
-                </a:solidFill>
-              </a:rPr>
-              <a:t>Manual API documentation.</a:t>
-            </a:r>
-          </a:p>
-          <a:p>
-            <a:pPr marL="285750" indent="-285750">
-              <a:buFont typeface="Arial" panose="020B0604020202020204" pitchFamily="34" charset="0"/>
-              <a:buChar char="•"/>
-            </a:pPr>
-            <a:r>
-              <a:rPr lang="en-US" dirty="0">
-                <a:solidFill>
-                  <a:schemeClr val="tx1"/>
-                </a:solidFill>
-              </a:rPr>
-              <a:t>Challenges with integrating authorization and managing access control.</a:t>
-            </a:r>
-          </a:p>
-          <a:p>
-            <a:endParaRPr lang="ru-RU" dirty="0"/>
-          </a:p>
-        </p:txBody>
-      </p:sp>
-    </p:spTree>
-    <p:extLst>
-      <p:ext uri="{BB962C8B-B14F-4D97-AF65-F5344CB8AC3E}">
-        <p14:creationId xmlns:p14="http://schemas.microsoft.com/office/powerpoint/2010/main" val="2021445038"/>
-      </p:ext>
-    </p:extLst>
-  </p:cSld>
-  <p:clrMapOvr>
-    <a:masterClrMapping/>
-  </p:clrMapOvr>
-</p:sld>
-</file>
-
-<file path=ppt/slides/slide4.xml><?xml version="1.0" encoding="utf-8"?>
-<p:sld xmlns:a="http://schemas.openxmlformats.org/drawingml/2006/main" xmlns:r="http://schemas.openxmlformats.org/officeDocument/2006/relationships" xmlns:p="http://schemas.openxmlformats.org/presentationml/2006/main">
-  <p:cSld>
-    <p:spTree>
-      <p:nvGrpSpPr>
-        <p:cNvPr id="1" name=""/>
-        <p:cNvGrpSpPr/>
-        <p:nvPr/>
-      </p:nvGrpSpPr>
-      <p:grpSpPr>
-        <a:xfrm>
-          <a:off x="0" y="0"/>
-          <a:ext cx="0" cy="0"/>
-          <a:chOff x="0" y="0"/>
-          <a:chExt cx="0" cy="0"/>
-        </a:xfrm>
-      </p:grpSpPr>
-      <p:sp>
-        <p:nvSpPr>
-          <p:cNvPr id="7" name="Google Shape;66;p15">
-            <a:extLst>
-              <a:ext uri="{FF2B5EF4-FFF2-40B4-BE49-F238E27FC236}">
-                <a16:creationId xmlns:a16="http://schemas.microsoft.com/office/drawing/2014/main" id="{A2B7074F-A1D8-444B-9DA8-BFF70B4A2A8A}"/>
-              </a:ext>
-            </a:extLst>
-          </p:cNvPr>
-          <p:cNvSpPr txBox="1">
-            <a:spLocks/>
-          </p:cNvSpPr>
-          <p:nvPr/>
-        </p:nvSpPr>
-        <p:spPr>
-          <a:xfrm>
-            <a:off x="252575" y="140425"/>
-            <a:ext cx="8520600" cy="572700"/>
-          </a:xfrm>
-          <a:prstGeom prst="rect">
-            <a:avLst/>
-          </a:prstGeom>
-          <a:noFill/>
-          <a:ln>
-            <a:noFill/>
-          </a:ln>
-        </p:spPr>
-        <p:txBody>
-          <a:bodyPr spcFirstLastPara="1" wrap="square" lIns="91425" tIns="91425" rIns="91425" bIns="91425" anchor="t" anchorCtr="0">
-            <a:noAutofit/>
-          </a:bodyPr>
-          <a:lstStyle>
-            <a:defPPr marR="0" lvl="0" algn="l" rtl="0">
-              <a:lnSpc>
-                <a:spcPct val="100000"/>
-              </a:lnSpc>
-              <a:spcBef>
-                <a:spcPts val="0"/>
-              </a:spcBef>
-              <a:spcAft>
-                <a:spcPts val="0"/>
-              </a:spcAft>
-            </a:defPPr>
-            <a:lvl1pPr marR="0" lvl="0" algn="l" rtl="0">
-              <a:lnSpc>
-                <a:spcPct val="100000"/>
-              </a:lnSpc>
-              <a:spcBef>
-                <a:spcPts val="0"/>
-              </a:spcBef>
-              <a:spcAft>
-                <a:spcPts val="0"/>
-              </a:spcAft>
-              <a:buClr>
-                <a:schemeClr val="dk1"/>
-              </a:buClr>
-              <a:buSzPts val="2800"/>
-              <a:buFont typeface="Arial"/>
-              <a:buNone/>
-              <a:defRPr sz="2800" b="0" i="0" u="none" strike="noStrike" cap="none">
-                <a:solidFill>
-                  <a:schemeClr val="dk1"/>
-                </a:solidFill>
-                <a:latin typeface="Arial"/>
-                <a:ea typeface="Arial"/>
-                <a:cs typeface="Arial"/>
-                <a:sym typeface="Arial"/>
-              </a:defRPr>
-            </a:lvl1pPr>
-            <a:lvl2pPr marR="0" lvl="1" algn="l" rtl="0">
-              <a:lnSpc>
-                <a:spcPct val="100000"/>
-              </a:lnSpc>
-              <a:spcBef>
-                <a:spcPts val="0"/>
-              </a:spcBef>
-              <a:spcAft>
-                <a:spcPts val="0"/>
-              </a:spcAft>
-              <a:buClr>
-                <a:schemeClr val="dk1"/>
-              </a:buClr>
-              <a:buSzPts val="2800"/>
-              <a:buFont typeface="Arial"/>
-              <a:buNone/>
-              <a:defRPr sz="2800" b="0" i="0" u="none" strike="noStrike" cap="none">
-                <a:solidFill>
-                  <a:schemeClr val="dk1"/>
-                </a:solidFill>
-                <a:latin typeface="Arial"/>
-                <a:ea typeface="Arial"/>
-                <a:cs typeface="Arial"/>
-                <a:sym typeface="Arial"/>
-              </a:defRPr>
-            </a:lvl2pPr>
-            <a:lvl3pPr marR="0" lvl="2" algn="l" rtl="0">
-              <a:lnSpc>
-                <a:spcPct val="100000"/>
-              </a:lnSpc>
-              <a:spcBef>
-                <a:spcPts val="0"/>
-              </a:spcBef>
-              <a:spcAft>
-                <a:spcPts val="0"/>
-              </a:spcAft>
-              <a:buClr>
-                <a:schemeClr val="dk1"/>
-              </a:buClr>
-              <a:buSzPts val="2800"/>
-              <a:buFont typeface="Arial"/>
-              <a:buNone/>
-              <a:defRPr sz="2800" b="0" i="0" u="none" strike="noStrike" cap="none">
-                <a:solidFill>
-                  <a:schemeClr val="dk1"/>
-                </a:solidFill>
-                <a:latin typeface="Arial"/>
-                <a:ea typeface="Arial"/>
-                <a:cs typeface="Arial"/>
-                <a:sym typeface="Arial"/>
-              </a:defRPr>
-            </a:lvl3pPr>
-            <a:lvl4pPr marR="0" lvl="3" algn="l" rtl="0">
-              <a:lnSpc>
-                <a:spcPct val="100000"/>
-              </a:lnSpc>
-              <a:spcBef>
-                <a:spcPts val="0"/>
-              </a:spcBef>
-              <a:spcAft>
-                <a:spcPts val="0"/>
-              </a:spcAft>
-              <a:buClr>
-                <a:schemeClr val="dk1"/>
-              </a:buClr>
-              <a:buSzPts val="2800"/>
-              <a:buFont typeface="Arial"/>
-              <a:buNone/>
-              <a:defRPr sz="2800" b="0" i="0" u="none" strike="noStrike" cap="none">
-                <a:solidFill>
-                  <a:schemeClr val="dk1"/>
-                </a:solidFill>
-                <a:latin typeface="Arial"/>
-                <a:ea typeface="Arial"/>
-                <a:cs typeface="Arial"/>
-                <a:sym typeface="Arial"/>
-              </a:defRPr>
-            </a:lvl4pPr>
-            <a:lvl5pPr marR="0" lvl="4" algn="l" rtl="0">
-              <a:lnSpc>
-                <a:spcPct val="100000"/>
-              </a:lnSpc>
-              <a:spcBef>
-                <a:spcPts val="0"/>
-              </a:spcBef>
-              <a:spcAft>
-                <a:spcPts val="0"/>
-              </a:spcAft>
-              <a:buClr>
-                <a:schemeClr val="dk1"/>
-              </a:buClr>
-              <a:buSzPts val="2800"/>
-              <a:buFont typeface="Arial"/>
-              <a:buNone/>
-              <a:defRPr sz="2800" b="0" i="0" u="none" strike="noStrike" cap="none">
-                <a:solidFill>
-                  <a:schemeClr val="dk1"/>
-                </a:solidFill>
-                <a:latin typeface="Arial"/>
-                <a:ea typeface="Arial"/>
-                <a:cs typeface="Arial"/>
-                <a:sym typeface="Arial"/>
-              </a:defRPr>
-            </a:lvl5pPr>
-            <a:lvl6pPr marR="0" lvl="5" algn="l" rtl="0">
-              <a:lnSpc>
-                <a:spcPct val="100000"/>
-              </a:lnSpc>
-              <a:spcBef>
-                <a:spcPts val="0"/>
-              </a:spcBef>
-              <a:spcAft>
-                <a:spcPts val="0"/>
-              </a:spcAft>
-              <a:buClr>
-                <a:schemeClr val="dk1"/>
-              </a:buClr>
-              <a:buSzPts val="2800"/>
-              <a:buFont typeface="Arial"/>
-              <a:buNone/>
-              <a:defRPr sz="2800" b="0" i="0" u="none" strike="noStrike" cap="none">
-                <a:solidFill>
-                  <a:schemeClr val="dk1"/>
-                </a:solidFill>
-                <a:latin typeface="Arial"/>
-                <a:ea typeface="Arial"/>
-                <a:cs typeface="Arial"/>
-                <a:sym typeface="Arial"/>
-              </a:defRPr>
-            </a:lvl6pPr>
-            <a:lvl7pPr marR="0" lvl="6" algn="l" rtl="0">
-              <a:lnSpc>
-                <a:spcPct val="100000"/>
-              </a:lnSpc>
-              <a:spcBef>
-                <a:spcPts val="0"/>
-              </a:spcBef>
-              <a:spcAft>
-                <a:spcPts val="0"/>
-              </a:spcAft>
-              <a:buClr>
-                <a:schemeClr val="dk1"/>
-              </a:buClr>
-              <a:buSzPts val="2800"/>
-              <a:buFont typeface="Arial"/>
-              <a:buNone/>
-              <a:defRPr sz="2800" b="0" i="0" u="none" strike="noStrike" cap="none">
-                <a:solidFill>
-                  <a:schemeClr val="dk1"/>
-                </a:solidFill>
-                <a:latin typeface="Arial"/>
-                <a:ea typeface="Arial"/>
-                <a:cs typeface="Arial"/>
-                <a:sym typeface="Arial"/>
-              </a:defRPr>
-            </a:lvl7pPr>
-            <a:lvl8pPr marR="0" lvl="7" algn="l" rtl="0">
-              <a:lnSpc>
-                <a:spcPct val="100000"/>
-              </a:lnSpc>
-              <a:spcBef>
-                <a:spcPts val="0"/>
-              </a:spcBef>
-              <a:spcAft>
-                <a:spcPts val="0"/>
-              </a:spcAft>
-              <a:buClr>
-                <a:schemeClr val="dk1"/>
-              </a:buClr>
-              <a:buSzPts val="2800"/>
-              <a:buFont typeface="Arial"/>
-              <a:buNone/>
-              <a:defRPr sz="2800" b="0" i="0" u="none" strike="noStrike" cap="none">
-                <a:solidFill>
-                  <a:schemeClr val="dk1"/>
-                </a:solidFill>
-                <a:latin typeface="Arial"/>
-                <a:ea typeface="Arial"/>
-                <a:cs typeface="Arial"/>
-                <a:sym typeface="Arial"/>
-              </a:defRPr>
-            </a:lvl8pPr>
-            <a:lvl9pPr marR="0" lvl="8" algn="l" rtl="0">
-              <a:lnSpc>
-                <a:spcPct val="100000"/>
-              </a:lnSpc>
-              <a:spcBef>
-                <a:spcPts val="0"/>
-              </a:spcBef>
-              <a:spcAft>
-                <a:spcPts val="0"/>
-              </a:spcAft>
-              <a:buClr>
-                <a:schemeClr val="dk1"/>
-              </a:buClr>
-              <a:buSzPts val="2800"/>
-              <a:buFont typeface="Arial"/>
-              <a:buNone/>
-              <a:defRPr sz="2800" b="0" i="0" u="none" strike="noStrike" cap="none">
-                <a:solidFill>
-                  <a:schemeClr val="dk1"/>
-                </a:solidFill>
-                <a:latin typeface="Arial"/>
-                <a:ea typeface="Arial"/>
-                <a:cs typeface="Arial"/>
-                <a:sym typeface="Arial"/>
-              </a:defRPr>
-            </a:lvl9pPr>
-          </a:lstStyle>
-          <a:p>
-            <a:r>
-              <a:rPr lang="en-GB" b="1" dirty="0">
-                <a:effectLst>
-                  <a:outerShdw blurRad="38100" dist="38100" dir="2700000" algn="tl">
-                    <a:srgbClr val="000000">
-                      <a:alpha val="43137"/>
-                    </a:srgbClr>
-                  </a:outerShdw>
-                </a:effectLst>
-              </a:rPr>
-              <a:t>Personas</a:t>
-            </a:r>
-          </a:p>
-        </p:txBody>
-      </p:sp>
-      <p:sp>
-        <p:nvSpPr>
-          <p:cNvPr id="8" name="TextBox 7">
-            <a:extLst>
-              <a:ext uri="{FF2B5EF4-FFF2-40B4-BE49-F238E27FC236}">
-                <a16:creationId xmlns:a16="http://schemas.microsoft.com/office/drawing/2014/main" id="{4B40FD6D-82C8-48B1-A5D3-456D8792334C}"/>
-              </a:ext>
-            </a:extLst>
-          </p:cNvPr>
-          <p:cNvSpPr txBox="1"/>
-          <p:nvPr/>
-        </p:nvSpPr>
-        <p:spPr>
-          <a:xfrm>
-            <a:off x="4740089" y="893382"/>
-            <a:ext cx="4269442" cy="1384995"/>
-          </a:xfrm>
-          <a:prstGeom prst="rect">
-            <a:avLst/>
-          </a:prstGeom>
-          <a:noFill/>
-        </p:spPr>
-        <p:txBody>
-          <a:bodyPr wrap="square" rtlCol="0">
-            <a:spAutoFit/>
-          </a:bodyPr>
-          <a:lstStyle/>
-          <a:p>
-            <a:r>
-              <a:rPr lang="en-US" b="1" dirty="0"/>
-              <a:t>Corporate Client (Yandex, </a:t>
-            </a:r>
-            <a:r>
-              <a:rPr lang="en-US" b="1" dirty="0" err="1"/>
-              <a:t>Sber</a:t>
-            </a:r>
-            <a:r>
-              <a:rPr lang="en-US" b="1" dirty="0"/>
-              <a:t>)</a:t>
-            </a:r>
-          </a:p>
-          <a:p>
-            <a:br>
-              <a:rPr lang="en-US" dirty="0"/>
-            </a:br>
-            <a:r>
-              <a:rPr lang="en-US" b="1" dirty="0"/>
-              <a:t>Goals:</a:t>
-            </a:r>
-            <a:endParaRPr lang="en-US" dirty="0"/>
-          </a:p>
-          <a:p>
-            <a:pPr marL="285750" indent="-285750">
-              <a:buFont typeface="Arial" panose="020B0604020202020204" pitchFamily="34" charset="0"/>
-              <a:buChar char="•"/>
-            </a:pPr>
-            <a:r>
-              <a:rPr lang="en-US" dirty="0"/>
-              <a:t>Scalable and secure deployment of ML models.</a:t>
-            </a:r>
-          </a:p>
-          <a:p>
-            <a:pPr marL="285750" indent="-285750">
-              <a:buFont typeface="Arial" panose="020B0604020202020204" pitchFamily="34" charset="0"/>
-              <a:buChar char="•"/>
-            </a:pPr>
-            <a:r>
-              <a:rPr lang="en-US" dirty="0"/>
-              <a:t>Integration of the API gateway into existing infrastructure.</a:t>
-            </a:r>
-          </a:p>
-        </p:txBody>
-      </p:sp>
-      <p:sp>
-        <p:nvSpPr>
-          <p:cNvPr id="2" name="TextBox 1">
-            <a:extLst>
-              <a:ext uri="{FF2B5EF4-FFF2-40B4-BE49-F238E27FC236}">
-                <a16:creationId xmlns:a16="http://schemas.microsoft.com/office/drawing/2014/main" id="{BC8183E0-B6FC-471C-B2F8-14996330AB16}"/>
-              </a:ext>
-            </a:extLst>
-          </p:cNvPr>
-          <p:cNvSpPr txBox="1"/>
-          <p:nvPr/>
-        </p:nvSpPr>
-        <p:spPr>
-          <a:xfrm>
-            <a:off x="352043" y="903891"/>
-            <a:ext cx="4051870" cy="1384995"/>
-          </a:xfrm>
-          <a:prstGeom prst="rect">
-            <a:avLst/>
-          </a:prstGeom>
-          <a:noFill/>
-        </p:spPr>
-        <p:txBody>
-          <a:bodyPr wrap="square" rtlCol="0">
-            <a:spAutoFit/>
-          </a:bodyPr>
-          <a:lstStyle/>
-          <a:p>
-            <a:r>
-              <a:rPr lang="en-US" b="1" dirty="0"/>
-              <a:t>API Consumer (Sergey, 30 years old)</a:t>
-            </a:r>
-          </a:p>
-          <a:p>
-            <a:br>
-              <a:rPr lang="en-US" dirty="0"/>
-            </a:br>
-            <a:r>
-              <a:rPr lang="en-US" b="1" dirty="0"/>
-              <a:t>Goals:</a:t>
-            </a:r>
-            <a:endParaRPr lang="en-US" dirty="0"/>
-          </a:p>
-          <a:p>
-            <a:pPr marL="285750" indent="-285750">
-              <a:buFont typeface="Arial" panose="020B0604020202020204" pitchFamily="34" charset="0"/>
-              <a:buChar char="•"/>
-            </a:pPr>
-            <a:r>
-              <a:rPr lang="en-US" dirty="0"/>
-              <a:t>Get documentation for quick access to ML models.</a:t>
-            </a:r>
-          </a:p>
-          <a:p>
-            <a:pPr marL="285750" indent="-285750">
-              <a:buFont typeface="Arial" panose="020B0604020202020204" pitchFamily="34" charset="0"/>
-              <a:buChar char="•"/>
-            </a:pPr>
-            <a:r>
-              <a:rPr lang="en-US" dirty="0"/>
-              <a:t>Work with reliable and validated APIs.</a:t>
-            </a:r>
-            <a:endParaRPr lang="ru-RU" dirty="0"/>
-          </a:p>
-        </p:txBody>
-      </p:sp>
-      <p:sp>
-        <p:nvSpPr>
-          <p:cNvPr id="3" name="Slide Number Placeholder 2">
-            <a:extLst>
-              <a:ext uri="{FF2B5EF4-FFF2-40B4-BE49-F238E27FC236}">
-                <a16:creationId xmlns:a16="http://schemas.microsoft.com/office/drawing/2014/main" id="{C78D3A78-ED79-4CFE-9690-1D96304C679A}"/>
-              </a:ext>
-            </a:extLst>
-          </p:cNvPr>
-          <p:cNvSpPr>
-            <a:spLocks noGrp="1"/>
-          </p:cNvSpPr>
-          <p:nvPr>
-            <p:ph type="sldNum" idx="12"/>
-          </p:nvPr>
-        </p:nvSpPr>
-        <p:spPr/>
-        <p:txBody>
-          <a:bodyPr/>
-          <a:lstStyle/>
-          <a:p>
-            <a:pPr marL="0" lvl="0" indent="0" algn="r" rtl="0">
-              <a:spcBef>
-                <a:spcPts val="0"/>
-              </a:spcBef>
-              <a:spcAft>
-                <a:spcPts val="0"/>
-              </a:spcAft>
-              <a:buNone/>
-            </a:pPr>
-            <a:fld id="{00000000-1234-1234-1234-123412341234}" type="slidenum">
-              <a:rPr lang="en-GB" smtClean="0"/>
-              <a:t>4</a:t>
-            </a:fld>
-            <a:endParaRPr lang="en-GB"/>
-          </a:p>
-        </p:txBody>
-      </p:sp>
-      <p:sp>
-        <p:nvSpPr>
-          <p:cNvPr id="4" name="TextBox 3">
-            <a:extLst>
-              <a:ext uri="{FF2B5EF4-FFF2-40B4-BE49-F238E27FC236}">
-                <a16:creationId xmlns:a16="http://schemas.microsoft.com/office/drawing/2014/main" id="{FFDCAFA8-B478-40D2-932B-498A36B6913F}"/>
-              </a:ext>
-            </a:extLst>
-          </p:cNvPr>
-          <p:cNvSpPr txBox="1"/>
-          <p:nvPr/>
-        </p:nvSpPr>
-        <p:spPr>
-          <a:xfrm>
-            <a:off x="4861112" y="2955581"/>
-            <a:ext cx="3912063" cy="954107"/>
-          </a:xfrm>
-          <a:prstGeom prst="rect">
-            <a:avLst/>
-          </a:prstGeom>
-          <a:noFill/>
-        </p:spPr>
-        <p:txBody>
-          <a:bodyPr wrap="square" rtlCol="0">
-            <a:spAutoFit/>
-          </a:bodyPr>
-          <a:lstStyle/>
-          <a:p>
-            <a:r>
-              <a:rPr lang="en-US" b="1" dirty="0"/>
-              <a:t>Pain points:</a:t>
-            </a:r>
-            <a:endParaRPr lang="en-US" dirty="0"/>
-          </a:p>
-          <a:p>
-            <a:pPr marL="285750" indent="-285750">
-              <a:buFont typeface="Arial" panose="020B0604020202020204" pitchFamily="34" charset="0"/>
-              <a:buChar char="•"/>
-            </a:pPr>
-            <a:r>
-              <a:rPr lang="en-US" dirty="0"/>
-              <a:t>Challenges with integration and corporate standards.</a:t>
-            </a:r>
-          </a:p>
-          <a:p>
-            <a:endParaRPr lang="ru-RU" dirty="0"/>
-          </a:p>
-        </p:txBody>
-      </p:sp>
-      <p:sp>
-        <p:nvSpPr>
-          <p:cNvPr id="5" name="TextBox 4">
-            <a:extLst>
-              <a:ext uri="{FF2B5EF4-FFF2-40B4-BE49-F238E27FC236}">
-                <a16:creationId xmlns:a16="http://schemas.microsoft.com/office/drawing/2014/main" id="{8BDC0A45-240C-4BA7-909B-5DD2FA0DB4FB}"/>
-              </a:ext>
-            </a:extLst>
-          </p:cNvPr>
-          <p:cNvSpPr txBox="1"/>
-          <p:nvPr/>
-        </p:nvSpPr>
-        <p:spPr>
-          <a:xfrm>
-            <a:off x="370825" y="2955580"/>
-            <a:ext cx="3912063" cy="954107"/>
-          </a:xfrm>
-          <a:prstGeom prst="rect">
-            <a:avLst/>
-          </a:prstGeom>
-          <a:noFill/>
-        </p:spPr>
-        <p:txBody>
-          <a:bodyPr wrap="square" rtlCol="0">
-            <a:spAutoFit/>
-          </a:bodyPr>
-          <a:lstStyle/>
-          <a:p>
-            <a:r>
-              <a:rPr lang="en-US" b="1" dirty="0"/>
-              <a:t>Pain points:</a:t>
-            </a:r>
-            <a:endParaRPr lang="en-US" dirty="0"/>
-          </a:p>
-          <a:p>
-            <a:pPr marL="285750" indent="-285750">
-              <a:buFont typeface="Arial" panose="020B0604020202020204" pitchFamily="34" charset="0"/>
-              <a:buChar char="•"/>
-            </a:pPr>
-            <a:r>
-              <a:rPr lang="en-US" dirty="0"/>
-              <a:t>Incomplete or outdated documentation.</a:t>
-            </a:r>
-          </a:p>
-          <a:p>
-            <a:pPr marL="285750" indent="-285750">
-              <a:buFont typeface="Arial" panose="020B0604020202020204" pitchFamily="34" charset="0"/>
-              <a:buChar char="•"/>
-            </a:pPr>
-            <a:r>
-              <a:rPr lang="en-US" dirty="0"/>
-              <a:t>API instability and delays.</a:t>
-            </a:r>
-          </a:p>
-          <a:p>
-            <a:endParaRPr lang="ru-RU" dirty="0"/>
-          </a:p>
-        </p:txBody>
-      </p:sp>
-    </p:spTree>
-    <p:extLst>
-      <p:ext uri="{BB962C8B-B14F-4D97-AF65-F5344CB8AC3E}">
-        <p14:creationId xmlns:p14="http://schemas.microsoft.com/office/powerpoint/2010/main" val="2691937146"/>
-      </p:ext>
-    </p:extLst>
-  </p:cSld>
-  <p:clrMapOvr>
-    <a:masterClrMapping/>
-  </p:clrMapOvr>
-</p:sld>
-</file>
-
-<file path=ppt/slides/slide5.xml><?xml version="1.0" encoding="utf-8"?>
-<p:sld xmlns:a="http://schemas.openxmlformats.org/drawingml/2006/main" xmlns:r="http://schemas.openxmlformats.org/officeDocument/2006/relationships" xmlns:p="http://schemas.openxmlformats.org/presentationml/2006/main">
-  <p:cSld>
-    <p:spTree>
-      <p:nvGrpSpPr>
         <p:cNvPr id="1" name="Shape 65"/>
         <p:cNvGrpSpPr/>
         <p:nvPr/>
@@ -13158,7 +11568,7 @@
             </a:pPr>
             <a:fld id="{00000000-1234-1234-1234-123412341234}" type="slidenum">
               <a:rPr lang="en-GB" smtClean="0"/>
-              <a:t>5</a:t>
+              <a:t>3</a:t>
             </a:fld>
             <a:endParaRPr lang="en-GB"/>
           </a:p>
@@ -13177,7 +11587,803 @@
 </p:sld>
 </file>
 
-<file path=ppt/slides/slide6.xml><?xml version="1.0" encoding="utf-8"?>
+<file path=ppt/slides/slide4.xml><?xml version="1.0" encoding="utf-8"?>
+<p:sld xmlns:a="http://schemas.openxmlformats.org/drawingml/2006/main" xmlns:r="http://schemas.openxmlformats.org/officeDocument/2006/relationships" xmlns:p="http://schemas.openxmlformats.org/presentationml/2006/main">
+  <p:cSld>
+    <p:spTree>
+      <p:nvGrpSpPr>
+        <p:cNvPr id="1" name=""/>
+        <p:cNvGrpSpPr/>
+        <p:nvPr/>
+      </p:nvGrpSpPr>
+      <p:grpSpPr>
+        <a:xfrm>
+          <a:off x="0" y="0"/>
+          <a:ext cx="0" cy="0"/>
+          <a:chOff x="0" y="0"/>
+          <a:chExt cx="0" cy="0"/>
+        </a:xfrm>
+      </p:grpSpPr>
+      <p:sp>
+        <p:nvSpPr>
+          <p:cNvPr id="3" name="Текст 2">
+            <a:extLst>
+              <a:ext uri="{FF2B5EF4-FFF2-40B4-BE49-F238E27FC236}">
+                <a16:creationId xmlns:a16="http://schemas.microsoft.com/office/drawing/2014/main" id="{73D9E495-74CF-49FC-8FE9-9E20997A0616}"/>
+              </a:ext>
+            </a:extLst>
+          </p:cNvPr>
+          <p:cNvSpPr>
+            <a:spLocks noGrp="1"/>
+          </p:cNvSpPr>
+          <p:nvPr>
+            <p:ph type="body" idx="1"/>
+          </p:nvPr>
+        </p:nvSpPr>
+        <p:spPr>
+          <a:xfrm>
+            <a:off x="179078" y="713125"/>
+            <a:ext cx="4051870" cy="2249444"/>
+          </a:xfrm>
+        </p:spPr>
+        <p:txBody>
+          <a:bodyPr/>
+          <a:lstStyle/>
+          <a:p>
+            <a:pPr marL="139700" indent="0">
+              <a:buNone/>
+            </a:pPr>
+            <a:r>
+              <a:rPr lang="en-US" b="1" dirty="0">
+                <a:solidFill>
+                  <a:schemeClr val="tx1"/>
+                </a:solidFill>
+              </a:rPr>
+              <a:t>ML Engineer (Maria, 32 years old)</a:t>
+            </a:r>
+          </a:p>
+          <a:p>
+            <a:pPr marL="139700" indent="0">
+              <a:buNone/>
+            </a:pPr>
+            <a:br>
+              <a:rPr lang="en-US" dirty="0">
+                <a:solidFill>
+                  <a:schemeClr val="tx1"/>
+                </a:solidFill>
+              </a:rPr>
+            </a:br>
+            <a:r>
+              <a:rPr lang="en-US" b="1" dirty="0">
+                <a:solidFill>
+                  <a:schemeClr val="tx1"/>
+                </a:solidFill>
+              </a:rPr>
+              <a:t>Goals:</a:t>
+            </a:r>
+            <a:endParaRPr lang="en-US" dirty="0">
+              <a:solidFill>
+                <a:schemeClr val="tx1"/>
+              </a:solidFill>
+            </a:endParaRPr>
+          </a:p>
+          <a:p>
+            <a:pPr>
+              <a:lnSpc>
+                <a:spcPct val="120000"/>
+              </a:lnSpc>
+              <a:buFont typeface="Arial" panose="020B0604020202020204" pitchFamily="34" charset="0"/>
+              <a:buChar char="•"/>
+            </a:pPr>
+            <a:r>
+              <a:rPr lang="en-US" dirty="0">
+                <a:solidFill>
+                  <a:schemeClr val="tx1"/>
+                </a:solidFill>
+              </a:rPr>
+              <a:t>Deploy and version ML models in Kubernetes.</a:t>
+            </a:r>
+          </a:p>
+          <a:p>
+            <a:pPr>
+              <a:lnSpc>
+                <a:spcPct val="120000"/>
+              </a:lnSpc>
+              <a:buFont typeface="Arial" panose="020B0604020202020204" pitchFamily="34" charset="0"/>
+              <a:buChar char="•"/>
+            </a:pPr>
+            <a:r>
+              <a:rPr lang="en-US" dirty="0">
+                <a:solidFill>
+                  <a:schemeClr val="tx1"/>
+                </a:solidFill>
+              </a:rPr>
+              <a:t>Automatic deploy and further documentation.</a:t>
+            </a:r>
+          </a:p>
+          <a:p>
+            <a:pPr>
+              <a:lnSpc>
+                <a:spcPct val="120000"/>
+              </a:lnSpc>
+              <a:buFont typeface="Arial" panose="020B0604020202020204" pitchFamily="34" charset="0"/>
+              <a:buChar char="•"/>
+            </a:pPr>
+            <a:r>
+              <a:rPr lang="en-US" dirty="0">
+                <a:solidFill>
+                  <a:schemeClr val="tx1"/>
+                </a:solidFill>
+              </a:rPr>
+              <a:t>Flexibility for different ML frameworks.</a:t>
+            </a:r>
+          </a:p>
+        </p:txBody>
+      </p:sp>
+      <p:sp>
+        <p:nvSpPr>
+          <p:cNvPr id="7" name="Google Shape;66;p15">
+            <a:extLst>
+              <a:ext uri="{FF2B5EF4-FFF2-40B4-BE49-F238E27FC236}">
+                <a16:creationId xmlns:a16="http://schemas.microsoft.com/office/drawing/2014/main" id="{A2B7074F-A1D8-444B-9DA8-BFF70B4A2A8A}"/>
+              </a:ext>
+            </a:extLst>
+          </p:cNvPr>
+          <p:cNvSpPr txBox="1">
+            <a:spLocks/>
+          </p:cNvSpPr>
+          <p:nvPr/>
+        </p:nvSpPr>
+        <p:spPr>
+          <a:xfrm>
+            <a:off x="252575" y="140425"/>
+            <a:ext cx="8520600" cy="572700"/>
+          </a:xfrm>
+          <a:prstGeom prst="rect">
+            <a:avLst/>
+          </a:prstGeom>
+          <a:noFill/>
+          <a:ln>
+            <a:noFill/>
+          </a:ln>
+        </p:spPr>
+        <p:txBody>
+          <a:bodyPr spcFirstLastPara="1" wrap="square" lIns="91425" tIns="91425" rIns="91425" bIns="91425" anchor="t" anchorCtr="0">
+            <a:noAutofit/>
+          </a:bodyPr>
+          <a:lstStyle>
+            <a:defPPr marR="0" lvl="0" algn="l" rtl="0">
+              <a:lnSpc>
+                <a:spcPct val="100000"/>
+              </a:lnSpc>
+              <a:spcBef>
+                <a:spcPts val="0"/>
+              </a:spcBef>
+              <a:spcAft>
+                <a:spcPts val="0"/>
+              </a:spcAft>
+            </a:defPPr>
+            <a:lvl1pPr marR="0" lvl="0" algn="l" rtl="0">
+              <a:lnSpc>
+                <a:spcPct val="100000"/>
+              </a:lnSpc>
+              <a:spcBef>
+                <a:spcPts val="0"/>
+              </a:spcBef>
+              <a:spcAft>
+                <a:spcPts val="0"/>
+              </a:spcAft>
+              <a:buClr>
+                <a:schemeClr val="dk1"/>
+              </a:buClr>
+              <a:buSzPts val="2800"/>
+              <a:buFont typeface="Arial"/>
+              <a:buNone/>
+              <a:defRPr sz="2800" b="0" i="0" u="none" strike="noStrike" cap="none">
+                <a:solidFill>
+                  <a:schemeClr val="dk1"/>
+                </a:solidFill>
+                <a:latin typeface="Arial"/>
+                <a:ea typeface="Arial"/>
+                <a:cs typeface="Arial"/>
+                <a:sym typeface="Arial"/>
+              </a:defRPr>
+            </a:lvl1pPr>
+            <a:lvl2pPr marR="0" lvl="1" algn="l" rtl="0">
+              <a:lnSpc>
+                <a:spcPct val="100000"/>
+              </a:lnSpc>
+              <a:spcBef>
+                <a:spcPts val="0"/>
+              </a:spcBef>
+              <a:spcAft>
+                <a:spcPts val="0"/>
+              </a:spcAft>
+              <a:buClr>
+                <a:schemeClr val="dk1"/>
+              </a:buClr>
+              <a:buSzPts val="2800"/>
+              <a:buFont typeface="Arial"/>
+              <a:buNone/>
+              <a:defRPr sz="2800" b="0" i="0" u="none" strike="noStrike" cap="none">
+                <a:solidFill>
+                  <a:schemeClr val="dk1"/>
+                </a:solidFill>
+                <a:latin typeface="Arial"/>
+                <a:ea typeface="Arial"/>
+                <a:cs typeface="Arial"/>
+                <a:sym typeface="Arial"/>
+              </a:defRPr>
+            </a:lvl2pPr>
+            <a:lvl3pPr marR="0" lvl="2" algn="l" rtl="0">
+              <a:lnSpc>
+                <a:spcPct val="100000"/>
+              </a:lnSpc>
+              <a:spcBef>
+                <a:spcPts val="0"/>
+              </a:spcBef>
+              <a:spcAft>
+                <a:spcPts val="0"/>
+              </a:spcAft>
+              <a:buClr>
+                <a:schemeClr val="dk1"/>
+              </a:buClr>
+              <a:buSzPts val="2800"/>
+              <a:buFont typeface="Arial"/>
+              <a:buNone/>
+              <a:defRPr sz="2800" b="0" i="0" u="none" strike="noStrike" cap="none">
+                <a:solidFill>
+                  <a:schemeClr val="dk1"/>
+                </a:solidFill>
+                <a:latin typeface="Arial"/>
+                <a:ea typeface="Arial"/>
+                <a:cs typeface="Arial"/>
+                <a:sym typeface="Arial"/>
+              </a:defRPr>
+            </a:lvl3pPr>
+            <a:lvl4pPr marR="0" lvl="3" algn="l" rtl="0">
+              <a:lnSpc>
+                <a:spcPct val="100000"/>
+              </a:lnSpc>
+              <a:spcBef>
+                <a:spcPts val="0"/>
+              </a:spcBef>
+              <a:spcAft>
+                <a:spcPts val="0"/>
+              </a:spcAft>
+              <a:buClr>
+                <a:schemeClr val="dk1"/>
+              </a:buClr>
+              <a:buSzPts val="2800"/>
+              <a:buFont typeface="Arial"/>
+              <a:buNone/>
+              <a:defRPr sz="2800" b="0" i="0" u="none" strike="noStrike" cap="none">
+                <a:solidFill>
+                  <a:schemeClr val="dk1"/>
+                </a:solidFill>
+                <a:latin typeface="Arial"/>
+                <a:ea typeface="Arial"/>
+                <a:cs typeface="Arial"/>
+                <a:sym typeface="Arial"/>
+              </a:defRPr>
+            </a:lvl4pPr>
+            <a:lvl5pPr marR="0" lvl="4" algn="l" rtl="0">
+              <a:lnSpc>
+                <a:spcPct val="100000"/>
+              </a:lnSpc>
+              <a:spcBef>
+                <a:spcPts val="0"/>
+              </a:spcBef>
+              <a:spcAft>
+                <a:spcPts val="0"/>
+              </a:spcAft>
+              <a:buClr>
+                <a:schemeClr val="dk1"/>
+              </a:buClr>
+              <a:buSzPts val="2800"/>
+              <a:buFont typeface="Arial"/>
+              <a:buNone/>
+              <a:defRPr sz="2800" b="0" i="0" u="none" strike="noStrike" cap="none">
+                <a:solidFill>
+                  <a:schemeClr val="dk1"/>
+                </a:solidFill>
+                <a:latin typeface="Arial"/>
+                <a:ea typeface="Arial"/>
+                <a:cs typeface="Arial"/>
+                <a:sym typeface="Arial"/>
+              </a:defRPr>
+            </a:lvl5pPr>
+            <a:lvl6pPr marR="0" lvl="5" algn="l" rtl="0">
+              <a:lnSpc>
+                <a:spcPct val="100000"/>
+              </a:lnSpc>
+              <a:spcBef>
+                <a:spcPts val="0"/>
+              </a:spcBef>
+              <a:spcAft>
+                <a:spcPts val="0"/>
+              </a:spcAft>
+              <a:buClr>
+                <a:schemeClr val="dk1"/>
+              </a:buClr>
+              <a:buSzPts val="2800"/>
+              <a:buFont typeface="Arial"/>
+              <a:buNone/>
+              <a:defRPr sz="2800" b="0" i="0" u="none" strike="noStrike" cap="none">
+                <a:solidFill>
+                  <a:schemeClr val="dk1"/>
+                </a:solidFill>
+                <a:latin typeface="Arial"/>
+                <a:ea typeface="Arial"/>
+                <a:cs typeface="Arial"/>
+                <a:sym typeface="Arial"/>
+              </a:defRPr>
+            </a:lvl6pPr>
+            <a:lvl7pPr marR="0" lvl="6" algn="l" rtl="0">
+              <a:lnSpc>
+                <a:spcPct val="100000"/>
+              </a:lnSpc>
+              <a:spcBef>
+                <a:spcPts val="0"/>
+              </a:spcBef>
+              <a:spcAft>
+                <a:spcPts val="0"/>
+              </a:spcAft>
+              <a:buClr>
+                <a:schemeClr val="dk1"/>
+              </a:buClr>
+              <a:buSzPts val="2800"/>
+              <a:buFont typeface="Arial"/>
+              <a:buNone/>
+              <a:defRPr sz="2800" b="0" i="0" u="none" strike="noStrike" cap="none">
+                <a:solidFill>
+                  <a:schemeClr val="dk1"/>
+                </a:solidFill>
+                <a:latin typeface="Arial"/>
+                <a:ea typeface="Arial"/>
+                <a:cs typeface="Arial"/>
+                <a:sym typeface="Arial"/>
+              </a:defRPr>
+            </a:lvl7pPr>
+            <a:lvl8pPr marR="0" lvl="7" algn="l" rtl="0">
+              <a:lnSpc>
+                <a:spcPct val="100000"/>
+              </a:lnSpc>
+              <a:spcBef>
+                <a:spcPts val="0"/>
+              </a:spcBef>
+              <a:spcAft>
+                <a:spcPts val="0"/>
+              </a:spcAft>
+              <a:buClr>
+                <a:schemeClr val="dk1"/>
+              </a:buClr>
+              <a:buSzPts val="2800"/>
+              <a:buFont typeface="Arial"/>
+              <a:buNone/>
+              <a:defRPr sz="2800" b="0" i="0" u="none" strike="noStrike" cap="none">
+                <a:solidFill>
+                  <a:schemeClr val="dk1"/>
+                </a:solidFill>
+                <a:latin typeface="Arial"/>
+                <a:ea typeface="Arial"/>
+                <a:cs typeface="Arial"/>
+                <a:sym typeface="Arial"/>
+              </a:defRPr>
+            </a:lvl8pPr>
+            <a:lvl9pPr marR="0" lvl="8" algn="l" rtl="0">
+              <a:lnSpc>
+                <a:spcPct val="100000"/>
+              </a:lnSpc>
+              <a:spcBef>
+                <a:spcPts val="0"/>
+              </a:spcBef>
+              <a:spcAft>
+                <a:spcPts val="0"/>
+              </a:spcAft>
+              <a:buClr>
+                <a:schemeClr val="dk1"/>
+              </a:buClr>
+              <a:buSzPts val="2800"/>
+              <a:buFont typeface="Arial"/>
+              <a:buNone/>
+              <a:defRPr sz="2800" b="0" i="0" u="none" strike="noStrike" cap="none">
+                <a:solidFill>
+                  <a:schemeClr val="dk1"/>
+                </a:solidFill>
+                <a:latin typeface="Arial"/>
+                <a:ea typeface="Arial"/>
+                <a:cs typeface="Arial"/>
+                <a:sym typeface="Arial"/>
+              </a:defRPr>
+            </a:lvl9pPr>
+          </a:lstStyle>
+          <a:p>
+            <a:r>
+              <a:rPr lang="en-GB" b="1" dirty="0">
+                <a:effectLst>
+                  <a:outerShdw blurRad="38100" dist="38100" dir="2700000" algn="tl">
+                    <a:srgbClr val="000000">
+                      <a:alpha val="43137"/>
+                    </a:srgbClr>
+                  </a:outerShdw>
+                </a:effectLst>
+              </a:rPr>
+              <a:t>Personas</a:t>
+            </a:r>
+          </a:p>
+        </p:txBody>
+      </p:sp>
+      <p:sp>
+        <p:nvSpPr>
+          <p:cNvPr id="8" name="TextBox 7">
+            <a:extLst>
+              <a:ext uri="{FF2B5EF4-FFF2-40B4-BE49-F238E27FC236}">
+                <a16:creationId xmlns:a16="http://schemas.microsoft.com/office/drawing/2014/main" id="{4B40FD6D-82C8-48B1-A5D3-456D8792334C}"/>
+              </a:ext>
+            </a:extLst>
+          </p:cNvPr>
+          <p:cNvSpPr txBox="1"/>
+          <p:nvPr/>
+        </p:nvSpPr>
+        <p:spPr>
+          <a:xfrm>
+            <a:off x="4681106" y="713125"/>
+            <a:ext cx="4210319" cy="2007537"/>
+          </a:xfrm>
+          <a:prstGeom prst="rect">
+            <a:avLst/>
+          </a:prstGeom>
+          <a:noFill/>
+        </p:spPr>
+        <p:txBody>
+          <a:bodyPr wrap="square" rtlCol="0">
+            <a:spAutoFit/>
+          </a:bodyPr>
+          <a:lstStyle/>
+          <a:p>
+            <a:r>
+              <a:rPr lang="en-US" b="1" dirty="0">
+                <a:solidFill>
+                  <a:schemeClr val="tx1"/>
+                </a:solidFill>
+              </a:rPr>
+              <a:t>Backend Developer (Alexander, 28 years old)</a:t>
+            </a:r>
+          </a:p>
+          <a:p>
+            <a:br>
+              <a:rPr lang="en-US" dirty="0">
+                <a:solidFill>
+                  <a:schemeClr val="tx1"/>
+                </a:solidFill>
+              </a:rPr>
+            </a:br>
+            <a:r>
+              <a:rPr lang="en-US" b="1" dirty="0">
+                <a:solidFill>
+                  <a:schemeClr val="tx1"/>
+                </a:solidFill>
+              </a:rPr>
+              <a:t>Goals:</a:t>
+            </a:r>
+            <a:endParaRPr lang="en-US" dirty="0">
+              <a:solidFill>
+                <a:schemeClr val="tx1"/>
+              </a:solidFill>
+            </a:endParaRPr>
+          </a:p>
+          <a:p>
+            <a:pPr marL="285750" indent="-285750">
+              <a:lnSpc>
+                <a:spcPct val="120000"/>
+              </a:lnSpc>
+              <a:buFont typeface="Arial" panose="020B0604020202020204" pitchFamily="34" charset="0"/>
+              <a:buChar char="•"/>
+            </a:pPr>
+            <a:r>
+              <a:rPr lang="en-US" dirty="0"/>
+              <a:t>Integration of the API gateway into existing infrastructure.</a:t>
+            </a:r>
+          </a:p>
+          <a:p>
+            <a:pPr marL="285750" indent="-285750">
+              <a:lnSpc>
+                <a:spcPct val="120000"/>
+              </a:lnSpc>
+              <a:buFont typeface="Arial" panose="020B0604020202020204" pitchFamily="34" charset="0"/>
+              <a:buChar char="•"/>
+            </a:pPr>
+            <a:r>
+              <a:rPr lang="en-US" dirty="0">
+                <a:solidFill>
+                  <a:schemeClr val="tx1"/>
+                </a:solidFill>
+              </a:rPr>
+              <a:t>Use automatic </a:t>
+            </a:r>
+            <a:r>
+              <a:rPr lang="en-US" dirty="0" err="1">
+                <a:solidFill>
+                  <a:schemeClr val="tx1"/>
+                </a:solidFill>
+              </a:rPr>
+              <a:t>OpenAPI</a:t>
+            </a:r>
+            <a:r>
+              <a:rPr lang="en-US" dirty="0">
+                <a:solidFill>
+                  <a:schemeClr val="tx1"/>
+                </a:solidFill>
+              </a:rPr>
+              <a:t> schema generation.</a:t>
+            </a:r>
+          </a:p>
+          <a:p>
+            <a:pPr marL="285750" indent="-285750">
+              <a:lnSpc>
+                <a:spcPct val="120000"/>
+              </a:lnSpc>
+              <a:buFont typeface="Arial" panose="020B0604020202020204" pitchFamily="34" charset="0"/>
+              <a:buChar char="•"/>
+            </a:pPr>
+            <a:r>
+              <a:rPr lang="en-US" dirty="0">
+                <a:solidFill>
+                  <a:schemeClr val="tx1"/>
+                </a:solidFill>
+              </a:rPr>
+              <a:t>Manage access rules.</a:t>
+            </a:r>
+          </a:p>
+          <a:p>
+            <a:pPr marL="285750" indent="-285750">
+              <a:lnSpc>
+                <a:spcPct val="120000"/>
+              </a:lnSpc>
+              <a:buFont typeface="Arial" panose="020B0604020202020204" pitchFamily="34" charset="0"/>
+              <a:buChar char="•"/>
+            </a:pPr>
+            <a:r>
+              <a:rPr lang="en-US" dirty="0"/>
+              <a:t>Scalable and secure deployment of ML models.</a:t>
+            </a:r>
+          </a:p>
+        </p:txBody>
+      </p:sp>
+      <p:sp>
+        <p:nvSpPr>
+          <p:cNvPr id="2" name="Slide Number Placeholder 1">
+            <a:extLst>
+              <a:ext uri="{FF2B5EF4-FFF2-40B4-BE49-F238E27FC236}">
+                <a16:creationId xmlns:a16="http://schemas.microsoft.com/office/drawing/2014/main" id="{3178EC64-B23C-4E80-AA61-FE6C102031B5}"/>
+              </a:ext>
+            </a:extLst>
+          </p:cNvPr>
+          <p:cNvSpPr>
+            <a:spLocks noGrp="1"/>
+          </p:cNvSpPr>
+          <p:nvPr>
+            <p:ph type="sldNum" idx="12"/>
+          </p:nvPr>
+        </p:nvSpPr>
+        <p:spPr/>
+        <p:txBody>
+          <a:bodyPr/>
+          <a:lstStyle/>
+          <a:p>
+            <a:pPr marL="0" lvl="0" indent="0" algn="r" rtl="0">
+              <a:spcBef>
+                <a:spcPts val="0"/>
+              </a:spcBef>
+              <a:spcAft>
+                <a:spcPts val="0"/>
+              </a:spcAft>
+              <a:buNone/>
+            </a:pPr>
+            <a:fld id="{00000000-1234-1234-1234-123412341234}" type="slidenum">
+              <a:rPr lang="en-GB" smtClean="0"/>
+              <a:t>4</a:t>
+            </a:fld>
+            <a:endParaRPr lang="en-GB"/>
+          </a:p>
+        </p:txBody>
+      </p:sp>
+      <p:sp>
+        <p:nvSpPr>
+          <p:cNvPr id="4" name="TextBox 3">
+            <a:extLst>
+              <a:ext uri="{FF2B5EF4-FFF2-40B4-BE49-F238E27FC236}">
+                <a16:creationId xmlns:a16="http://schemas.microsoft.com/office/drawing/2014/main" id="{C9F9E3DC-5FD0-4211-A132-FB1036335AD0}"/>
+              </a:ext>
+            </a:extLst>
+          </p:cNvPr>
+          <p:cNvSpPr txBox="1"/>
+          <p:nvPr/>
+        </p:nvSpPr>
+        <p:spPr>
+          <a:xfrm>
+            <a:off x="252575" y="3309023"/>
+            <a:ext cx="4051870" cy="1040285"/>
+          </a:xfrm>
+          <a:prstGeom prst="rect">
+            <a:avLst/>
+          </a:prstGeom>
+          <a:noFill/>
+        </p:spPr>
+        <p:txBody>
+          <a:bodyPr wrap="square" rtlCol="0">
+            <a:spAutoFit/>
+          </a:bodyPr>
+          <a:lstStyle/>
+          <a:p>
+            <a:r>
+              <a:rPr lang="en-US" b="1" dirty="0">
+                <a:solidFill>
+                  <a:schemeClr val="tx1"/>
+                </a:solidFill>
+              </a:rPr>
+              <a:t>Pain points:</a:t>
+            </a:r>
+            <a:endParaRPr lang="en-US" dirty="0">
+              <a:solidFill>
+                <a:schemeClr val="tx1"/>
+              </a:solidFill>
+            </a:endParaRPr>
+          </a:p>
+          <a:p>
+            <a:pPr marL="285750" indent="-285750">
+              <a:lnSpc>
+                <a:spcPct val="120000"/>
+              </a:lnSpc>
+              <a:buFont typeface="Arial" panose="020B0604020202020204" pitchFamily="34" charset="0"/>
+              <a:buChar char="•"/>
+            </a:pPr>
+            <a:r>
+              <a:rPr lang="en-US" dirty="0">
+                <a:solidFill>
+                  <a:schemeClr val="tx1"/>
+                </a:solidFill>
+              </a:rPr>
+              <a:t>Manual API documentation.</a:t>
+            </a:r>
+          </a:p>
+          <a:p>
+            <a:pPr marL="285750" indent="-285750">
+              <a:lnSpc>
+                <a:spcPct val="120000"/>
+              </a:lnSpc>
+              <a:buFont typeface="Arial" panose="020B0604020202020204" pitchFamily="34" charset="0"/>
+              <a:buChar char="•"/>
+            </a:pPr>
+            <a:r>
+              <a:rPr lang="en-US" dirty="0">
+                <a:solidFill>
+                  <a:schemeClr val="tx1"/>
+                </a:solidFill>
+              </a:rPr>
+              <a:t>Difficulties in monitoring model performance.</a:t>
+            </a:r>
+          </a:p>
+          <a:p>
+            <a:endParaRPr lang="ru-RU" dirty="0"/>
+          </a:p>
+        </p:txBody>
+      </p:sp>
+      <p:sp>
+        <p:nvSpPr>
+          <p:cNvPr id="5" name="TextBox 4">
+            <a:extLst>
+              <a:ext uri="{FF2B5EF4-FFF2-40B4-BE49-F238E27FC236}">
+                <a16:creationId xmlns:a16="http://schemas.microsoft.com/office/drawing/2014/main" id="{1DC75561-9819-4074-8766-C1882A1161D7}"/>
+              </a:ext>
+            </a:extLst>
+          </p:cNvPr>
+          <p:cNvSpPr txBox="1"/>
+          <p:nvPr/>
+        </p:nvSpPr>
+        <p:spPr>
+          <a:xfrm>
+            <a:off x="4645959" y="3309023"/>
+            <a:ext cx="4127216" cy="1576650"/>
+          </a:xfrm>
+          <a:prstGeom prst="rect">
+            <a:avLst/>
+          </a:prstGeom>
+          <a:noFill/>
+        </p:spPr>
+        <p:txBody>
+          <a:bodyPr wrap="square" rtlCol="0">
+            <a:spAutoFit/>
+          </a:bodyPr>
+          <a:lstStyle/>
+          <a:p>
+            <a:r>
+              <a:rPr lang="en-US" b="1" dirty="0">
+                <a:solidFill>
+                  <a:schemeClr val="tx1"/>
+                </a:solidFill>
+              </a:rPr>
+              <a:t>Pain points:</a:t>
+            </a:r>
+            <a:endParaRPr lang="en-US" dirty="0">
+              <a:solidFill>
+                <a:schemeClr val="tx1"/>
+              </a:solidFill>
+            </a:endParaRPr>
+          </a:p>
+          <a:p>
+            <a:pPr marL="285750" indent="-285750">
+              <a:lnSpc>
+                <a:spcPct val="120000"/>
+              </a:lnSpc>
+              <a:buFont typeface="Arial" panose="020B0604020202020204" pitchFamily="34" charset="0"/>
+              <a:buChar char="•"/>
+            </a:pPr>
+            <a:r>
+              <a:rPr lang="en-US" dirty="0"/>
+              <a:t>Incomplete or outdated</a:t>
+            </a:r>
+            <a:r>
+              <a:rPr lang="en-US" dirty="0">
+                <a:solidFill>
+                  <a:schemeClr val="tx1"/>
+                </a:solidFill>
+              </a:rPr>
+              <a:t> API documentation.</a:t>
+            </a:r>
+          </a:p>
+          <a:p>
+            <a:pPr marL="285750" indent="-285750">
+              <a:lnSpc>
+                <a:spcPct val="120000"/>
+              </a:lnSpc>
+              <a:buFont typeface="Arial" panose="020B0604020202020204" pitchFamily="34" charset="0"/>
+              <a:buChar char="•"/>
+            </a:pPr>
+            <a:r>
+              <a:rPr lang="en-US" dirty="0">
+                <a:solidFill>
+                  <a:schemeClr val="tx1"/>
+                </a:solidFill>
+              </a:rPr>
+              <a:t>Challenges with integrating authorization and managing access control.</a:t>
+            </a:r>
+          </a:p>
+          <a:p>
+            <a:pPr marL="285750" indent="-285750">
+              <a:lnSpc>
+                <a:spcPct val="120000"/>
+              </a:lnSpc>
+              <a:buFont typeface="Arial" panose="020B0604020202020204" pitchFamily="34" charset="0"/>
+              <a:buChar char="•"/>
+            </a:pPr>
+            <a:r>
+              <a:rPr lang="en-US" dirty="0"/>
+              <a:t>Challenges with integration and corporate standards.</a:t>
+            </a:r>
+            <a:endParaRPr lang="en-US" dirty="0">
+              <a:solidFill>
+                <a:schemeClr val="tx1"/>
+              </a:solidFill>
+            </a:endParaRPr>
+          </a:p>
+        </p:txBody>
+      </p:sp>
+    </p:spTree>
+    <p:extLst>
+      <p:ext uri="{BB962C8B-B14F-4D97-AF65-F5344CB8AC3E}">
+        <p14:creationId xmlns:p14="http://schemas.microsoft.com/office/powerpoint/2010/main" val="2021445038"/>
+      </p:ext>
+    </p:extLst>
+  </p:cSld>
+  <p:clrMapOvr>
+    <a:masterClrMapping/>
+  </p:clrMapOvr>
+</p:sld>
+</file>
+
+<file path=ppt/slides/slide5.xml><?xml version="1.0" encoding="utf-8"?>
 <p:sld xmlns:a="http://schemas.openxmlformats.org/drawingml/2006/main" xmlns:r="http://schemas.openxmlformats.org/officeDocument/2006/relationships" xmlns:p="http://schemas.openxmlformats.org/presentationml/2006/main">
   <p:cSld>
     <p:spTree>
@@ -13328,7 +12534,7 @@
             </a:pPr>
             <a:fld id="{00000000-1234-1234-1234-123412341234}" type="slidenum">
               <a:rPr lang="en-GB" smtClean="0"/>
-              <a:t>6</a:t>
+              <a:t>5</a:t>
             </a:fld>
             <a:endParaRPr lang="en-GB"/>
           </a:p>
@@ -13347,7 +12553,7 @@
 </p:sld>
 </file>
 
-<file path=ppt/slides/slide7.xml><?xml version="1.0" encoding="utf-8"?>
+<file path=ppt/slides/slide6.xml><?xml version="1.0" encoding="utf-8"?>
 <p:sld xmlns:a="http://schemas.openxmlformats.org/drawingml/2006/main" xmlns:r="http://schemas.openxmlformats.org/officeDocument/2006/relationships" xmlns:p="http://schemas.openxmlformats.org/presentationml/2006/main">
   <p:cSld>
     <p:spTree>
@@ -13460,7 +12666,7 @@
             </a:pPr>
             <a:fld id="{00000000-1234-1234-1234-123412341234}" type="slidenum">
               <a:rPr lang="en-GB" smtClean="0"/>
-              <a:t>7</a:t>
+              <a:t>6</a:t>
             </a:fld>
             <a:endParaRPr lang="en-GB"/>
           </a:p>
@@ -13557,7 +12763,7 @@
 </p:sld>
 </file>
 
-<file path=ppt/slides/slide8.xml><?xml version="1.0" encoding="utf-8"?>
+<file path=ppt/slides/slide7.xml><?xml version="1.0" encoding="utf-8"?>
 <p:sld xmlns:a="http://schemas.openxmlformats.org/drawingml/2006/main" xmlns:r="http://schemas.openxmlformats.org/officeDocument/2006/relationships" xmlns:p="http://schemas.openxmlformats.org/presentationml/2006/main">
   <p:cSld>
     <p:spTree>
@@ -13670,7 +12876,7 @@
             </a:pPr>
             <a:fld id="{00000000-1234-1234-1234-123412341234}" type="slidenum">
               <a:rPr lang="en-GB" smtClean="0"/>
-              <a:t>8</a:t>
+              <a:t>7</a:t>
             </a:fld>
             <a:endParaRPr lang="en-GB"/>
           </a:p>
@@ -13691,21 +12897,21 @@
           <p:nvPr>
             <p:extLst>
               <p:ext uri="{D42A27DB-BD31-4B8C-83A1-F6EECF244321}">
-                <p14:modId xmlns:p14="http://schemas.microsoft.com/office/powerpoint/2010/main" val="2275922058"/>
+                <p14:modId xmlns:p14="http://schemas.microsoft.com/office/powerpoint/2010/main" val="2043209152"/>
               </p:ext>
             </p:extLst>
           </p:nvPr>
         </p:nvGraphicFramePr>
         <p:xfrm>
-          <a:off x="457199" y="968187"/>
-          <a:ext cx="8243048" cy="3695029"/>
+          <a:off x="416859" y="968187"/>
+          <a:ext cx="8283388" cy="3723030"/>
         </p:xfrm>
         <a:graphic>
           <a:graphicData uri="http://schemas.openxmlformats.org/drawingml/2006/table">
             <a:tbl>
               <a:tblPr/>
               <a:tblGrid>
-                <a:gridCol w="1761566">
+                <a:gridCol w="1801906">
                   <a:extLst>
                     <a:ext uri="{9D8B030D-6E8A-4147-A177-3AD203B41FA5}">
                       <a16:colId xmlns:a16="http://schemas.microsoft.com/office/drawing/2014/main" val="820218566"/>
@@ -13741,7 +12947,7 @@
                     <a:lstStyle/>
                     <a:p>
                       <a:r>
-                        <a:rPr lang="en-US" sz="900" b="1">
+                        <a:rPr lang="en-US" sz="1200" b="1" dirty="0">
                           <a:effectLst/>
                         </a:rPr>
                         <a:t>Use Case</a:t>
@@ -13796,7 +13002,7 @@
                     <a:lstStyle/>
                     <a:p>
                       <a:r>
-                        <a:rPr lang="en-US" sz="900" b="1" dirty="0">
+                        <a:rPr lang="en-US" sz="1200" b="1" dirty="0">
                           <a:effectLst/>
                         </a:rPr>
                         <a:t>Cooperation Name</a:t>
@@ -13851,7 +13057,7 @@
                     <a:lstStyle/>
                     <a:p>
                       <a:r>
-                        <a:rPr lang="en-US" sz="900" b="1">
+                        <a:rPr lang="en-US" sz="1200" b="1" dirty="0">
                           <a:effectLst/>
                         </a:rPr>
                         <a:t>Used Roles</a:t>
@@ -13906,7 +13112,7 @@
                     <a:lstStyle/>
                     <a:p>
                       <a:r>
-                        <a:rPr lang="en-US" sz="900" b="1">
+                        <a:rPr lang="en-US" sz="1200" b="1" dirty="0">
                           <a:effectLst/>
                         </a:rPr>
                         <a:t>Candidate Classes</a:t>
@@ -13968,7 +13174,7 @@
                     <a:lstStyle/>
                     <a:p>
                       <a:r>
-                        <a:rPr lang="en-US" sz="900" b="1">
+                        <a:rPr lang="en-US" sz="1200" b="1" dirty="0">
                           <a:effectLst/>
                         </a:rPr>
                         <a:t>Forward Request</a:t>
@@ -14195,7 +13401,7 @@
                     <a:lstStyle/>
                     <a:p>
                       <a:r>
-                        <a:rPr lang="en-US" sz="900" b="1">
+                        <a:rPr lang="en-US" sz="1200" b="1" dirty="0">
                           <a:effectLst/>
                         </a:rPr>
                         <a:t>Load Balancing</a:t>
@@ -14422,7 +13628,7 @@
                     <a:lstStyle/>
                     <a:p>
                       <a:r>
-                        <a:rPr lang="en-US" sz="900" b="1">
+                        <a:rPr lang="en-US" sz="1200" b="1" dirty="0">
                           <a:effectLst/>
                         </a:rPr>
                         <a:t>Authenticate</a:t>
@@ -14649,7 +13855,7 @@
                     <a:lstStyle/>
                     <a:p>
                       <a:r>
-                        <a:rPr lang="en-US" sz="900" b="1">
+                        <a:rPr lang="en-US" sz="1200" b="1" dirty="0">
                           <a:effectLst/>
                         </a:rPr>
                         <a:t>Cache Response</a:t>
@@ -14876,7 +14082,7 @@
                     <a:lstStyle/>
                     <a:p>
                       <a:r>
-                        <a:rPr lang="en-US" sz="900" b="1">
+                        <a:rPr lang="en-US" sz="1200" b="1" dirty="0">
                           <a:effectLst/>
                         </a:rPr>
                         <a:t>Collect Logs</a:t>
@@ -15103,7 +14309,7 @@
                     <a:lstStyle/>
                     <a:p>
                       <a:r>
-                        <a:rPr lang="en-US" sz="900" b="1">
+                        <a:rPr lang="en-US" sz="1200" b="1" dirty="0">
                           <a:effectLst/>
                         </a:rPr>
                         <a:t>Deploy Model</a:t>
@@ -15330,7 +14536,7 @@
                     <a:lstStyle/>
                     <a:p>
                       <a:r>
-                        <a:rPr lang="en-US" sz="900" b="1">
+                        <a:rPr lang="en-US" sz="1200" b="1" dirty="0">
                           <a:effectLst/>
                         </a:rPr>
                         <a:t>Publish Model</a:t>
@@ -15557,13 +14763,13 @@
                     <a:lstStyle/>
                     <a:p>
                       <a:r>
-                        <a:rPr lang="en-US" sz="900" b="1" dirty="0" err="1">
+                        <a:rPr lang="en-US" sz="1200" b="1" dirty="0" err="1">
                           <a:effectLst/>
                         </a:rPr>
                         <a:t>OpenAPI</a:t>
                       </a:r>
                       <a:r>
-                        <a:rPr lang="en-US" sz="900" b="1" dirty="0">
+                        <a:rPr lang="en-US" sz="1200" b="1" dirty="0">
                           <a:effectLst/>
                         </a:rPr>
                         <a:t> Schema Generation</a:t>
@@ -15795,7 +15001,7 @@
 </p:sld>
 </file>
 
-<file path=ppt/slides/slide9.xml><?xml version="1.0" encoding="utf-8"?>
+<file path=ppt/slides/slide8.xml><?xml version="1.0" encoding="utf-8"?>
 <p:sld xmlns:a="http://schemas.openxmlformats.org/drawingml/2006/main" xmlns:r="http://schemas.openxmlformats.org/officeDocument/2006/relationships" xmlns:p="http://schemas.openxmlformats.org/presentationml/2006/main">
   <p:cSld>
     <p:spTree>
@@ -15908,7 +15114,7 @@
             </a:pPr>
             <a:fld id="{00000000-1234-1234-1234-123412341234}" type="slidenum">
               <a:rPr lang="en-GB" smtClean="0"/>
-              <a:t>9</a:t>
+              <a:t>8</a:t>
             </a:fld>
             <a:endParaRPr lang="en-GB"/>
           </a:p>
@@ -15961,6 +15167,315 @@
           </a:extLst>
         </p:spPr>
       </p:pic>
+    </p:spTree>
+  </p:cSld>
+  <p:clrMapOvr>
+    <a:masterClrMapping/>
+  </p:clrMapOvr>
+</p:sld>
+</file>
+
+<file path=ppt/slides/slide9.xml><?xml version="1.0" encoding="utf-8"?>
+<p:sld xmlns:a="http://schemas.openxmlformats.org/drawingml/2006/main" xmlns:r="http://schemas.openxmlformats.org/officeDocument/2006/relationships" xmlns:p="http://schemas.openxmlformats.org/presentationml/2006/main">
+  <p:cSld>
+    <p:spTree>
+      <p:nvGrpSpPr>
+        <p:cNvPr id="1" name="Shape 101"/>
+        <p:cNvGrpSpPr/>
+        <p:nvPr/>
+      </p:nvGrpSpPr>
+      <p:grpSpPr>
+        <a:xfrm>
+          <a:off x="0" y="0"/>
+          <a:ext cx="0" cy="0"/>
+          <a:chOff x="0" y="0"/>
+          <a:chExt cx="0" cy="0"/>
+        </a:xfrm>
+      </p:grpSpPr>
+      <p:sp>
+        <p:nvSpPr>
+          <p:cNvPr id="102" name="Google Shape;102;p20"/>
+          <p:cNvSpPr txBox="1">
+            <a:spLocks noGrp="1"/>
+          </p:cNvSpPr>
+          <p:nvPr>
+            <p:ph type="title"/>
+          </p:nvPr>
+        </p:nvSpPr>
+        <p:spPr>
+          <a:xfrm>
+            <a:off x="226208" y="185742"/>
+            <a:ext cx="8520600" cy="572700"/>
+          </a:xfrm>
+          <a:prstGeom prst="rect">
+            <a:avLst/>
+          </a:prstGeom>
+        </p:spPr>
+        <p:txBody>
+          <a:bodyPr spcFirstLastPara="1" wrap="square" lIns="91425" tIns="91425" rIns="91425" bIns="91425" anchor="t" anchorCtr="0">
+            <a:noAutofit/>
+          </a:bodyPr>
+          <a:lstStyle/>
+          <a:p>
+            <a:pPr marL="0" lvl="0" indent="0" algn="l" rtl="0">
+              <a:spcBef>
+                <a:spcPts val="0"/>
+              </a:spcBef>
+              <a:spcAft>
+                <a:spcPts val="0"/>
+              </a:spcAft>
+              <a:buNone/>
+            </a:pPr>
+            <a:r>
+              <a:rPr lang="en-GB" b="1" dirty="0">
+                <a:solidFill>
+                  <a:schemeClr val="tx1"/>
+                </a:solidFill>
+                <a:effectLst>
+                  <a:outerShdw blurRad="38100" dist="38100" dir="2700000" algn="tl">
+                    <a:srgbClr val="000000">
+                      <a:alpha val="43137"/>
+                    </a:srgbClr>
+                  </a:outerShdw>
+                </a:effectLst>
+              </a:rPr>
+              <a:t>Detailed behaviour</a:t>
+            </a:r>
+            <a:endParaRPr b="1" dirty="0">
+              <a:solidFill>
+                <a:schemeClr val="tx1"/>
+              </a:solidFill>
+              <a:effectLst>
+                <a:outerShdw blurRad="38100" dist="38100" dir="2700000" algn="tl">
+                  <a:srgbClr val="000000">
+                    <a:alpha val="43137"/>
+                  </a:srgbClr>
+                </a:outerShdw>
+              </a:effectLst>
+            </a:endParaRPr>
+          </a:p>
+        </p:txBody>
+      </p:sp>
+      <p:sp>
+        <p:nvSpPr>
+          <p:cNvPr id="2" name="Slide Number Placeholder 1">
+            <a:extLst>
+              <a:ext uri="{FF2B5EF4-FFF2-40B4-BE49-F238E27FC236}">
+                <a16:creationId xmlns:a16="http://schemas.microsoft.com/office/drawing/2014/main" id="{1993C304-8938-41C3-9583-2C7227088CD4}"/>
+              </a:ext>
+            </a:extLst>
+          </p:cNvPr>
+          <p:cNvSpPr>
+            <a:spLocks noGrp="1"/>
+          </p:cNvSpPr>
+          <p:nvPr>
+            <p:ph type="sldNum" idx="12"/>
+          </p:nvPr>
+        </p:nvSpPr>
+        <p:spPr/>
+        <p:txBody>
+          <a:bodyPr/>
+          <a:lstStyle/>
+          <a:p>
+            <a:pPr marL="0" lvl="0" indent="0" algn="r" rtl="0">
+              <a:spcBef>
+                <a:spcPts val="0"/>
+              </a:spcBef>
+              <a:spcAft>
+                <a:spcPts val="0"/>
+              </a:spcAft>
+              <a:buNone/>
+            </a:pPr>
+            <a:fld id="{00000000-1234-1234-1234-123412341234}" type="slidenum">
+              <a:rPr lang="en-GB" smtClean="0"/>
+              <a:t>9</a:t>
+            </a:fld>
+            <a:endParaRPr lang="en-GB"/>
+          </a:p>
+        </p:txBody>
+      </p:sp>
+      <p:pic>
+        <p:nvPicPr>
+          <p:cNvPr id="3074" name="Picture 2" descr="UC Request Routing">
+            <a:extLst>
+              <a:ext uri="{FF2B5EF4-FFF2-40B4-BE49-F238E27FC236}">
+                <a16:creationId xmlns:a16="http://schemas.microsoft.com/office/drawing/2014/main" id="{37B485D5-D86F-4696-BEBC-3226D81EFDF7}"/>
+              </a:ext>
+            </a:extLst>
+          </p:cNvPr>
+          <p:cNvPicPr>
+            <a:picLocks noChangeAspect="1" noChangeArrowheads="1"/>
+          </p:cNvPicPr>
+          <p:nvPr/>
+        </p:nvPicPr>
+        <p:blipFill>
+          <a:blip r:embed="rId3">
+            <a:extLst>
+              <a:ext uri="{28A0092B-C50C-407E-A947-70E740481C1C}">
+                <a14:useLocalDpi xmlns:a14="http://schemas.microsoft.com/office/drawing/2010/main" val="0"/>
+              </a:ext>
+            </a:extLst>
+          </a:blip>
+          <a:srcRect/>
+          <a:stretch>
+            <a:fillRect/>
+          </a:stretch>
+        </p:blipFill>
+        <p:spPr bwMode="auto">
+          <a:xfrm>
+            <a:off x="611842" y="1238099"/>
+            <a:ext cx="3556746" cy="3517662"/>
+          </a:xfrm>
+          <a:prstGeom prst="rect">
+            <a:avLst/>
+          </a:prstGeom>
+          <a:noFill/>
+          <a:ln w="19050">
+            <a:solidFill>
+              <a:schemeClr val="tx1"/>
+            </a:solidFill>
+          </a:ln>
+          <a:extLst>
+            <a:ext uri="{909E8E84-426E-40DD-AFC4-6F175D3DCCD1}">
+              <a14:hiddenFill xmlns:a14="http://schemas.microsoft.com/office/drawing/2010/main">
+                <a:solidFill>
+                  <a:srgbClr val="FFFFFF"/>
+                </a:solidFill>
+              </a14:hiddenFill>
+            </a:ext>
+          </a:extLst>
+        </p:spPr>
+      </p:pic>
+      <p:sp>
+        <p:nvSpPr>
+          <p:cNvPr id="5" name="TextBox 4">
+            <a:extLst>
+              <a:ext uri="{FF2B5EF4-FFF2-40B4-BE49-F238E27FC236}">
+                <a16:creationId xmlns:a16="http://schemas.microsoft.com/office/drawing/2014/main" id="{40FBE421-E6EC-4AE8-B9CD-ADEA23C49AAD}"/>
+              </a:ext>
+            </a:extLst>
+          </p:cNvPr>
+          <p:cNvSpPr txBox="1"/>
+          <p:nvPr/>
+        </p:nvSpPr>
+        <p:spPr>
+          <a:xfrm>
+            <a:off x="611842" y="844382"/>
+            <a:ext cx="3556746" cy="307777"/>
+          </a:xfrm>
+          <a:prstGeom prst="rect">
+            <a:avLst/>
+          </a:prstGeom>
+          <a:noFill/>
+        </p:spPr>
+        <p:txBody>
+          <a:bodyPr wrap="square" rtlCol="0">
+            <a:spAutoFit/>
+          </a:bodyPr>
+          <a:lstStyle/>
+          <a:p>
+            <a:pPr algn="ctr"/>
+            <a:r>
+              <a:rPr lang="en-US" b="1" dirty="0"/>
+              <a:t>Request Validator</a:t>
+            </a:r>
+            <a:endParaRPr lang="ru-RU" b="1" dirty="0"/>
+          </a:p>
+        </p:txBody>
+      </p:sp>
+      <p:pic>
+        <p:nvPicPr>
+          <p:cNvPr id="3076" name="Picture 4" descr="UC Request Routing">
+            <a:extLst>
+              <a:ext uri="{FF2B5EF4-FFF2-40B4-BE49-F238E27FC236}">
+                <a16:creationId xmlns:a16="http://schemas.microsoft.com/office/drawing/2014/main" id="{39D3E833-044C-4439-9822-90E0A5F85F5D}"/>
+              </a:ext>
+            </a:extLst>
+          </p:cNvPr>
+          <p:cNvPicPr>
+            <a:picLocks noChangeAspect="1" noChangeArrowheads="1"/>
+          </p:cNvPicPr>
+          <p:nvPr/>
+        </p:nvPicPr>
+        <p:blipFill>
+          <a:blip r:embed="rId4">
+            <a:extLst>
+              <a:ext uri="{28A0092B-C50C-407E-A947-70E740481C1C}">
+                <a14:useLocalDpi xmlns:a14="http://schemas.microsoft.com/office/drawing/2010/main" val="0"/>
+              </a:ext>
+            </a:extLst>
+          </a:blip>
+          <a:srcRect/>
+          <a:stretch>
+            <a:fillRect/>
+          </a:stretch>
+        </p:blipFill>
+        <p:spPr bwMode="auto">
+          <a:xfrm>
+            <a:off x="5232495" y="1238099"/>
+            <a:ext cx="3029098" cy="3517662"/>
+          </a:xfrm>
+          <a:prstGeom prst="rect">
+            <a:avLst/>
+          </a:prstGeom>
+          <a:noFill/>
+          <a:ln w="19050">
+            <a:solidFill>
+              <a:schemeClr val="tx1"/>
+            </a:solidFill>
+          </a:ln>
+          <a:extLst>
+            <a:ext uri="{909E8E84-426E-40DD-AFC4-6F175D3DCCD1}">
+              <a14:hiddenFill xmlns:a14="http://schemas.microsoft.com/office/drawing/2010/main">
+                <a:solidFill>
+                  <a:srgbClr val="FFFFFF"/>
+                </a:solidFill>
+              </a14:hiddenFill>
+            </a:ext>
+          </a:extLst>
+        </p:spPr>
+      </p:pic>
+      <p:sp>
+        <p:nvSpPr>
+          <p:cNvPr id="10" name="TextBox 9">
+            <a:extLst>
+              <a:ext uri="{FF2B5EF4-FFF2-40B4-BE49-F238E27FC236}">
+                <a16:creationId xmlns:a16="http://schemas.microsoft.com/office/drawing/2014/main" id="{5FEE58F1-6A47-41C8-A39B-651FD571848E}"/>
+              </a:ext>
+            </a:extLst>
+          </p:cNvPr>
+          <p:cNvSpPr txBox="1"/>
+          <p:nvPr/>
+        </p:nvSpPr>
+        <p:spPr>
+          <a:xfrm>
+            <a:off x="5232495" y="844381"/>
+            <a:ext cx="3029098" cy="307777"/>
+          </a:xfrm>
+          <a:prstGeom prst="rect">
+            <a:avLst/>
+          </a:prstGeom>
+          <a:noFill/>
+        </p:spPr>
+        <p:txBody>
+          <a:bodyPr wrap="square" rtlCol="0">
+            <a:spAutoFit/>
+          </a:bodyPr>
+          <a:lstStyle/>
+          <a:p>
+            <a:pPr algn="ctr"/>
+            <a:r>
+              <a:rPr lang="en-US" b="1" dirty="0" err="1"/>
+              <a:t>OpenAPI</a:t>
+            </a:r>
+            <a:r>
+              <a:rPr lang="en-US" b="1" dirty="0"/>
+              <a:t> Schema Generator</a:t>
+            </a:r>
+            <a:endParaRPr lang="ru-RU" b="1" dirty="0"/>
+          </a:p>
+        </p:txBody>
+      </p:sp>
     </p:spTree>
   </p:cSld>
   <p:clrMapOvr>

</xml_diff>